<commit_message>
Added slides on operations
</commit_message>
<xml_diff>
--- a/Spark/pyspark.pptx
+++ b/Spark/pyspark.pptx
@@ -13,7 +13,11 @@
     <p:sldId id="260" r:id="rId7"/>
     <p:sldId id="263" r:id="rId8"/>
     <p:sldId id="258" r:id="rId9"/>
-    <p:sldId id="264" r:id="rId10"/>
+    <p:sldId id="265" r:id="rId10"/>
+    <p:sldId id="264" r:id="rId11"/>
+    <p:sldId id="267" r:id="rId12"/>
+    <p:sldId id="266" r:id="rId13"/>
+    <p:sldId id="268" r:id="rId14"/>
   </p:sldIdLst>
   <p:sldSz cx="9144000" cy="6858000" type="screen4x3"/>
   <p:notesSz cx="6858000" cy="9144000"/>
@@ -246,7 +250,7 @@
           <a:p>
             <a:fld id="{ABFB48A8-96AE-444B-800E-5249C2828F02}" type="datetimeFigureOut">
               <a:rPr lang="nl-BE" smtClean="0"/>
-              <a:t>2016-01-20</a:t>
+              <a:t>20/01/2016</a:t>
             </a:fld>
             <a:endParaRPr lang="nl-BE"/>
           </a:p>
@@ -416,7 +420,7 @@
           <a:p>
             <a:fld id="{ABFB48A8-96AE-444B-800E-5249C2828F02}" type="datetimeFigureOut">
               <a:rPr lang="nl-BE" smtClean="0"/>
-              <a:t>2016-01-20</a:t>
+              <a:t>20/01/2016</a:t>
             </a:fld>
             <a:endParaRPr lang="nl-BE"/>
           </a:p>
@@ -596,7 +600,7 @@
           <a:p>
             <a:fld id="{ABFB48A8-96AE-444B-800E-5249C2828F02}" type="datetimeFigureOut">
               <a:rPr lang="nl-BE" smtClean="0"/>
-              <a:t>2016-01-20</a:t>
+              <a:t>20/01/2016</a:t>
             </a:fld>
             <a:endParaRPr lang="nl-BE"/>
           </a:p>
@@ -766,7 +770,7 @@
           <a:p>
             <a:fld id="{ABFB48A8-96AE-444B-800E-5249C2828F02}" type="datetimeFigureOut">
               <a:rPr lang="nl-BE" smtClean="0"/>
-              <a:t>2016-01-20</a:t>
+              <a:t>20/01/2016</a:t>
             </a:fld>
             <a:endParaRPr lang="nl-BE"/>
           </a:p>
@@ -1012,7 +1016,7 @@
           <a:p>
             <a:fld id="{ABFB48A8-96AE-444B-800E-5249C2828F02}" type="datetimeFigureOut">
               <a:rPr lang="nl-BE" smtClean="0"/>
-              <a:t>2016-01-20</a:t>
+              <a:t>20/01/2016</a:t>
             </a:fld>
             <a:endParaRPr lang="nl-BE"/>
           </a:p>
@@ -1244,7 +1248,7 @@
           <a:p>
             <a:fld id="{ABFB48A8-96AE-444B-800E-5249C2828F02}" type="datetimeFigureOut">
               <a:rPr lang="nl-BE" smtClean="0"/>
-              <a:t>2016-01-20</a:t>
+              <a:t>20/01/2016</a:t>
             </a:fld>
             <a:endParaRPr lang="nl-BE"/>
           </a:p>
@@ -1611,7 +1615,7 @@
           <a:p>
             <a:fld id="{ABFB48A8-96AE-444B-800E-5249C2828F02}" type="datetimeFigureOut">
               <a:rPr lang="nl-BE" smtClean="0"/>
-              <a:t>2016-01-20</a:t>
+              <a:t>20/01/2016</a:t>
             </a:fld>
             <a:endParaRPr lang="nl-BE"/>
           </a:p>
@@ -1729,7 +1733,7 @@
           <a:p>
             <a:fld id="{ABFB48A8-96AE-444B-800E-5249C2828F02}" type="datetimeFigureOut">
               <a:rPr lang="nl-BE" smtClean="0"/>
-              <a:t>2016-01-20</a:t>
+              <a:t>20/01/2016</a:t>
             </a:fld>
             <a:endParaRPr lang="nl-BE"/>
           </a:p>
@@ -1824,7 +1828,7 @@
           <a:p>
             <a:fld id="{ABFB48A8-96AE-444B-800E-5249C2828F02}" type="datetimeFigureOut">
               <a:rPr lang="nl-BE" smtClean="0"/>
-              <a:t>2016-01-20</a:t>
+              <a:t>20/01/2016</a:t>
             </a:fld>
             <a:endParaRPr lang="nl-BE"/>
           </a:p>
@@ -2101,7 +2105,7 @@
           <a:p>
             <a:fld id="{ABFB48A8-96AE-444B-800E-5249C2828F02}" type="datetimeFigureOut">
               <a:rPr lang="nl-BE" smtClean="0"/>
-              <a:t>2016-01-20</a:t>
+              <a:t>20/01/2016</a:t>
             </a:fld>
             <a:endParaRPr lang="nl-BE"/>
           </a:p>
@@ -2354,7 +2358,7 @@
           <a:p>
             <a:fld id="{ABFB48A8-96AE-444B-800E-5249C2828F02}" type="datetimeFigureOut">
               <a:rPr lang="nl-BE" smtClean="0"/>
-              <a:t>2016-01-20</a:t>
+              <a:t>20/01/2016</a:t>
             </a:fld>
             <a:endParaRPr lang="nl-BE"/>
           </a:p>
@@ -2567,7 +2571,7 @@
           <a:p>
             <a:fld id="{ABFB48A8-96AE-444B-800E-5249C2828F02}" type="datetimeFigureOut">
               <a:rPr lang="nl-BE" smtClean="0"/>
-              <a:t>2016-01-20</a:t>
+              <a:t>20/01/2016</a:t>
             </a:fld>
             <a:endParaRPr lang="nl-BE"/>
           </a:p>
@@ -3047,6 +3051,1052 @@
 </p:sld>
 </file>
 
+<file path=ppt/slides/slide10.xml><?xml version="1.0" encoding="utf-8"?>
+<p:sld xmlns:a="http://schemas.openxmlformats.org/drawingml/2006/main" xmlns:r="http://schemas.openxmlformats.org/officeDocument/2006/relationships" xmlns:p="http://schemas.openxmlformats.org/presentationml/2006/main">
+  <p:cSld>
+    <p:spTree>
+      <p:nvGrpSpPr>
+        <p:cNvPr id="1" name=""/>
+        <p:cNvGrpSpPr/>
+        <p:nvPr/>
+      </p:nvGrpSpPr>
+      <p:grpSpPr>
+        <a:xfrm>
+          <a:off x="0" y="0"/>
+          <a:ext cx="0" cy="0"/>
+          <a:chOff x="0" y="0"/>
+          <a:chExt cx="0" cy="0"/>
+        </a:xfrm>
+      </p:grpSpPr>
+      <p:sp>
+        <p:nvSpPr>
+          <p:cNvPr id="2" name="Title 1"/>
+          <p:cNvSpPr>
+            <a:spLocks noGrp="1"/>
+          </p:cNvSpPr>
+          <p:nvPr>
+            <p:ph type="title"/>
+          </p:nvPr>
+        </p:nvSpPr>
+        <p:spPr/>
+        <p:txBody>
+          <a:bodyPr/>
+          <a:lstStyle/>
+          <a:p>
+            <a:r>
+              <a:rPr lang="en-US" dirty="0" smtClean="0"/>
+              <a:t>Simple o</a:t>
+            </a:r>
+            <a:r>
+              <a:rPr lang="en-US" dirty="0" smtClean="0"/>
+              <a:t>perations </a:t>
+            </a:r>
+            <a:r>
+              <a:rPr lang="en-US" dirty="0" smtClean="0"/>
+              <a:t>on RDDs</a:t>
+            </a:r>
+            <a:endParaRPr lang="nl-BE" dirty="0"/>
+          </a:p>
+        </p:txBody>
+      </p:sp>
+      <p:sp>
+        <p:nvSpPr>
+          <p:cNvPr id="3" name="Content Placeholder 2"/>
+          <p:cNvSpPr>
+            <a:spLocks noGrp="1"/>
+          </p:cNvSpPr>
+          <p:nvPr>
+            <p:ph idx="1"/>
+          </p:nvPr>
+        </p:nvSpPr>
+        <p:spPr/>
+        <p:txBody>
+          <a:bodyPr/>
+          <a:lstStyle/>
+          <a:p>
+            <a:r>
+              <a:rPr lang="en-US" dirty="0" smtClean="0"/>
+              <a:t>Mapping function to each element</a:t>
+            </a:r>
+          </a:p>
+          <a:p>
+            <a:pPr lvl="1"/>
+            <a:r>
+              <a:rPr lang="en-US" sz="1800" dirty="0" smtClean="0">
+                <a:latin typeface="Courier New" panose="02070309020205020404" pitchFamily="49" charset="0"/>
+                <a:cs typeface="Courier New" panose="02070309020205020404" pitchFamily="49" charset="0"/>
+              </a:rPr>
+              <a:t>squares = </a:t>
+            </a:r>
+            <a:r>
+              <a:rPr lang="en-US" sz="1800" dirty="0" err="1" smtClean="0">
+                <a:latin typeface="Courier New" panose="02070309020205020404" pitchFamily="49" charset="0"/>
+                <a:cs typeface="Courier New" panose="02070309020205020404" pitchFamily="49" charset="0"/>
+              </a:rPr>
+              <a:t>data.map</a:t>
+            </a:r>
+            <a:r>
+              <a:rPr lang="en-US" sz="1800" dirty="0" smtClean="0">
+                <a:latin typeface="Courier New" panose="02070309020205020404" pitchFamily="49" charset="0"/>
+                <a:cs typeface="Courier New" panose="02070309020205020404" pitchFamily="49" charset="0"/>
+              </a:rPr>
+              <a:t>(lambda x: x**2)</a:t>
+            </a:r>
+            <a:endParaRPr lang="en-US" dirty="0" smtClean="0">
+              <a:latin typeface="Courier New" panose="02070309020205020404" pitchFamily="49" charset="0"/>
+              <a:cs typeface="Courier New" panose="02070309020205020404" pitchFamily="49" charset="0"/>
+            </a:endParaRPr>
+          </a:p>
+          <a:p>
+            <a:r>
+              <a:rPr lang="en-US" dirty="0" smtClean="0"/>
+              <a:t>Filtering elements</a:t>
+            </a:r>
+          </a:p>
+          <a:p>
+            <a:pPr lvl="1"/>
+            <a:r>
+              <a:rPr lang="en-US" sz="1800" dirty="0" smtClean="0">
+                <a:latin typeface="Courier New" panose="02070309020205020404" pitchFamily="49" charset="0"/>
+                <a:cs typeface="Courier New" panose="02070309020205020404" pitchFamily="49" charset="0"/>
+              </a:rPr>
+              <a:t>positives = </a:t>
+            </a:r>
+            <a:r>
+              <a:rPr lang="en-US" sz="1800" dirty="0" err="1" smtClean="0">
+                <a:latin typeface="Courier New" panose="02070309020205020404" pitchFamily="49" charset="0"/>
+                <a:cs typeface="Courier New" panose="02070309020205020404" pitchFamily="49" charset="0"/>
+              </a:rPr>
+              <a:t>data.filter</a:t>
+            </a:r>
+            <a:r>
+              <a:rPr lang="en-US" sz="1800" dirty="0" smtClean="0">
+                <a:latin typeface="Courier New" panose="02070309020205020404" pitchFamily="49" charset="0"/>
+                <a:cs typeface="Courier New" panose="02070309020205020404" pitchFamily="49" charset="0"/>
+              </a:rPr>
+              <a:t>(lambda x: x &gt; 0)</a:t>
+            </a:r>
+            <a:endParaRPr lang="en-US" dirty="0" smtClean="0">
+              <a:latin typeface="Courier New" panose="02070309020205020404" pitchFamily="49" charset="0"/>
+              <a:cs typeface="Courier New" panose="02070309020205020404" pitchFamily="49" charset="0"/>
+            </a:endParaRPr>
+          </a:p>
+          <a:p>
+            <a:r>
+              <a:rPr lang="en-US" dirty="0" smtClean="0"/>
+              <a:t>Reductions</a:t>
+            </a:r>
+          </a:p>
+          <a:p>
+            <a:pPr lvl="1"/>
+            <a:r>
+              <a:rPr lang="en-US" sz="1800" dirty="0" err="1" smtClean="0">
+                <a:latin typeface="Courier New" panose="02070309020205020404" pitchFamily="49" charset="0"/>
+                <a:cs typeface="Courier New" panose="02070309020205020404" pitchFamily="49" charset="0"/>
+              </a:rPr>
+              <a:t>total_sum</a:t>
+            </a:r>
+            <a:r>
+              <a:rPr lang="en-US" sz="1800" dirty="0" smtClean="0">
+                <a:latin typeface="Courier New" panose="02070309020205020404" pitchFamily="49" charset="0"/>
+                <a:cs typeface="Courier New" panose="02070309020205020404" pitchFamily="49" charset="0"/>
+              </a:rPr>
+              <a:t> = </a:t>
+            </a:r>
+            <a:r>
+              <a:rPr lang="en-US" sz="1800" dirty="0" err="1" smtClean="0">
+                <a:latin typeface="Courier New" panose="02070309020205020404" pitchFamily="49" charset="0"/>
+                <a:cs typeface="Courier New" panose="02070309020205020404" pitchFamily="49" charset="0"/>
+              </a:rPr>
+              <a:t>data.reduce</a:t>
+            </a:r>
+            <a:r>
+              <a:rPr lang="en-US" sz="1800" dirty="0" smtClean="0">
+                <a:latin typeface="Courier New" panose="02070309020205020404" pitchFamily="49" charset="0"/>
+                <a:cs typeface="Courier New" panose="02070309020205020404" pitchFamily="49" charset="0"/>
+              </a:rPr>
+              <a:t>(lambda a, b: a + b)</a:t>
+            </a:r>
+            <a:endParaRPr lang="en-US" dirty="0" smtClean="0">
+              <a:latin typeface="Courier New" panose="02070309020205020404" pitchFamily="49" charset="0"/>
+              <a:cs typeface="Courier New" panose="02070309020205020404" pitchFamily="49" charset="0"/>
+            </a:endParaRPr>
+          </a:p>
+          <a:p>
+            <a:pPr lvl="1"/>
+            <a:r>
+              <a:rPr lang="en-US" sz="1800" dirty="0" err="1">
+                <a:latin typeface="Courier New" panose="02070309020205020404" pitchFamily="49" charset="0"/>
+                <a:cs typeface="Courier New" panose="02070309020205020404" pitchFamily="49" charset="0"/>
+              </a:rPr>
+              <a:t>t</a:t>
+            </a:r>
+            <a:r>
+              <a:rPr lang="en-US" sz="1800" dirty="0" err="1" smtClean="0">
+                <a:latin typeface="Courier New" panose="02070309020205020404" pitchFamily="49" charset="0"/>
+                <a:cs typeface="Courier New" panose="02070309020205020404" pitchFamily="49" charset="0"/>
+              </a:rPr>
+              <a:t>otal_sum</a:t>
+            </a:r>
+            <a:r>
+              <a:rPr lang="en-US" sz="1800" dirty="0" smtClean="0">
+                <a:latin typeface="Courier New" panose="02070309020205020404" pitchFamily="49" charset="0"/>
+                <a:cs typeface="Courier New" panose="02070309020205020404" pitchFamily="49" charset="0"/>
+              </a:rPr>
+              <a:t> = </a:t>
+            </a:r>
+            <a:r>
+              <a:rPr lang="en-US" sz="1800" dirty="0" err="1" smtClean="0">
+                <a:latin typeface="Courier New" panose="02070309020205020404" pitchFamily="49" charset="0"/>
+                <a:cs typeface="Courier New" panose="02070309020205020404" pitchFamily="49" charset="0"/>
+              </a:rPr>
+              <a:t>data.sum</a:t>
+            </a:r>
+            <a:r>
+              <a:rPr lang="en-US" sz="1800" dirty="0" smtClean="0">
+                <a:latin typeface="Courier New" panose="02070309020205020404" pitchFamily="49" charset="0"/>
+                <a:cs typeface="Courier New" panose="02070309020205020404" pitchFamily="49" charset="0"/>
+              </a:rPr>
+              <a:t>()</a:t>
+            </a:r>
+            <a:endParaRPr lang="en-US" dirty="0" smtClean="0">
+              <a:latin typeface="Courier New" panose="02070309020205020404" pitchFamily="49" charset="0"/>
+              <a:cs typeface="Courier New" panose="02070309020205020404" pitchFamily="49" charset="0"/>
+            </a:endParaRPr>
+          </a:p>
+          <a:p>
+            <a:pPr lvl="1"/>
+            <a:r>
+              <a:rPr lang="en-US" sz="1800" dirty="0" smtClean="0">
+                <a:latin typeface="Courier New" panose="02070309020205020404" pitchFamily="49" charset="0"/>
+                <a:cs typeface="Courier New" panose="02070309020205020404" pitchFamily="49" charset="0"/>
+              </a:rPr>
+              <a:t>minimum = </a:t>
+            </a:r>
+            <a:r>
+              <a:rPr lang="en-US" sz="1800" dirty="0" err="1" smtClean="0">
+                <a:latin typeface="Courier New" panose="02070309020205020404" pitchFamily="49" charset="0"/>
+                <a:cs typeface="Courier New" panose="02070309020205020404" pitchFamily="49" charset="0"/>
+              </a:rPr>
+              <a:t>data.min</a:t>
+            </a:r>
+            <a:r>
+              <a:rPr lang="en-US" sz="1800" dirty="0" smtClean="0">
+                <a:latin typeface="Courier New" panose="02070309020205020404" pitchFamily="49" charset="0"/>
+                <a:cs typeface="Courier New" panose="02070309020205020404" pitchFamily="49" charset="0"/>
+              </a:rPr>
+              <a:t>()</a:t>
+            </a:r>
+            <a:endParaRPr lang="nl-BE" dirty="0">
+              <a:latin typeface="Courier New" panose="02070309020205020404" pitchFamily="49" charset="0"/>
+              <a:cs typeface="Courier New" panose="02070309020205020404" pitchFamily="49" charset="0"/>
+            </a:endParaRPr>
+          </a:p>
+        </p:txBody>
+      </p:sp>
+      <p:sp>
+        <p:nvSpPr>
+          <p:cNvPr id="4" name="TextBox 3"/>
+          <p:cNvSpPr txBox="1"/>
+          <p:nvPr/>
+        </p:nvSpPr>
+        <p:spPr>
+          <a:xfrm>
+            <a:off x="1092157" y="5452534"/>
+            <a:ext cx="7199215" cy="369332"/>
+          </a:xfrm>
+          <a:prstGeom prst="rect">
+            <a:avLst/>
+          </a:prstGeom>
+          <a:noFill/>
+          <a:ln>
+            <a:solidFill>
+              <a:schemeClr val="tx1"/>
+            </a:solidFill>
+          </a:ln>
+        </p:spPr>
+        <p:txBody>
+          <a:bodyPr wrap="none" rtlCol="0">
+            <a:spAutoFit/>
+          </a:bodyPr>
+          <a:lstStyle/>
+          <a:p>
+            <a:r>
+              <a:rPr lang="en-US" dirty="0" smtClean="0"/>
+              <a:t>Note: all operations are local, little need to communicate between workers</a:t>
+            </a:r>
+            <a:endParaRPr lang="nl-BE" dirty="0"/>
+          </a:p>
+        </p:txBody>
+      </p:sp>
+    </p:spTree>
+    <p:extLst>
+      <p:ext uri="{BB962C8B-B14F-4D97-AF65-F5344CB8AC3E}">
+        <p14:creationId xmlns:p14="http://schemas.microsoft.com/office/powerpoint/2010/main" val="3475636545"/>
+      </p:ext>
+    </p:extLst>
+  </p:cSld>
+  <p:clrMapOvr>
+    <a:masterClrMapping/>
+  </p:clrMapOvr>
+</p:sld>
+</file>
+
+<file path=ppt/slides/slide11.xml><?xml version="1.0" encoding="utf-8"?>
+<p:sld xmlns:a="http://schemas.openxmlformats.org/drawingml/2006/main" xmlns:r="http://schemas.openxmlformats.org/officeDocument/2006/relationships" xmlns:p="http://schemas.openxmlformats.org/presentationml/2006/main">
+  <p:cSld>
+    <p:spTree>
+      <p:nvGrpSpPr>
+        <p:cNvPr id="1" name=""/>
+        <p:cNvGrpSpPr/>
+        <p:nvPr/>
+      </p:nvGrpSpPr>
+      <p:grpSpPr>
+        <a:xfrm>
+          <a:off x="0" y="0"/>
+          <a:ext cx="0" cy="0"/>
+          <a:chOff x="0" y="0"/>
+          <a:chExt cx="0" cy="0"/>
+        </a:xfrm>
+      </p:grpSpPr>
+      <p:sp>
+        <p:nvSpPr>
+          <p:cNvPr id="2" name="Title 1"/>
+          <p:cNvSpPr>
+            <a:spLocks noGrp="1"/>
+          </p:cNvSpPr>
+          <p:nvPr>
+            <p:ph type="title"/>
+          </p:nvPr>
+        </p:nvSpPr>
+        <p:spPr/>
+        <p:txBody>
+          <a:bodyPr/>
+          <a:lstStyle/>
+          <a:p>
+            <a:r>
+              <a:rPr lang="en-US" dirty="0" smtClean="0"/>
+              <a:t>Set operations</a:t>
+            </a:r>
+            <a:endParaRPr lang="nl-BE" dirty="0"/>
+          </a:p>
+        </p:txBody>
+      </p:sp>
+      <p:sp>
+        <p:nvSpPr>
+          <p:cNvPr id="3" name="Content Placeholder 2"/>
+          <p:cNvSpPr>
+            <a:spLocks noGrp="1"/>
+          </p:cNvSpPr>
+          <p:nvPr>
+            <p:ph idx="1"/>
+          </p:nvPr>
+        </p:nvSpPr>
+        <p:spPr/>
+        <p:txBody>
+          <a:bodyPr/>
+          <a:lstStyle/>
+          <a:p>
+            <a:r>
+              <a:rPr lang="en-US" dirty="0" smtClean="0"/>
+              <a:t>RDDs can be interpreted as sets</a:t>
+            </a:r>
+          </a:p>
+          <a:p>
+            <a:pPr lvl="1"/>
+            <a:r>
+              <a:rPr lang="en-US" sz="1800" dirty="0" smtClean="0">
+                <a:latin typeface="Courier New" panose="02070309020205020404" pitchFamily="49" charset="0"/>
+                <a:cs typeface="Courier New" panose="02070309020205020404" pitchFamily="49" charset="0"/>
+              </a:rPr>
+              <a:t>union()</a:t>
+            </a:r>
+          </a:p>
+          <a:p>
+            <a:pPr lvl="1"/>
+            <a:r>
+              <a:rPr lang="en-US" sz="1800" dirty="0" smtClean="0">
+                <a:latin typeface="Courier New" panose="02070309020205020404" pitchFamily="49" charset="0"/>
+                <a:cs typeface="Courier New" panose="02070309020205020404" pitchFamily="49" charset="0"/>
+              </a:rPr>
+              <a:t>intersection()</a:t>
+            </a:r>
+          </a:p>
+          <a:p>
+            <a:pPr lvl="1"/>
+            <a:r>
+              <a:rPr lang="en-US" sz="1800" dirty="0" smtClean="0">
+                <a:latin typeface="Courier New" panose="02070309020205020404" pitchFamily="49" charset="0"/>
+                <a:cs typeface="Courier New" panose="02070309020205020404" pitchFamily="49" charset="0"/>
+              </a:rPr>
+              <a:t>distinct()</a:t>
+            </a:r>
+            <a:r>
+              <a:rPr lang="en-US" sz="1800" dirty="0" smtClean="0">
+                <a:cs typeface="Courier New" panose="02070309020205020404" pitchFamily="49" charset="0"/>
+              </a:rPr>
+              <a:t> (returns new RDD with unique elements)</a:t>
+            </a:r>
+          </a:p>
+          <a:p>
+            <a:r>
+              <a:rPr lang="en-US" dirty="0" smtClean="0">
+                <a:cs typeface="Courier New" panose="02070309020205020404" pitchFamily="49" charset="0"/>
+              </a:rPr>
+              <a:t>Note: no set difference!</a:t>
+            </a:r>
+          </a:p>
+          <a:p>
+            <a:pPr lvl="1"/>
+            <a:r>
+              <a:rPr lang="en-US" dirty="0" smtClean="0">
+                <a:cs typeface="Courier New" panose="02070309020205020404" pitchFamily="49" charset="0"/>
+              </a:rPr>
+              <a:t>very expensive operation</a:t>
+            </a:r>
+            <a:endParaRPr lang="nl-BE" sz="1800" dirty="0">
+              <a:cs typeface="Courier New" panose="02070309020205020404" pitchFamily="49" charset="0"/>
+            </a:endParaRPr>
+          </a:p>
+        </p:txBody>
+      </p:sp>
+    </p:spTree>
+    <p:extLst>
+      <p:ext uri="{BB962C8B-B14F-4D97-AF65-F5344CB8AC3E}">
+        <p14:creationId xmlns:p14="http://schemas.microsoft.com/office/powerpoint/2010/main" val="1868622939"/>
+      </p:ext>
+    </p:extLst>
+  </p:cSld>
+  <p:clrMapOvr>
+    <a:masterClrMapping/>
+  </p:clrMapOvr>
+</p:sld>
+</file>
+
+<file path=ppt/slides/slide12.xml><?xml version="1.0" encoding="utf-8"?>
+<p:sld xmlns:a="http://schemas.openxmlformats.org/drawingml/2006/main" xmlns:r="http://schemas.openxmlformats.org/officeDocument/2006/relationships" xmlns:p="http://schemas.openxmlformats.org/presentationml/2006/main">
+  <p:cSld>
+    <p:spTree>
+      <p:nvGrpSpPr>
+        <p:cNvPr id="1" name=""/>
+        <p:cNvGrpSpPr/>
+        <p:nvPr/>
+      </p:nvGrpSpPr>
+      <p:grpSpPr>
+        <a:xfrm>
+          <a:off x="0" y="0"/>
+          <a:ext cx="0" cy="0"/>
+          <a:chOff x="0" y="0"/>
+          <a:chExt cx="0" cy="0"/>
+        </a:xfrm>
+      </p:grpSpPr>
+      <p:sp>
+        <p:nvSpPr>
+          <p:cNvPr id="2" name="Title 1"/>
+          <p:cNvSpPr>
+            <a:spLocks noGrp="1"/>
+          </p:cNvSpPr>
+          <p:nvPr>
+            <p:ph type="title"/>
+          </p:nvPr>
+        </p:nvSpPr>
+        <p:spPr/>
+        <p:txBody>
+          <a:bodyPr/>
+          <a:lstStyle/>
+          <a:p>
+            <a:r>
+              <a:rPr lang="en-US" dirty="0" smtClean="0"/>
+              <a:t>Key/value pairs</a:t>
+            </a:r>
+            <a:endParaRPr lang="nl-BE" dirty="0"/>
+          </a:p>
+        </p:txBody>
+      </p:sp>
+      <p:sp>
+        <p:nvSpPr>
+          <p:cNvPr id="3" name="Content Placeholder 2"/>
+          <p:cNvSpPr>
+            <a:spLocks noGrp="1"/>
+          </p:cNvSpPr>
+          <p:nvPr>
+            <p:ph idx="1"/>
+          </p:nvPr>
+        </p:nvSpPr>
+        <p:spPr/>
+        <p:txBody>
+          <a:bodyPr/>
+          <a:lstStyle/>
+          <a:p>
+            <a:r>
+              <a:rPr lang="en-US" dirty="0" smtClean="0"/>
+              <a:t>Often convenient (or necessary) to label data for aggregation: key/value tuples, e.g.,</a:t>
+            </a:r>
+          </a:p>
+          <a:p>
+            <a:pPr lvl="1"/>
+            <a:r>
+              <a:rPr lang="en-US" sz="1600" dirty="0" smtClean="0">
+                <a:latin typeface="Courier New" panose="02070309020205020404" pitchFamily="49" charset="0"/>
+                <a:cs typeface="Courier New" panose="02070309020205020404" pitchFamily="49" charset="0"/>
+              </a:rPr>
+              <a:t>data = </a:t>
+            </a:r>
+            <a:r>
+              <a:rPr lang="en-US" sz="1600" dirty="0" err="1" smtClean="0">
+                <a:latin typeface="Courier New" panose="02070309020205020404" pitchFamily="49" charset="0"/>
+                <a:cs typeface="Courier New" panose="02070309020205020404" pitchFamily="49" charset="0"/>
+              </a:rPr>
+              <a:t>sc.parallelize</a:t>
+            </a:r>
+            <a:r>
+              <a:rPr lang="en-US" sz="1600" dirty="0" smtClean="0">
+                <a:latin typeface="Courier New" panose="02070309020205020404" pitchFamily="49" charset="0"/>
+                <a:cs typeface="Courier New" panose="02070309020205020404" pitchFamily="49" charset="0"/>
+              </a:rPr>
+              <a:t>(</a:t>
+            </a:r>
+            <a:r>
+              <a:rPr lang="en-US" sz="1600" dirty="0" err="1" smtClean="0">
+                <a:latin typeface="Courier New" panose="02070309020205020404" pitchFamily="49" charset="0"/>
+                <a:cs typeface="Courier New" panose="02070309020205020404" pitchFamily="49" charset="0"/>
+              </a:rPr>
+              <a:t>np.linspace</a:t>
+            </a:r>
+            <a:r>
+              <a:rPr lang="en-US" sz="1600" dirty="0" smtClean="0">
+                <a:latin typeface="Courier New" panose="02070309020205020404" pitchFamily="49" charset="0"/>
+                <a:cs typeface="Courier New" panose="02070309020205020404" pitchFamily="49" charset="0"/>
+              </a:rPr>
+              <a:t>(-10.0, 10.0, 1001)</a:t>
+            </a:r>
+            <a:br>
+              <a:rPr lang="en-US" sz="1600" dirty="0" smtClean="0">
+                <a:latin typeface="Courier New" panose="02070309020205020404" pitchFamily="49" charset="0"/>
+                <a:cs typeface="Courier New" panose="02070309020205020404" pitchFamily="49" charset="0"/>
+              </a:rPr>
+            </a:br>
+            <a:r>
+              <a:rPr lang="en-US" sz="1600" dirty="0" smtClean="0">
+                <a:latin typeface="Courier New" panose="02070309020205020404" pitchFamily="49" charset="0"/>
+                <a:cs typeface="Courier New" panose="02070309020205020404" pitchFamily="49" charset="0"/>
+              </a:rPr>
+              <a:t>signs = </a:t>
+            </a:r>
+            <a:r>
+              <a:rPr lang="en-US" sz="1600" dirty="0" err="1" smtClean="0">
+                <a:latin typeface="Courier New" panose="02070309020205020404" pitchFamily="49" charset="0"/>
+                <a:cs typeface="Courier New" panose="02070309020205020404" pitchFamily="49" charset="0"/>
+              </a:rPr>
+              <a:t>sc.map</a:t>
+            </a:r>
+            <a:r>
+              <a:rPr lang="en-US" sz="1600" dirty="0" smtClean="0">
+                <a:latin typeface="Courier New" panose="02070309020205020404" pitchFamily="49" charset="0"/>
+                <a:cs typeface="Courier New" panose="02070309020205020404" pitchFamily="49" charset="0"/>
+              </a:rPr>
+              <a:t>(lambda x: ('</a:t>
+            </a:r>
+            <a:r>
+              <a:rPr lang="en-US" sz="1600" dirty="0" err="1" smtClean="0">
+                <a:latin typeface="Courier New" panose="02070309020205020404" pitchFamily="49" charset="0"/>
+                <a:cs typeface="Courier New" panose="02070309020205020404" pitchFamily="49" charset="0"/>
+              </a:rPr>
+              <a:t>pos</a:t>
+            </a:r>
+            <a:r>
+              <a:rPr lang="en-US" sz="1600" dirty="0" smtClean="0">
+                <a:latin typeface="Courier New" panose="02070309020205020404" pitchFamily="49" charset="0"/>
+                <a:cs typeface="Courier New" panose="02070309020205020404" pitchFamily="49" charset="0"/>
+              </a:rPr>
+              <a:t>' if x &gt; 0 else '</a:t>
+            </a:r>
+            <a:r>
+              <a:rPr lang="en-US" sz="1600" dirty="0" err="1" smtClean="0">
+                <a:latin typeface="Courier New" panose="02070309020205020404" pitchFamily="49" charset="0"/>
+                <a:cs typeface="Courier New" panose="02070309020205020404" pitchFamily="49" charset="0"/>
+              </a:rPr>
+              <a:t>neg</a:t>
+            </a:r>
+            <a:r>
+              <a:rPr lang="en-US" sz="1600" dirty="0" smtClean="0">
+                <a:latin typeface="Courier New" panose="02070309020205020404" pitchFamily="49" charset="0"/>
+                <a:cs typeface="Courier New" panose="02070309020205020404" pitchFamily="49" charset="0"/>
+              </a:rPr>
+              <a:t>', x))</a:t>
+            </a:r>
+            <a:br>
+              <a:rPr lang="en-US" sz="1600" dirty="0" smtClean="0">
+                <a:latin typeface="Courier New" panose="02070309020205020404" pitchFamily="49" charset="0"/>
+                <a:cs typeface="Courier New" panose="02070309020205020404" pitchFamily="49" charset="0"/>
+              </a:rPr>
+            </a:br>
+            <a:r>
+              <a:rPr lang="en-US" sz="1600" dirty="0" smtClean="0">
+                <a:latin typeface="Courier New" panose="02070309020205020404" pitchFamily="49" charset="0"/>
+                <a:cs typeface="Courier New" panose="02070309020205020404" pitchFamily="49" charset="0"/>
+              </a:rPr>
+              <a:t>sums = </a:t>
+            </a:r>
+            <a:r>
+              <a:rPr lang="en-US" sz="1600" dirty="0" err="1" smtClean="0">
+                <a:latin typeface="Courier New" panose="02070309020205020404" pitchFamily="49" charset="0"/>
+                <a:cs typeface="Courier New" panose="02070309020205020404" pitchFamily="49" charset="0"/>
+              </a:rPr>
+              <a:t>sc.reduceByKey</a:t>
+            </a:r>
+            <a:r>
+              <a:rPr lang="en-US" sz="1600" dirty="0" smtClean="0">
+                <a:latin typeface="Courier New" panose="02070309020205020404" pitchFamily="49" charset="0"/>
+                <a:cs typeface="Courier New" panose="02070309020205020404" pitchFamily="49" charset="0"/>
+              </a:rPr>
+              <a:t>(lambda a, b: a + b)</a:t>
+            </a:r>
+            <a:br>
+              <a:rPr lang="en-US" sz="1600" dirty="0" smtClean="0">
+                <a:latin typeface="Courier New" panose="02070309020205020404" pitchFamily="49" charset="0"/>
+                <a:cs typeface="Courier New" panose="02070309020205020404" pitchFamily="49" charset="0"/>
+              </a:rPr>
+            </a:br>
+            <a:r>
+              <a:rPr lang="en-US" sz="1600" dirty="0" err="1" smtClean="0">
+                <a:latin typeface="Courier New" panose="02070309020205020404" pitchFamily="49" charset="0"/>
+                <a:cs typeface="Courier New" panose="02070309020205020404" pitchFamily="49" charset="0"/>
+              </a:rPr>
+              <a:t>sums.collect</a:t>
+            </a:r>
+            <a:r>
+              <a:rPr lang="en-US" sz="1600" dirty="0" smtClean="0">
+                <a:latin typeface="Courier New" panose="02070309020205020404" pitchFamily="49" charset="0"/>
+                <a:cs typeface="Courier New" panose="02070309020205020404" pitchFamily="49" charset="0"/>
+              </a:rPr>
+              <a:t>()</a:t>
+            </a:r>
+            <a:endParaRPr lang="en-US" dirty="0" smtClean="0">
+              <a:latin typeface="Courier New" panose="02070309020205020404" pitchFamily="49" charset="0"/>
+              <a:cs typeface="Courier New" panose="02070309020205020404" pitchFamily="49" charset="0"/>
+            </a:endParaRPr>
+          </a:p>
+          <a:p>
+            <a:r>
+              <a:rPr lang="en-US" dirty="0" smtClean="0"/>
+              <a:t>Key/value based operations</a:t>
+            </a:r>
+          </a:p>
+          <a:p>
+            <a:pPr lvl="1"/>
+            <a:r>
+              <a:rPr lang="en-US" sz="1800" dirty="0" err="1" smtClean="0">
+                <a:latin typeface="Courier New" panose="02070309020205020404" pitchFamily="49" charset="0"/>
+                <a:cs typeface="Courier New" panose="02070309020205020404" pitchFamily="49" charset="0"/>
+              </a:rPr>
+              <a:t>groupByKey</a:t>
+            </a:r>
+            <a:r>
+              <a:rPr lang="en-US" sz="1800" dirty="0" smtClean="0">
+                <a:latin typeface="Courier New" panose="02070309020205020404" pitchFamily="49" charset="0"/>
+                <a:cs typeface="Courier New" panose="02070309020205020404" pitchFamily="49" charset="0"/>
+              </a:rPr>
+              <a:t>()</a:t>
+            </a:r>
+            <a:endParaRPr lang="en-US" dirty="0" smtClean="0">
+              <a:latin typeface="Courier New" panose="02070309020205020404" pitchFamily="49" charset="0"/>
+              <a:cs typeface="Courier New" panose="02070309020205020404" pitchFamily="49" charset="0"/>
+            </a:endParaRPr>
+          </a:p>
+          <a:p>
+            <a:pPr lvl="1"/>
+            <a:r>
+              <a:rPr lang="en-US" sz="1800" dirty="0" err="1" smtClean="0">
+                <a:latin typeface="Courier New" panose="02070309020205020404" pitchFamily="49" charset="0"/>
+                <a:cs typeface="Courier New" panose="02070309020205020404" pitchFamily="49" charset="0"/>
+              </a:rPr>
+              <a:t>reduceByKey</a:t>
+            </a:r>
+            <a:r>
+              <a:rPr lang="en-US" sz="1800" dirty="0" smtClean="0">
+                <a:latin typeface="Courier New" panose="02070309020205020404" pitchFamily="49" charset="0"/>
+                <a:cs typeface="Courier New" panose="02070309020205020404" pitchFamily="49" charset="0"/>
+              </a:rPr>
+              <a:t>()</a:t>
+            </a:r>
+            <a:endParaRPr lang="en-US" dirty="0" smtClean="0">
+              <a:latin typeface="Courier New" panose="02070309020205020404" pitchFamily="49" charset="0"/>
+              <a:cs typeface="Courier New" panose="02070309020205020404" pitchFamily="49" charset="0"/>
+            </a:endParaRPr>
+          </a:p>
+          <a:p>
+            <a:pPr lvl="1"/>
+            <a:r>
+              <a:rPr lang="en-US" sz="1800" dirty="0" err="1" smtClean="0">
+                <a:latin typeface="Courier New" panose="02070309020205020404" pitchFamily="49" charset="0"/>
+                <a:cs typeface="Courier New" panose="02070309020205020404" pitchFamily="49" charset="0"/>
+              </a:rPr>
+              <a:t>aggregateByKey</a:t>
+            </a:r>
+            <a:r>
+              <a:rPr lang="en-US" sz="1800" dirty="0" smtClean="0">
+                <a:latin typeface="Courier New" panose="02070309020205020404" pitchFamily="49" charset="0"/>
+                <a:cs typeface="Courier New" panose="02070309020205020404" pitchFamily="49" charset="0"/>
+              </a:rPr>
+              <a:t>()</a:t>
+            </a:r>
+            <a:endParaRPr lang="en-US" dirty="0" smtClean="0">
+              <a:latin typeface="Courier New" panose="02070309020205020404" pitchFamily="49" charset="0"/>
+              <a:cs typeface="Courier New" panose="02070309020205020404" pitchFamily="49" charset="0"/>
+            </a:endParaRPr>
+          </a:p>
+          <a:p>
+            <a:pPr lvl="1"/>
+            <a:r>
+              <a:rPr lang="en-US" sz="1800" dirty="0" err="1" smtClean="0">
+                <a:latin typeface="Courier New" panose="02070309020205020404" pitchFamily="49" charset="0"/>
+                <a:cs typeface="Courier New" panose="02070309020205020404" pitchFamily="49" charset="0"/>
+              </a:rPr>
+              <a:t>sortByKey</a:t>
+            </a:r>
+            <a:r>
+              <a:rPr lang="en-US" sz="1800" dirty="0" smtClean="0">
+                <a:latin typeface="Courier New" panose="02070309020205020404" pitchFamily="49" charset="0"/>
+                <a:cs typeface="Courier New" panose="02070309020205020404" pitchFamily="49" charset="0"/>
+              </a:rPr>
+              <a:t>()</a:t>
+            </a:r>
+            <a:endParaRPr lang="nl-BE" dirty="0">
+              <a:latin typeface="Courier New" panose="02070309020205020404" pitchFamily="49" charset="0"/>
+              <a:cs typeface="Courier New" panose="02070309020205020404" pitchFamily="49" charset="0"/>
+            </a:endParaRPr>
+          </a:p>
+        </p:txBody>
+      </p:sp>
+      <p:sp>
+        <p:nvSpPr>
+          <p:cNvPr id="4" name="TextBox 3"/>
+          <p:cNvSpPr txBox="1"/>
+          <p:nvPr/>
+        </p:nvSpPr>
+        <p:spPr>
+          <a:xfrm>
+            <a:off x="6180663" y="3513661"/>
+            <a:ext cx="2448171" cy="369332"/>
+          </a:xfrm>
+          <a:prstGeom prst="rect">
+            <a:avLst/>
+          </a:prstGeom>
+          <a:noFill/>
+          <a:ln>
+            <a:solidFill>
+              <a:schemeClr val="tx1"/>
+            </a:solidFill>
+          </a:ln>
+        </p:spPr>
+        <p:txBody>
+          <a:bodyPr wrap="none" rtlCol="0">
+            <a:spAutoFit/>
+          </a:bodyPr>
+          <a:lstStyle/>
+          <a:p>
+            <a:r>
+              <a:rPr lang="en-US" dirty="0" smtClean="0"/>
+              <a:t>Note: pure MapReduce!</a:t>
+            </a:r>
+            <a:endParaRPr lang="nl-BE" dirty="0"/>
+          </a:p>
+        </p:txBody>
+      </p:sp>
+    </p:spTree>
+    <p:extLst>
+      <p:ext uri="{BB962C8B-B14F-4D97-AF65-F5344CB8AC3E}">
+        <p14:creationId xmlns:p14="http://schemas.microsoft.com/office/powerpoint/2010/main" val="3615936902"/>
+      </p:ext>
+    </p:extLst>
+  </p:cSld>
+  <p:clrMapOvr>
+    <a:masterClrMapping/>
+  </p:clrMapOvr>
+</p:sld>
+</file>
+
+<file path=ppt/slides/slide13.xml><?xml version="1.0" encoding="utf-8"?>
+<p:sld xmlns:a="http://schemas.openxmlformats.org/drawingml/2006/main" xmlns:r="http://schemas.openxmlformats.org/officeDocument/2006/relationships" xmlns:p="http://schemas.openxmlformats.org/presentationml/2006/main">
+  <p:cSld>
+    <p:spTree>
+      <p:nvGrpSpPr>
+        <p:cNvPr id="1" name=""/>
+        <p:cNvGrpSpPr/>
+        <p:nvPr/>
+      </p:nvGrpSpPr>
+      <p:grpSpPr>
+        <a:xfrm>
+          <a:off x="0" y="0"/>
+          <a:ext cx="0" cy="0"/>
+          <a:chOff x="0" y="0"/>
+          <a:chExt cx="0" cy="0"/>
+        </a:xfrm>
+      </p:grpSpPr>
+      <p:sp>
+        <p:nvSpPr>
+          <p:cNvPr id="2" name="Title 1"/>
+          <p:cNvSpPr>
+            <a:spLocks noGrp="1"/>
+          </p:cNvSpPr>
+          <p:nvPr>
+            <p:ph type="title"/>
+          </p:nvPr>
+        </p:nvSpPr>
+        <p:spPr/>
+        <p:txBody>
+          <a:bodyPr/>
+          <a:lstStyle/>
+          <a:p>
+            <a:r>
+              <a:rPr lang="en-US" dirty="0" smtClean="0"/>
+              <a:t>Combining RDDs</a:t>
+            </a:r>
+            <a:endParaRPr lang="nl-BE" dirty="0"/>
+          </a:p>
+        </p:txBody>
+      </p:sp>
+      <p:sp>
+        <p:nvSpPr>
+          <p:cNvPr id="3" name="Content Placeholder 2"/>
+          <p:cNvSpPr>
+            <a:spLocks noGrp="1"/>
+          </p:cNvSpPr>
+          <p:nvPr>
+            <p:ph idx="1"/>
+          </p:nvPr>
+        </p:nvSpPr>
+        <p:spPr/>
+        <p:txBody>
+          <a:bodyPr/>
+          <a:lstStyle/>
+          <a:p>
+            <a:r>
+              <a:rPr lang="en-US" dirty="0" smtClean="0"/>
+              <a:t>RDDs with key/value tuples</a:t>
+            </a:r>
+          </a:p>
+          <a:p>
+            <a:pPr lvl="1"/>
+            <a:r>
+              <a:rPr lang="en-US" dirty="0" smtClean="0">
+                <a:latin typeface="Courier New" panose="02070309020205020404" pitchFamily="49" charset="0"/>
+                <a:cs typeface="Courier New" panose="02070309020205020404" pitchFamily="49" charset="0"/>
+              </a:rPr>
+              <a:t>data1</a:t>
+            </a:r>
+            <a:r>
+              <a:rPr lang="en-US" dirty="0" smtClean="0"/>
+              <a:t>: (K, V</a:t>
+            </a:r>
+            <a:r>
+              <a:rPr lang="en-US" baseline="-25000" dirty="0" smtClean="0"/>
+              <a:t>1</a:t>
+            </a:r>
+            <a:r>
+              <a:rPr lang="en-US" dirty="0" smtClean="0"/>
+              <a:t>)</a:t>
+            </a:r>
+          </a:p>
+          <a:p>
+            <a:pPr lvl="1"/>
+            <a:r>
+              <a:rPr lang="en-US" dirty="0" smtClean="0">
+                <a:latin typeface="Courier New" panose="02070309020205020404" pitchFamily="49" charset="0"/>
+                <a:cs typeface="Courier New" panose="02070309020205020404" pitchFamily="49" charset="0"/>
+              </a:rPr>
+              <a:t>data2</a:t>
+            </a:r>
+            <a:r>
+              <a:rPr lang="en-US" dirty="0" smtClean="0"/>
+              <a:t>: (K, V</a:t>
+            </a:r>
+            <a:r>
+              <a:rPr lang="en-US" baseline="-25000" dirty="0" smtClean="0"/>
+              <a:t>2</a:t>
+            </a:r>
+            <a:r>
+              <a:rPr lang="en-US" dirty="0" smtClean="0"/>
+              <a:t>)</a:t>
+            </a:r>
+          </a:p>
+          <a:p>
+            <a:r>
+              <a:rPr lang="en-US" dirty="0" smtClean="0"/>
+              <a:t>Joining RDDs</a:t>
+            </a:r>
+          </a:p>
+          <a:p>
+            <a:pPr lvl="1"/>
+            <a:r>
+              <a:rPr lang="en-US" sz="2000" dirty="0" smtClean="0">
+                <a:latin typeface="Courier New" panose="02070309020205020404" pitchFamily="49" charset="0"/>
+                <a:cs typeface="Courier New" panose="02070309020205020404" pitchFamily="49" charset="0"/>
+              </a:rPr>
+              <a:t>data1.join(data2)</a:t>
+            </a:r>
+            <a:r>
+              <a:rPr lang="en-US" dirty="0" smtClean="0"/>
+              <a:t>: (K, (V</a:t>
+            </a:r>
+            <a:r>
+              <a:rPr lang="en-US" baseline="-25000" dirty="0" smtClean="0"/>
+              <a:t>1</a:t>
+            </a:r>
+            <a:r>
+              <a:rPr lang="en-US" dirty="0" smtClean="0"/>
+              <a:t>, V</a:t>
+            </a:r>
+            <a:r>
+              <a:rPr lang="en-US" baseline="-25000" dirty="0" smtClean="0"/>
+              <a:t>2</a:t>
+            </a:r>
+            <a:r>
+              <a:rPr lang="en-US" dirty="0" smtClean="0"/>
+              <a:t>)), only common keys</a:t>
+            </a:r>
+          </a:p>
+          <a:p>
+            <a:pPr lvl="1"/>
+            <a:r>
+              <a:rPr lang="en-US" sz="2000" dirty="0" err="1" smtClean="0">
+                <a:latin typeface="Courier New" panose="02070309020205020404" pitchFamily="49" charset="0"/>
+                <a:cs typeface="Courier New" panose="02070309020205020404" pitchFamily="49" charset="0"/>
+              </a:rPr>
+              <a:t>leftOutJoin</a:t>
+            </a:r>
+            <a:r>
+              <a:rPr lang="en-US" sz="2000" dirty="0" smtClean="0">
+                <a:latin typeface="Courier New" panose="02070309020205020404" pitchFamily="49" charset="0"/>
+                <a:cs typeface="Courier New" panose="02070309020205020404" pitchFamily="49" charset="0"/>
+              </a:rPr>
+              <a:t>()</a:t>
+            </a:r>
+            <a:r>
+              <a:rPr lang="en-US" dirty="0" smtClean="0"/>
+              <a:t>, </a:t>
+            </a:r>
+            <a:r>
+              <a:rPr lang="en-US" dirty="0" err="1" smtClean="0">
+                <a:latin typeface="Courier New" panose="02070309020205020404" pitchFamily="49" charset="0"/>
+                <a:cs typeface="Courier New" panose="02070309020205020404" pitchFamily="49" charset="0"/>
+              </a:rPr>
+              <a:t>rightOuterJoin</a:t>
+            </a:r>
+            <a:r>
+              <a:rPr lang="en-US" dirty="0" smtClean="0">
+                <a:latin typeface="Courier New" panose="02070309020205020404" pitchFamily="49" charset="0"/>
+                <a:cs typeface="Courier New" panose="02070309020205020404" pitchFamily="49" charset="0"/>
+              </a:rPr>
+              <a:t>()</a:t>
+            </a:r>
+            <a:r>
+              <a:rPr lang="en-US" dirty="0" smtClean="0"/>
+              <a:t>, </a:t>
+            </a:r>
+            <a:r>
+              <a:rPr lang="en-US" sz="2000" dirty="0" err="1" smtClean="0">
+                <a:latin typeface="Courier New" panose="02070309020205020404" pitchFamily="49" charset="0"/>
+                <a:cs typeface="Courier New" panose="02070309020205020404" pitchFamily="49" charset="0"/>
+              </a:rPr>
+              <a:t>fullOuterJoin</a:t>
+            </a:r>
+            <a:r>
+              <a:rPr lang="en-US" sz="2000" dirty="0" smtClean="0">
+                <a:latin typeface="Courier New" panose="02070309020205020404" pitchFamily="49" charset="0"/>
+                <a:cs typeface="Courier New" panose="02070309020205020404" pitchFamily="49" charset="0"/>
+              </a:rPr>
+              <a:t>()</a:t>
+            </a:r>
+            <a:endParaRPr lang="en-US" dirty="0" smtClean="0">
+              <a:latin typeface="Courier New" panose="02070309020205020404" pitchFamily="49" charset="0"/>
+              <a:cs typeface="Courier New" panose="02070309020205020404" pitchFamily="49" charset="0"/>
+            </a:endParaRPr>
+          </a:p>
+          <a:p>
+            <a:pPr lvl="1"/>
+            <a:r>
+              <a:rPr lang="en-US" sz="2000" dirty="0" smtClean="0">
+                <a:latin typeface="Courier New" panose="02070309020205020404" pitchFamily="49" charset="0"/>
+                <a:cs typeface="Courier New" panose="02070309020205020404" pitchFamily="49" charset="0"/>
+              </a:rPr>
+              <a:t>data1.cogroup(data2)</a:t>
+            </a:r>
+            <a:r>
+              <a:rPr lang="en-US" dirty="0" smtClean="0"/>
+              <a:t>: </a:t>
+            </a:r>
+            <a:r>
+              <a:rPr lang="en-US" dirty="0"/>
+              <a:t>(K, </a:t>
+            </a:r>
+            <a:r>
+              <a:rPr lang="en-US" dirty="0" smtClean="0"/>
+              <a:t>(</a:t>
+            </a:r>
+            <a:r>
+              <a:rPr lang="en-US" dirty="0" err="1" smtClean="0"/>
+              <a:t>iterable</a:t>
+            </a:r>
+            <a:r>
+              <a:rPr lang="en-US" dirty="0" smtClean="0"/>
+              <a:t> V</a:t>
+            </a:r>
+            <a:r>
+              <a:rPr lang="en-US" baseline="-25000" dirty="0" smtClean="0"/>
+              <a:t>1</a:t>
+            </a:r>
+            <a:r>
+              <a:rPr lang="en-US" dirty="0"/>
+              <a:t>, </a:t>
+            </a:r>
+            <a:r>
+              <a:rPr lang="en-US" dirty="0" err="1" smtClean="0"/>
+              <a:t>iterable</a:t>
+            </a:r>
+            <a:r>
+              <a:rPr lang="en-US" dirty="0" smtClean="0"/>
+              <a:t> V</a:t>
+            </a:r>
+            <a:r>
+              <a:rPr lang="en-US" baseline="-25000" dirty="0" smtClean="0"/>
+              <a:t>2</a:t>
+            </a:r>
+            <a:r>
+              <a:rPr lang="en-US" dirty="0" smtClean="0"/>
+              <a:t>))</a:t>
+            </a:r>
+          </a:p>
+          <a:p>
+            <a:r>
+              <a:rPr lang="en-US" dirty="0" err="1" smtClean="0"/>
+              <a:t>Carthesian</a:t>
+            </a:r>
+            <a:r>
+              <a:rPr lang="en-US" smtClean="0"/>
+              <a:t> product</a:t>
+            </a:r>
+          </a:p>
+          <a:p>
+            <a:pPr lvl="1"/>
+            <a:endParaRPr lang="nl-BE" dirty="0"/>
+          </a:p>
+        </p:txBody>
+      </p:sp>
+    </p:spTree>
+    <p:extLst>
+      <p:ext uri="{BB962C8B-B14F-4D97-AF65-F5344CB8AC3E}">
+        <p14:creationId xmlns:p14="http://schemas.microsoft.com/office/powerpoint/2010/main" val="3609030837"/>
+      </p:ext>
+    </p:extLst>
+  </p:cSld>
+  <p:clrMapOvr>
+    <a:masterClrMapping/>
+  </p:clrMapOvr>
+</p:sld>
+</file>
+
 <file path=ppt/slides/slide2.xml><?xml version="1.0" encoding="utf-8"?>
 <p:sld xmlns:a="http://schemas.openxmlformats.org/drawingml/2006/main" xmlns:r="http://schemas.openxmlformats.org/officeDocument/2006/relationships" xmlns:p="http://schemas.openxmlformats.org/presentationml/2006/main">
   <p:cSld>
@@ -4275,7 +5325,7 @@
           <a:p>
             <a:r>
               <a:rPr lang="en-US" dirty="0" smtClean="0"/>
-              <a:t>Operations on RDDs</a:t>
+              <a:t>Peeking at RDDs</a:t>
             </a:r>
             <a:endParaRPr lang="nl-BE" dirty="0"/>
           </a:p>
@@ -4293,36 +5343,45 @@
         </p:nvSpPr>
         <p:spPr/>
         <p:txBody>
-          <a:bodyPr/>
-          <a:lstStyle/>
-          <a:p>
-            <a:r>
-              <a:rPr lang="en-US" dirty="0" smtClean="0"/>
-              <a:t>Mapping function to each element</a:t>
+          <a:bodyPr>
+            <a:normAutofit/>
+          </a:bodyPr>
+          <a:lstStyle/>
+          <a:p>
+            <a:r>
+              <a:rPr lang="en-US" dirty="0" smtClean="0"/>
+              <a:t>Get some values</a:t>
             </a:r>
           </a:p>
           <a:p>
             <a:pPr lvl="1"/>
             <a:r>
+              <a:rPr lang="en-US" sz="1800" dirty="0" err="1" smtClean="0">
+                <a:latin typeface="Courier New" panose="02070309020205020404" pitchFamily="49" charset="0"/>
+                <a:cs typeface="Courier New" panose="02070309020205020404" pitchFamily="49" charset="0"/>
+              </a:rPr>
+              <a:t>first_value</a:t>
+            </a:r>
+            <a:r>
               <a:rPr lang="en-US" sz="1800" dirty="0" smtClean="0">
                 <a:latin typeface="Courier New" panose="02070309020205020404" pitchFamily="49" charset="0"/>
                 <a:cs typeface="Courier New" panose="02070309020205020404" pitchFamily="49" charset="0"/>
               </a:rPr>
-              <a:t>squares = </a:t>
+              <a:t> = </a:t>
             </a:r>
             <a:r>
               <a:rPr lang="en-US" sz="1800" dirty="0" err="1" smtClean="0">
                 <a:latin typeface="Courier New" panose="02070309020205020404" pitchFamily="49" charset="0"/>
                 <a:cs typeface="Courier New" panose="02070309020205020404" pitchFamily="49" charset="0"/>
               </a:rPr>
-              <a:t>data.map</a:t>
+              <a:t>data.first</a:t>
             </a:r>
             <a:r>
               <a:rPr lang="en-US" sz="1800" dirty="0" smtClean="0">
                 <a:latin typeface="Courier New" panose="02070309020205020404" pitchFamily="49" charset="0"/>
                 <a:cs typeface="Courier New" panose="02070309020205020404" pitchFamily="49" charset="0"/>
               </a:rPr>
-              <a:t>(lambda x: x**2)</a:t>
+              <a:t>()</a:t>
             </a:r>
             <a:endParaRPr lang="en-US" dirty="0" smtClean="0">
               <a:latin typeface="Courier New" panose="02070309020205020404" pitchFamily="49" charset="0"/>
@@ -4330,33 +5389,72 @@
             </a:endParaRPr>
           </a:p>
           <a:p>
-            <a:r>
-              <a:rPr lang="en-US" dirty="0" smtClean="0"/>
-              <a:t>Filtering elements</a:t>
-            </a:r>
-          </a:p>
-          <a:p>
             <a:pPr lvl="1"/>
             <a:r>
+              <a:rPr lang="en-US" sz="1800" dirty="0" err="1" smtClean="0">
+                <a:latin typeface="Courier New" panose="02070309020205020404" pitchFamily="49" charset="0"/>
+                <a:cs typeface="Courier New" panose="02070309020205020404" pitchFamily="49" charset="0"/>
+              </a:rPr>
+              <a:t>first_few</a:t>
+            </a:r>
+            <a:r>
               <a:rPr lang="en-US" sz="1800" dirty="0" smtClean="0">
                 <a:latin typeface="Courier New" panose="02070309020205020404" pitchFamily="49" charset="0"/>
                 <a:cs typeface="Courier New" panose="02070309020205020404" pitchFamily="49" charset="0"/>
               </a:rPr>
-              <a:t>positives = </a:t>
+              <a:t> = </a:t>
             </a:r>
             <a:r>
               <a:rPr lang="en-US" sz="1800" dirty="0" err="1" smtClean="0">
                 <a:latin typeface="Courier New" panose="02070309020205020404" pitchFamily="49" charset="0"/>
                 <a:cs typeface="Courier New" panose="02070309020205020404" pitchFamily="49" charset="0"/>
               </a:rPr>
-              <a:t>data.filter</a:t>
+              <a:t>data.take</a:t>
             </a:r>
             <a:r>
               <a:rPr lang="en-US" sz="1800" dirty="0" smtClean="0">
                 <a:latin typeface="Courier New" panose="02070309020205020404" pitchFamily="49" charset="0"/>
                 <a:cs typeface="Courier New" panose="02070309020205020404" pitchFamily="49" charset="0"/>
               </a:rPr>
-              <a:t>(lambda x: x &gt; 0)</a:t>
+              <a:t>(5)</a:t>
+            </a:r>
+          </a:p>
+          <a:p>
+            <a:pPr lvl="1"/>
+            <a:r>
+              <a:rPr lang="en-US" sz="1800" dirty="0" smtClean="0">
+                <a:latin typeface="Courier New" panose="02070309020205020404" pitchFamily="49" charset="0"/>
+                <a:cs typeface="Courier New" panose="02070309020205020404" pitchFamily="49" charset="0"/>
+              </a:rPr>
+              <a:t>sample = </a:t>
+            </a:r>
+            <a:r>
+              <a:rPr lang="en-US" sz="1800" dirty="0" err="1" smtClean="0">
+                <a:latin typeface="Courier New" panose="02070309020205020404" pitchFamily="49" charset="0"/>
+                <a:cs typeface="Courier New" panose="02070309020205020404" pitchFamily="49" charset="0"/>
+              </a:rPr>
+              <a:t>data.takeSample</a:t>
+            </a:r>
+            <a:r>
+              <a:rPr lang="en-US" sz="1800" dirty="0" smtClean="0">
+                <a:latin typeface="Courier New" panose="02070309020205020404" pitchFamily="49" charset="0"/>
+                <a:cs typeface="Courier New" panose="02070309020205020404" pitchFamily="49" charset="0"/>
+              </a:rPr>
+              <a:t>(</a:t>
+            </a:r>
+            <a:r>
+              <a:rPr lang="en-US" sz="1800" dirty="0" err="1" smtClean="0">
+                <a:latin typeface="Courier New" panose="02070309020205020404" pitchFamily="49" charset="0"/>
+                <a:cs typeface="Courier New" panose="02070309020205020404" pitchFamily="49" charset="0"/>
+              </a:rPr>
+              <a:t>withReplacement</a:t>
+            </a:r>
+            <a:r>
+              <a:rPr lang="en-US" sz="1800" dirty="0" smtClean="0">
+                <a:latin typeface="Courier New" panose="02070309020205020404" pitchFamily="49" charset="0"/>
+                <a:cs typeface="Courier New" panose="02070309020205020404" pitchFamily="49" charset="0"/>
+              </a:rPr>
+              <a:t>, 500)</a:t>
             </a:r>
             <a:endParaRPr lang="en-US" dirty="0" smtClean="0">
               <a:latin typeface="Courier New" panose="02070309020205020404" pitchFamily="49" charset="0"/>
@@ -4366,38 +5464,31 @@
           <a:p>
             <a:r>
               <a:rPr lang="en-US" dirty="0" smtClean="0"/>
-              <a:t>Reductions</a:t>
+              <a:t>Get all values as list</a:t>
             </a:r>
           </a:p>
           <a:p>
             <a:pPr lvl="1"/>
             <a:r>
+              <a:rPr lang="en-US" sz="1800" dirty="0" smtClean="0">
+                <a:latin typeface="Courier New" panose="02070309020205020404" pitchFamily="49" charset="0"/>
+                <a:cs typeface="Courier New" panose="02070309020205020404" pitchFamily="49" charset="0"/>
+              </a:rPr>
+              <a:t>list = </a:t>
+            </a:r>
+            <a:r>
               <a:rPr lang="en-US" sz="1800" dirty="0" err="1" smtClean="0">
                 <a:latin typeface="Courier New" panose="02070309020205020404" pitchFamily="49" charset="0"/>
                 <a:cs typeface="Courier New" panose="02070309020205020404" pitchFamily="49" charset="0"/>
               </a:rPr>
-              <a:t>total_sum</a:t>
+              <a:t>data.collect</a:t>
             </a:r>
             <a:r>
               <a:rPr lang="en-US" sz="1800" dirty="0" smtClean="0">
                 <a:latin typeface="Courier New" panose="02070309020205020404" pitchFamily="49" charset="0"/>
                 <a:cs typeface="Courier New" panose="02070309020205020404" pitchFamily="49" charset="0"/>
               </a:rPr>
-              <a:t> = </a:t>
-            </a:r>
-            <a:r>
-              <a:rPr lang="en-US" sz="1800" dirty="0" err="1" smtClean="0">
-                <a:latin typeface="Courier New" panose="02070309020205020404" pitchFamily="49" charset="0"/>
-                <a:cs typeface="Courier New" panose="02070309020205020404" pitchFamily="49" charset="0"/>
-              </a:rPr>
-              <a:t>data.reduce</a:t>
-            </a:r>
-            <a:r>
-              <a:rPr lang="en-US" sz="1800" dirty="0" smtClean="0">
-                <a:latin typeface="Courier New" panose="02070309020205020404" pitchFamily="49" charset="0"/>
-                <a:cs typeface="Courier New" panose="02070309020205020404" pitchFamily="49" charset="0"/>
-              </a:rPr>
-              <a:t>(lambda a, b: a + b)</a:t>
+              <a:t>()</a:t>
             </a:r>
             <a:endParaRPr lang="en-US" dirty="0" smtClean="0">
               <a:latin typeface="Courier New" panose="02070309020205020404" pitchFamily="49" charset="0"/>
@@ -4405,20 +5496,19 @@
             </a:endParaRPr>
           </a:p>
           <a:p>
+            <a:r>
+              <a:rPr lang="en-US" dirty="0" smtClean="0"/>
+              <a:t>How many elements?</a:t>
+            </a:r>
+          </a:p>
+          <a:p>
             <a:pPr lvl="1"/>
             <a:r>
-              <a:rPr lang="en-US" sz="1800" dirty="0" err="1">
-                <a:latin typeface="Courier New" panose="02070309020205020404" pitchFamily="49" charset="0"/>
-                <a:cs typeface="Courier New" panose="02070309020205020404" pitchFamily="49" charset="0"/>
-              </a:rPr>
-              <a:t>t</a:t>
-            </a:r>
-            <a:r>
               <a:rPr lang="en-US" sz="1800" dirty="0" err="1" smtClean="0">
                 <a:latin typeface="Courier New" panose="02070309020205020404" pitchFamily="49" charset="0"/>
                 <a:cs typeface="Courier New" panose="02070309020205020404" pitchFamily="49" charset="0"/>
               </a:rPr>
-              <a:t>otal_sum</a:t>
+              <a:t>nr_elements</a:t>
             </a:r>
             <a:r>
               <a:rPr lang="en-US" sz="1800" dirty="0" smtClean="0">
@@ -4432,7 +5522,7 @@
                 <a:latin typeface="Courier New" panose="02070309020205020404" pitchFamily="49" charset="0"/>
                 <a:cs typeface="Courier New" panose="02070309020205020404" pitchFamily="49" charset="0"/>
               </a:rPr>
-              <a:t>data.sum</a:t>
+              <a:t>data.count</a:t>
             </a:r>
             <a:r>
               <a:rPr lang="en-US" sz="1800" dirty="0" smtClean="0">
@@ -4447,27 +5537,61 @@
             </a:endParaRPr>
           </a:p>
           <a:p>
+            <a:r>
+              <a:rPr lang="en-US" dirty="0" smtClean="0"/>
+              <a:t>Save values to file</a:t>
+            </a:r>
+          </a:p>
+          <a:p>
             <a:pPr lvl="1"/>
             <a:r>
+              <a:rPr lang="en-US" sz="1800" dirty="0" err="1" smtClean="0">
+                <a:latin typeface="Courier New" panose="02070309020205020404" pitchFamily="49" charset="0"/>
+                <a:cs typeface="Courier New" panose="02070309020205020404" pitchFamily="49" charset="0"/>
+              </a:rPr>
+              <a:t>data.saveAsTextFile</a:t>
+            </a:r>
+            <a:r>
               <a:rPr lang="en-US" sz="1800" dirty="0" smtClean="0">
                 <a:latin typeface="Courier New" panose="02070309020205020404" pitchFamily="49" charset="0"/>
                 <a:cs typeface="Courier New" panose="02070309020205020404" pitchFamily="49" charset="0"/>
               </a:rPr>
-              <a:t>minimum = </a:t>
-            </a:r>
+              <a:t>('output.txt')</a:t>
+            </a:r>
+            <a:endParaRPr lang="en-US" dirty="0" smtClean="0">
+              <a:latin typeface="Courier New" panose="02070309020205020404" pitchFamily="49" charset="0"/>
+              <a:cs typeface="Courier New" panose="02070309020205020404" pitchFamily="49" charset="0"/>
+            </a:endParaRPr>
+          </a:p>
+          <a:p>
+            <a:pPr lvl="1"/>
             <a:r>
               <a:rPr lang="en-US" sz="1800" dirty="0" err="1" smtClean="0">
                 <a:latin typeface="Courier New" panose="02070309020205020404" pitchFamily="49" charset="0"/>
                 <a:cs typeface="Courier New" panose="02070309020205020404" pitchFamily="49" charset="0"/>
               </a:rPr>
-              <a:t>data.min</a:t>
+              <a:t>data.saveAsSequenceFile</a:t>
             </a:r>
             <a:r>
               <a:rPr lang="en-US" sz="1800" dirty="0" smtClean="0">
                 <a:latin typeface="Courier New" panose="02070309020205020404" pitchFamily="49" charset="0"/>
                 <a:cs typeface="Courier New" panose="02070309020205020404" pitchFamily="49" charset="0"/>
               </a:rPr>
-              <a:t>()</a:t>
+              <a:t>('</a:t>
+            </a:r>
+            <a:r>
+              <a:rPr lang="en-US" sz="1800" dirty="0" err="1" smtClean="0">
+                <a:latin typeface="Courier New" panose="02070309020205020404" pitchFamily="49" charset="0"/>
+                <a:cs typeface="Courier New" panose="02070309020205020404" pitchFamily="49" charset="0"/>
+              </a:rPr>
+              <a:t>output.bin</a:t>
+            </a:r>
+            <a:r>
+              <a:rPr lang="en-US" sz="1800" dirty="0" smtClean="0">
+                <a:latin typeface="Courier New" panose="02070309020205020404" pitchFamily="49" charset="0"/>
+                <a:cs typeface="Courier New" panose="02070309020205020404" pitchFamily="49" charset="0"/>
+              </a:rPr>
+              <a:t>')</a:t>
             </a:r>
             <a:endParaRPr lang="nl-BE" dirty="0">
               <a:latin typeface="Courier New" panose="02070309020205020404" pitchFamily="49" charset="0"/>
@@ -4476,10 +5600,52 @@
           </a:p>
         </p:txBody>
       </p:sp>
+      <p:sp>
+        <p:nvSpPr>
+          <p:cNvPr id="4" name="TextBox 3"/>
+          <p:cNvSpPr txBox="1"/>
+          <p:nvPr/>
+        </p:nvSpPr>
+        <p:spPr>
+          <a:xfrm>
+            <a:off x="4809059" y="3505188"/>
+            <a:ext cx="2719078" cy="646331"/>
+          </a:xfrm>
+          <a:prstGeom prst="rect">
+            <a:avLst/>
+          </a:prstGeom>
+          <a:noFill/>
+          <a:ln>
+            <a:solidFill>
+              <a:schemeClr val="tx1"/>
+            </a:solidFill>
+          </a:ln>
+        </p:spPr>
+        <p:txBody>
+          <a:bodyPr wrap="none" rtlCol="0">
+            <a:spAutoFit/>
+          </a:bodyPr>
+          <a:lstStyle/>
+          <a:p>
+            <a:r>
+              <a:rPr lang="en-US" dirty="0" smtClean="0"/>
+              <a:t>Note: this blows up in your</a:t>
+            </a:r>
+            <a:br>
+              <a:rPr lang="en-US" dirty="0" smtClean="0"/>
+            </a:br>
+            <a:r>
+              <a:rPr lang="en-US" dirty="0" smtClean="0"/>
+              <a:t>           face if RDD is large</a:t>
+            </a:r>
+            <a:endParaRPr lang="nl-BE" dirty="0"/>
+          </a:p>
+        </p:txBody>
+      </p:sp>
     </p:spTree>
     <p:extLst>
       <p:ext uri="{BB962C8B-B14F-4D97-AF65-F5344CB8AC3E}">
-        <p14:creationId xmlns:p14="http://schemas.microsoft.com/office/powerpoint/2010/main" val="3475636545"/>
+        <p14:creationId xmlns:p14="http://schemas.microsoft.com/office/powerpoint/2010/main" val="2397943612"/>
       </p:ext>
     </p:extLst>
   </p:cSld>
@@ -4744,7 +5910,7 @@
   <a:extraClrSchemeLst/>
   <a:extLst>
     <a:ext uri="{05A4C25C-085E-4340-85A3-A5531E510DB2}">
-      <thm15:themeFamily xmlns:thm15="http://schemas.microsoft.com/office/thememl/2012/main" name="Office Theme" id="{62F939B6-93AF-4DB8-9C6B-D6C7DFDC589F}" vid="{4A3C46E8-61CC-4603-A589-7422A47A8E4A}"/>
+      <thm15:themeFamily xmlns:thm15="http://schemas.microsoft.com/office/thememl/2012/main" xmlns="" name="Office Theme" id="{62F939B6-93AF-4DB8-9C6B-D6C7DFDC589F}" vid="{4A3C46E8-61CC-4603-A589-7422A47A8E4A}"/>
     </a:ext>
   </a:extLst>
 </a:theme>

</xml_diff>

<commit_message>
Added slide on arhitecture; added remark on lazy evaluation
</commit_message>
<xml_diff>
--- a/Spark/pyspark.pptx
+++ b/Spark/pyspark.pptx
@@ -11,22 +11,23 @@
     <p:sldId id="257" r:id="rId5"/>
     <p:sldId id="259" r:id="rId6"/>
     <p:sldId id="260" r:id="rId7"/>
-    <p:sldId id="263" r:id="rId8"/>
-    <p:sldId id="258" r:id="rId9"/>
-    <p:sldId id="265" r:id="rId10"/>
-    <p:sldId id="264" r:id="rId11"/>
-    <p:sldId id="267" r:id="rId12"/>
-    <p:sldId id="266" r:id="rId13"/>
-    <p:sldId id="268" r:id="rId14"/>
-    <p:sldId id="273" r:id="rId15"/>
-    <p:sldId id="274" r:id="rId16"/>
-    <p:sldId id="275" r:id="rId17"/>
-    <p:sldId id="271" r:id="rId18"/>
-    <p:sldId id="272" r:id="rId19"/>
-    <p:sldId id="269" r:id="rId20"/>
-    <p:sldId id="270" r:id="rId21"/>
-    <p:sldId id="276" r:id="rId22"/>
-    <p:sldId id="277" r:id="rId23"/>
+    <p:sldId id="278" r:id="rId8"/>
+    <p:sldId id="263" r:id="rId9"/>
+    <p:sldId id="258" r:id="rId10"/>
+    <p:sldId id="265" r:id="rId11"/>
+    <p:sldId id="264" r:id="rId12"/>
+    <p:sldId id="267" r:id="rId13"/>
+    <p:sldId id="266" r:id="rId14"/>
+    <p:sldId id="268" r:id="rId15"/>
+    <p:sldId id="273" r:id="rId16"/>
+    <p:sldId id="274" r:id="rId17"/>
+    <p:sldId id="275" r:id="rId18"/>
+    <p:sldId id="271" r:id="rId19"/>
+    <p:sldId id="272" r:id="rId20"/>
+    <p:sldId id="269" r:id="rId21"/>
+    <p:sldId id="270" r:id="rId22"/>
+    <p:sldId id="276" r:id="rId23"/>
+    <p:sldId id="277" r:id="rId24"/>
   </p:sldIdLst>
   <p:sldSz cx="9144000" cy="6858000" type="screen4x3"/>
   <p:notesSz cx="6858000" cy="9144000"/>
@@ -259,7 +260,7 @@
           <a:p>
             <a:fld id="{ABFB48A8-96AE-444B-800E-5249C2828F02}" type="datetimeFigureOut">
               <a:rPr lang="nl-BE" smtClean="0"/>
-              <a:t>20/01/2016</a:t>
+              <a:t>22/01/2016</a:t>
             </a:fld>
             <a:endParaRPr lang="nl-BE"/>
           </a:p>
@@ -429,7 +430,7 @@
           <a:p>
             <a:fld id="{ABFB48A8-96AE-444B-800E-5249C2828F02}" type="datetimeFigureOut">
               <a:rPr lang="nl-BE" smtClean="0"/>
-              <a:t>20/01/2016</a:t>
+              <a:t>22/01/2016</a:t>
             </a:fld>
             <a:endParaRPr lang="nl-BE"/>
           </a:p>
@@ -609,7 +610,7 @@
           <a:p>
             <a:fld id="{ABFB48A8-96AE-444B-800E-5249C2828F02}" type="datetimeFigureOut">
               <a:rPr lang="nl-BE" smtClean="0"/>
-              <a:t>20/01/2016</a:t>
+              <a:t>22/01/2016</a:t>
             </a:fld>
             <a:endParaRPr lang="nl-BE"/>
           </a:p>
@@ -779,7 +780,7 @@
           <a:p>
             <a:fld id="{ABFB48A8-96AE-444B-800E-5249C2828F02}" type="datetimeFigureOut">
               <a:rPr lang="nl-BE" smtClean="0"/>
-              <a:t>20/01/2016</a:t>
+              <a:t>22/01/2016</a:t>
             </a:fld>
             <a:endParaRPr lang="nl-BE"/>
           </a:p>
@@ -1025,7 +1026,7 @@
           <a:p>
             <a:fld id="{ABFB48A8-96AE-444B-800E-5249C2828F02}" type="datetimeFigureOut">
               <a:rPr lang="nl-BE" smtClean="0"/>
-              <a:t>20/01/2016</a:t>
+              <a:t>22/01/2016</a:t>
             </a:fld>
             <a:endParaRPr lang="nl-BE"/>
           </a:p>
@@ -1257,7 +1258,7 @@
           <a:p>
             <a:fld id="{ABFB48A8-96AE-444B-800E-5249C2828F02}" type="datetimeFigureOut">
               <a:rPr lang="nl-BE" smtClean="0"/>
-              <a:t>20/01/2016</a:t>
+              <a:t>22/01/2016</a:t>
             </a:fld>
             <a:endParaRPr lang="nl-BE"/>
           </a:p>
@@ -1624,7 +1625,7 @@
           <a:p>
             <a:fld id="{ABFB48A8-96AE-444B-800E-5249C2828F02}" type="datetimeFigureOut">
               <a:rPr lang="nl-BE" smtClean="0"/>
-              <a:t>20/01/2016</a:t>
+              <a:t>22/01/2016</a:t>
             </a:fld>
             <a:endParaRPr lang="nl-BE"/>
           </a:p>
@@ -1742,7 +1743,7 @@
           <a:p>
             <a:fld id="{ABFB48A8-96AE-444B-800E-5249C2828F02}" type="datetimeFigureOut">
               <a:rPr lang="nl-BE" smtClean="0"/>
-              <a:t>20/01/2016</a:t>
+              <a:t>22/01/2016</a:t>
             </a:fld>
             <a:endParaRPr lang="nl-BE"/>
           </a:p>
@@ -1837,7 +1838,7 @@
           <a:p>
             <a:fld id="{ABFB48A8-96AE-444B-800E-5249C2828F02}" type="datetimeFigureOut">
               <a:rPr lang="nl-BE" smtClean="0"/>
-              <a:t>20/01/2016</a:t>
+              <a:t>22/01/2016</a:t>
             </a:fld>
             <a:endParaRPr lang="nl-BE"/>
           </a:p>
@@ -2114,7 +2115,7 @@
           <a:p>
             <a:fld id="{ABFB48A8-96AE-444B-800E-5249C2828F02}" type="datetimeFigureOut">
               <a:rPr lang="nl-BE" smtClean="0"/>
-              <a:t>20/01/2016</a:t>
+              <a:t>22/01/2016</a:t>
             </a:fld>
             <a:endParaRPr lang="nl-BE"/>
           </a:p>
@@ -2367,7 +2368,7 @@
           <a:p>
             <a:fld id="{ABFB48A8-96AE-444B-800E-5249C2828F02}" type="datetimeFigureOut">
               <a:rPr lang="nl-BE" smtClean="0"/>
-              <a:t>20/01/2016</a:t>
+              <a:t>22/01/2016</a:t>
             </a:fld>
             <a:endParaRPr lang="nl-BE"/>
           </a:p>
@@ -2580,7 +2581,7 @@
           <a:p>
             <a:fld id="{ABFB48A8-96AE-444B-800E-5249C2828F02}" type="datetimeFigureOut">
               <a:rPr lang="nl-BE" smtClean="0"/>
-              <a:t>20/01/2016</a:t>
+              <a:t>22/01/2016</a:t>
             </a:fld>
             <a:endParaRPr lang="nl-BE"/>
           </a:p>
@@ -3094,15 +3095,866 @@
           <a:p>
             <a:r>
               <a:rPr lang="en-US" dirty="0" smtClean="0"/>
-              <a:t>Simple o</a:t>
-            </a:r>
-            <a:r>
-              <a:rPr lang="en-US" dirty="0" smtClean="0"/>
-              <a:t>perations </a:t>
-            </a:r>
-            <a:r>
-              <a:rPr lang="en-US" dirty="0" smtClean="0"/>
-              <a:t>on RDDs</a:t>
+              <a:t>Peeking at RDDs</a:t>
+            </a:r>
+            <a:endParaRPr lang="nl-BE" dirty="0"/>
+          </a:p>
+        </p:txBody>
+      </p:sp>
+      <p:sp>
+        <p:nvSpPr>
+          <p:cNvPr id="3" name="Content Placeholder 2"/>
+          <p:cNvSpPr>
+            <a:spLocks noGrp="1"/>
+          </p:cNvSpPr>
+          <p:nvPr>
+            <p:ph idx="1"/>
+          </p:nvPr>
+        </p:nvSpPr>
+        <p:spPr/>
+        <p:txBody>
+          <a:bodyPr>
+            <a:normAutofit/>
+          </a:bodyPr>
+          <a:lstStyle/>
+          <a:p>
+            <a:r>
+              <a:rPr lang="en-US" dirty="0" smtClean="0"/>
+              <a:t>Get some values (as a list)</a:t>
+            </a:r>
+          </a:p>
+          <a:p>
+            <a:pPr lvl="1"/>
+            <a:r>
+              <a:rPr lang="en-US" sz="1800" dirty="0" err="1" smtClean="0">
+                <a:latin typeface="Courier New" panose="02070309020205020404" pitchFamily="49" charset="0"/>
+                <a:cs typeface="Courier New" panose="02070309020205020404" pitchFamily="49" charset="0"/>
+              </a:rPr>
+              <a:t>first_value</a:t>
+            </a:r>
+            <a:r>
+              <a:rPr lang="en-US" sz="1800" dirty="0" smtClean="0">
+                <a:latin typeface="Courier New" panose="02070309020205020404" pitchFamily="49" charset="0"/>
+                <a:cs typeface="Courier New" panose="02070309020205020404" pitchFamily="49" charset="0"/>
+              </a:rPr>
+              <a:t> = </a:t>
+            </a:r>
+            <a:r>
+              <a:rPr lang="en-US" sz="1800" dirty="0" err="1" smtClean="0">
+                <a:latin typeface="Courier New" panose="02070309020205020404" pitchFamily="49" charset="0"/>
+                <a:cs typeface="Courier New" panose="02070309020205020404" pitchFamily="49" charset="0"/>
+              </a:rPr>
+              <a:t>data.first</a:t>
+            </a:r>
+            <a:r>
+              <a:rPr lang="en-US" sz="1800" dirty="0" smtClean="0">
+                <a:latin typeface="Courier New" panose="02070309020205020404" pitchFamily="49" charset="0"/>
+                <a:cs typeface="Courier New" panose="02070309020205020404" pitchFamily="49" charset="0"/>
+              </a:rPr>
+              <a:t>()</a:t>
+            </a:r>
+            <a:endParaRPr lang="en-US" dirty="0" smtClean="0">
+              <a:latin typeface="Courier New" panose="02070309020205020404" pitchFamily="49" charset="0"/>
+              <a:cs typeface="Courier New" panose="02070309020205020404" pitchFamily="49" charset="0"/>
+            </a:endParaRPr>
+          </a:p>
+          <a:p>
+            <a:pPr lvl="1"/>
+            <a:r>
+              <a:rPr lang="en-US" sz="1800" dirty="0" err="1" smtClean="0">
+                <a:latin typeface="Courier New" panose="02070309020205020404" pitchFamily="49" charset="0"/>
+                <a:cs typeface="Courier New" panose="02070309020205020404" pitchFamily="49" charset="0"/>
+              </a:rPr>
+              <a:t>first_few</a:t>
+            </a:r>
+            <a:r>
+              <a:rPr lang="en-US" sz="1800" dirty="0" smtClean="0">
+                <a:latin typeface="Courier New" panose="02070309020205020404" pitchFamily="49" charset="0"/>
+                <a:cs typeface="Courier New" panose="02070309020205020404" pitchFamily="49" charset="0"/>
+              </a:rPr>
+              <a:t> = </a:t>
+            </a:r>
+            <a:r>
+              <a:rPr lang="en-US" sz="1800" dirty="0" err="1" smtClean="0">
+                <a:latin typeface="Courier New" panose="02070309020205020404" pitchFamily="49" charset="0"/>
+                <a:cs typeface="Courier New" panose="02070309020205020404" pitchFamily="49" charset="0"/>
+              </a:rPr>
+              <a:t>data.take</a:t>
+            </a:r>
+            <a:r>
+              <a:rPr lang="en-US" sz="1800" dirty="0" smtClean="0">
+                <a:latin typeface="Courier New" panose="02070309020205020404" pitchFamily="49" charset="0"/>
+                <a:cs typeface="Courier New" panose="02070309020205020404" pitchFamily="49" charset="0"/>
+              </a:rPr>
+              <a:t>(5)</a:t>
+            </a:r>
+          </a:p>
+          <a:p>
+            <a:pPr lvl="1"/>
+            <a:r>
+              <a:rPr lang="en-US" sz="1800" dirty="0" smtClean="0">
+                <a:latin typeface="Courier New" panose="02070309020205020404" pitchFamily="49" charset="0"/>
+                <a:cs typeface="Courier New" panose="02070309020205020404" pitchFamily="49" charset="0"/>
+              </a:rPr>
+              <a:t>sample = </a:t>
+            </a:r>
+            <a:r>
+              <a:rPr lang="en-US" sz="1800" dirty="0" err="1" smtClean="0">
+                <a:latin typeface="Courier New" panose="02070309020205020404" pitchFamily="49" charset="0"/>
+                <a:cs typeface="Courier New" panose="02070309020205020404" pitchFamily="49" charset="0"/>
+              </a:rPr>
+              <a:t>data.takeSample</a:t>
+            </a:r>
+            <a:r>
+              <a:rPr lang="en-US" sz="1800" dirty="0" smtClean="0">
+                <a:latin typeface="Courier New" panose="02070309020205020404" pitchFamily="49" charset="0"/>
+                <a:cs typeface="Courier New" panose="02070309020205020404" pitchFamily="49" charset="0"/>
+              </a:rPr>
+              <a:t>(</a:t>
+            </a:r>
+            <a:r>
+              <a:rPr lang="en-US" sz="1800" dirty="0" err="1" smtClean="0">
+                <a:latin typeface="Courier New" panose="02070309020205020404" pitchFamily="49" charset="0"/>
+                <a:cs typeface="Courier New" panose="02070309020205020404" pitchFamily="49" charset="0"/>
+              </a:rPr>
+              <a:t>withReplacement</a:t>
+            </a:r>
+            <a:r>
+              <a:rPr lang="en-US" sz="1800" dirty="0" smtClean="0">
+                <a:latin typeface="Courier New" panose="02070309020205020404" pitchFamily="49" charset="0"/>
+                <a:cs typeface="Courier New" panose="02070309020205020404" pitchFamily="49" charset="0"/>
+              </a:rPr>
+              <a:t>, 50)</a:t>
+            </a:r>
+            <a:endParaRPr lang="en-US" dirty="0" smtClean="0">
+              <a:latin typeface="Courier New" panose="02070309020205020404" pitchFamily="49" charset="0"/>
+              <a:cs typeface="Courier New" panose="02070309020205020404" pitchFamily="49" charset="0"/>
+            </a:endParaRPr>
+          </a:p>
+          <a:p>
+            <a:r>
+              <a:rPr lang="en-US" dirty="0" smtClean="0"/>
+              <a:t>Get all values as list</a:t>
+            </a:r>
+          </a:p>
+          <a:p>
+            <a:pPr lvl="1"/>
+            <a:r>
+              <a:rPr lang="en-US" sz="1800" dirty="0" smtClean="0">
+                <a:latin typeface="Courier New" panose="02070309020205020404" pitchFamily="49" charset="0"/>
+                <a:cs typeface="Courier New" panose="02070309020205020404" pitchFamily="49" charset="0"/>
+              </a:rPr>
+              <a:t>list = </a:t>
+            </a:r>
+            <a:r>
+              <a:rPr lang="en-US" sz="1800" dirty="0" err="1" smtClean="0">
+                <a:latin typeface="Courier New" panose="02070309020205020404" pitchFamily="49" charset="0"/>
+                <a:cs typeface="Courier New" panose="02070309020205020404" pitchFamily="49" charset="0"/>
+              </a:rPr>
+              <a:t>data.collect</a:t>
+            </a:r>
+            <a:r>
+              <a:rPr lang="en-US" sz="1800" dirty="0" smtClean="0">
+                <a:latin typeface="Courier New" panose="02070309020205020404" pitchFamily="49" charset="0"/>
+                <a:cs typeface="Courier New" panose="02070309020205020404" pitchFamily="49" charset="0"/>
+              </a:rPr>
+              <a:t>()</a:t>
+            </a:r>
+            <a:endParaRPr lang="en-US" dirty="0" smtClean="0">
+              <a:latin typeface="Courier New" panose="02070309020205020404" pitchFamily="49" charset="0"/>
+              <a:cs typeface="Courier New" panose="02070309020205020404" pitchFamily="49" charset="0"/>
+            </a:endParaRPr>
+          </a:p>
+          <a:p>
+            <a:r>
+              <a:rPr lang="en-US" dirty="0" smtClean="0"/>
+              <a:t>How many elements?</a:t>
+            </a:r>
+          </a:p>
+          <a:p>
+            <a:pPr lvl="1"/>
+            <a:r>
+              <a:rPr lang="en-US" sz="1800" dirty="0" err="1" smtClean="0">
+                <a:latin typeface="Courier New" panose="02070309020205020404" pitchFamily="49" charset="0"/>
+                <a:cs typeface="Courier New" panose="02070309020205020404" pitchFamily="49" charset="0"/>
+              </a:rPr>
+              <a:t>nr_elements</a:t>
+            </a:r>
+            <a:r>
+              <a:rPr lang="en-US" sz="1800" dirty="0" smtClean="0">
+                <a:latin typeface="Courier New" panose="02070309020205020404" pitchFamily="49" charset="0"/>
+                <a:cs typeface="Courier New" panose="02070309020205020404" pitchFamily="49" charset="0"/>
+              </a:rPr>
+              <a:t> = </a:t>
+            </a:r>
+            <a:r>
+              <a:rPr lang="en-US" sz="1800" dirty="0" err="1" smtClean="0">
+                <a:latin typeface="Courier New" panose="02070309020205020404" pitchFamily="49" charset="0"/>
+                <a:cs typeface="Courier New" panose="02070309020205020404" pitchFamily="49" charset="0"/>
+              </a:rPr>
+              <a:t>data.count</a:t>
+            </a:r>
+            <a:r>
+              <a:rPr lang="en-US" sz="1800" dirty="0" smtClean="0">
+                <a:latin typeface="Courier New" panose="02070309020205020404" pitchFamily="49" charset="0"/>
+                <a:cs typeface="Courier New" panose="02070309020205020404" pitchFamily="49" charset="0"/>
+              </a:rPr>
+              <a:t>()</a:t>
+            </a:r>
+            <a:endParaRPr lang="en-US" dirty="0" smtClean="0">
+              <a:latin typeface="Courier New" panose="02070309020205020404" pitchFamily="49" charset="0"/>
+              <a:cs typeface="Courier New" panose="02070309020205020404" pitchFamily="49" charset="0"/>
+            </a:endParaRPr>
+          </a:p>
+          <a:p>
+            <a:r>
+              <a:rPr lang="en-US" dirty="0" smtClean="0"/>
+              <a:t>Save values to file</a:t>
+            </a:r>
+          </a:p>
+          <a:p>
+            <a:pPr lvl="1"/>
+            <a:r>
+              <a:rPr lang="en-US" sz="1800" dirty="0" err="1" smtClean="0">
+                <a:latin typeface="Courier New" panose="02070309020205020404" pitchFamily="49" charset="0"/>
+                <a:cs typeface="Courier New" panose="02070309020205020404" pitchFamily="49" charset="0"/>
+              </a:rPr>
+              <a:t>data.saveAsTextFile</a:t>
+            </a:r>
+            <a:r>
+              <a:rPr lang="en-US" sz="1800" dirty="0" smtClean="0">
+                <a:latin typeface="Courier New" panose="02070309020205020404" pitchFamily="49" charset="0"/>
+                <a:cs typeface="Courier New" panose="02070309020205020404" pitchFamily="49" charset="0"/>
+              </a:rPr>
+              <a:t>('output.txt')</a:t>
+            </a:r>
+            <a:endParaRPr lang="en-US" dirty="0" smtClean="0">
+              <a:latin typeface="Courier New" panose="02070309020205020404" pitchFamily="49" charset="0"/>
+              <a:cs typeface="Courier New" panose="02070309020205020404" pitchFamily="49" charset="0"/>
+            </a:endParaRPr>
+          </a:p>
+          <a:p>
+            <a:pPr lvl="1"/>
+            <a:r>
+              <a:rPr lang="en-US" sz="1800" dirty="0" err="1" smtClean="0">
+                <a:latin typeface="Courier New" panose="02070309020205020404" pitchFamily="49" charset="0"/>
+                <a:cs typeface="Courier New" panose="02070309020205020404" pitchFamily="49" charset="0"/>
+              </a:rPr>
+              <a:t>data.saveAsSequenceFile</a:t>
+            </a:r>
+            <a:r>
+              <a:rPr lang="en-US" sz="1800" dirty="0" smtClean="0">
+                <a:latin typeface="Courier New" panose="02070309020205020404" pitchFamily="49" charset="0"/>
+                <a:cs typeface="Courier New" panose="02070309020205020404" pitchFamily="49" charset="0"/>
+              </a:rPr>
+              <a:t>('</a:t>
+            </a:r>
+            <a:r>
+              <a:rPr lang="en-US" sz="1800" dirty="0" err="1" smtClean="0">
+                <a:latin typeface="Courier New" panose="02070309020205020404" pitchFamily="49" charset="0"/>
+                <a:cs typeface="Courier New" panose="02070309020205020404" pitchFamily="49" charset="0"/>
+              </a:rPr>
+              <a:t>output.bin</a:t>
+            </a:r>
+            <a:r>
+              <a:rPr lang="en-US" sz="1800" dirty="0" smtClean="0">
+                <a:latin typeface="Courier New" panose="02070309020205020404" pitchFamily="49" charset="0"/>
+                <a:cs typeface="Courier New" panose="02070309020205020404" pitchFamily="49" charset="0"/>
+              </a:rPr>
+              <a:t>')</a:t>
+            </a:r>
+            <a:endParaRPr lang="nl-BE" dirty="0">
+              <a:latin typeface="Courier New" panose="02070309020205020404" pitchFamily="49" charset="0"/>
+              <a:cs typeface="Courier New" panose="02070309020205020404" pitchFamily="49" charset="0"/>
+            </a:endParaRPr>
+          </a:p>
+        </p:txBody>
+      </p:sp>
+      <p:sp>
+        <p:nvSpPr>
+          <p:cNvPr id="4" name="TextBox 3"/>
+          <p:cNvSpPr txBox="1"/>
+          <p:nvPr/>
+        </p:nvSpPr>
+        <p:spPr>
+          <a:xfrm>
+            <a:off x="4809059" y="3505188"/>
+            <a:ext cx="2719078" cy="646331"/>
+          </a:xfrm>
+          <a:prstGeom prst="rect">
+            <a:avLst/>
+          </a:prstGeom>
+          <a:noFill/>
+          <a:ln>
+            <a:solidFill>
+              <a:schemeClr val="tx1"/>
+            </a:solidFill>
+          </a:ln>
+        </p:spPr>
+        <p:txBody>
+          <a:bodyPr wrap="none" rtlCol="0">
+            <a:spAutoFit/>
+          </a:bodyPr>
+          <a:lstStyle/>
+          <a:p>
+            <a:r>
+              <a:rPr lang="en-US" dirty="0" smtClean="0"/>
+              <a:t>Note: this blows up in your</a:t>
+            </a:r>
+            <a:br>
+              <a:rPr lang="en-US" dirty="0" smtClean="0"/>
+            </a:br>
+            <a:r>
+              <a:rPr lang="en-US" dirty="0" smtClean="0"/>
+              <a:t>           face if RDD is large</a:t>
+            </a:r>
+            <a:endParaRPr lang="nl-BE" dirty="0"/>
+          </a:p>
+        </p:txBody>
+      </p:sp>
+    </p:spTree>
+    <p:extLst>
+      <p:ext uri="{BB962C8B-B14F-4D97-AF65-F5344CB8AC3E}">
+        <p14:creationId xmlns:p14="http://schemas.microsoft.com/office/powerpoint/2010/main" val="2397943612"/>
+      </p:ext>
+    </p:extLst>
+  </p:cSld>
+  <p:clrMapOvr>
+    <a:masterClrMapping/>
+  </p:clrMapOvr>
+  <p:timing>
+    <p:tnLst>
+      <p:par>
+        <p:cTn id="1" dur="indefinite" restart="never" nodeType="tmRoot">
+          <p:childTnLst>
+            <p:seq concurrent="1" nextAc="seek">
+              <p:cTn id="2" dur="indefinite" nodeType="mainSeq">
+                <p:childTnLst>
+                  <p:par>
+                    <p:cTn id="3" fill="hold">
+                      <p:stCondLst>
+                        <p:cond delay="indefinite"/>
+                        <p:cond evt="onBegin" delay="0">
+                          <p:tn val="2"/>
+                        </p:cond>
+                      </p:stCondLst>
+                      <p:childTnLst>
+                        <p:par>
+                          <p:cTn id="4" fill="hold">
+                            <p:stCondLst>
+                              <p:cond delay="0"/>
+                            </p:stCondLst>
+                            <p:childTnLst>
+                              <p:par>
+                                <p:cTn id="5" presetID="1" presetClass="entr" presetSubtype="0" fill="hold" grpId="0" nodeType="withEffect">
+                                  <p:stCondLst>
+                                    <p:cond delay="0"/>
+                                  </p:stCondLst>
+                                  <p:childTnLst>
+                                    <p:set>
+                                      <p:cBhvr>
+                                        <p:cTn id="6" dur="1" fill="hold">
+                                          <p:stCondLst>
+                                            <p:cond delay="0"/>
+                                          </p:stCondLst>
+                                        </p:cTn>
+                                        <p:tgtEl>
+                                          <p:spTgt spid="3">
+                                            <p:txEl>
+                                              <p:pRg st="0" end="0"/>
+                                            </p:txEl>
+                                          </p:spTgt>
+                                        </p:tgtEl>
+                                        <p:attrNameLst>
+                                          <p:attrName>style.visibility</p:attrName>
+                                        </p:attrNameLst>
+                                      </p:cBhvr>
+                                      <p:to>
+                                        <p:strVal val="visible"/>
+                                      </p:to>
+                                    </p:set>
+                                  </p:childTnLst>
+                                </p:cTn>
+                              </p:par>
+                              <p:par>
+                                <p:cTn id="7" presetID="1" presetClass="entr" presetSubtype="0" fill="hold" grpId="0" nodeType="withEffect">
+                                  <p:stCondLst>
+                                    <p:cond delay="0"/>
+                                  </p:stCondLst>
+                                  <p:childTnLst>
+                                    <p:set>
+                                      <p:cBhvr>
+                                        <p:cTn id="8" dur="1" fill="hold">
+                                          <p:stCondLst>
+                                            <p:cond delay="0"/>
+                                          </p:stCondLst>
+                                        </p:cTn>
+                                        <p:tgtEl>
+                                          <p:spTgt spid="3">
+                                            <p:txEl>
+                                              <p:pRg st="1" end="1"/>
+                                            </p:txEl>
+                                          </p:spTgt>
+                                        </p:tgtEl>
+                                        <p:attrNameLst>
+                                          <p:attrName>style.visibility</p:attrName>
+                                        </p:attrNameLst>
+                                      </p:cBhvr>
+                                      <p:to>
+                                        <p:strVal val="visible"/>
+                                      </p:to>
+                                    </p:set>
+                                  </p:childTnLst>
+                                </p:cTn>
+                              </p:par>
+                              <p:par>
+                                <p:cTn id="9" presetID="1" presetClass="entr" presetSubtype="0" fill="hold" grpId="0" nodeType="withEffect">
+                                  <p:stCondLst>
+                                    <p:cond delay="0"/>
+                                  </p:stCondLst>
+                                  <p:childTnLst>
+                                    <p:set>
+                                      <p:cBhvr>
+                                        <p:cTn id="10" dur="1" fill="hold">
+                                          <p:stCondLst>
+                                            <p:cond delay="0"/>
+                                          </p:stCondLst>
+                                        </p:cTn>
+                                        <p:tgtEl>
+                                          <p:spTgt spid="3">
+                                            <p:txEl>
+                                              <p:pRg st="2" end="2"/>
+                                            </p:txEl>
+                                          </p:spTgt>
+                                        </p:tgtEl>
+                                        <p:attrNameLst>
+                                          <p:attrName>style.visibility</p:attrName>
+                                        </p:attrNameLst>
+                                      </p:cBhvr>
+                                      <p:to>
+                                        <p:strVal val="visible"/>
+                                      </p:to>
+                                    </p:set>
+                                  </p:childTnLst>
+                                </p:cTn>
+                              </p:par>
+                              <p:par>
+                                <p:cTn id="11" presetID="1" presetClass="entr" presetSubtype="0" fill="hold" grpId="0" nodeType="withEffect">
+                                  <p:stCondLst>
+                                    <p:cond delay="0"/>
+                                  </p:stCondLst>
+                                  <p:childTnLst>
+                                    <p:set>
+                                      <p:cBhvr>
+                                        <p:cTn id="12" dur="1" fill="hold">
+                                          <p:stCondLst>
+                                            <p:cond delay="0"/>
+                                          </p:stCondLst>
+                                        </p:cTn>
+                                        <p:tgtEl>
+                                          <p:spTgt spid="3">
+                                            <p:txEl>
+                                              <p:pRg st="3" end="3"/>
+                                            </p:txEl>
+                                          </p:spTgt>
+                                        </p:tgtEl>
+                                        <p:attrNameLst>
+                                          <p:attrName>style.visibility</p:attrName>
+                                        </p:attrNameLst>
+                                      </p:cBhvr>
+                                      <p:to>
+                                        <p:strVal val="visible"/>
+                                      </p:to>
+                                    </p:set>
+                                  </p:childTnLst>
+                                </p:cTn>
+                              </p:par>
+                            </p:childTnLst>
+                          </p:cTn>
+                        </p:par>
+                      </p:childTnLst>
+                    </p:cTn>
+                  </p:par>
+                  <p:par>
+                    <p:cTn id="13" fill="hold">
+                      <p:stCondLst>
+                        <p:cond delay="indefinite"/>
+                      </p:stCondLst>
+                      <p:childTnLst>
+                        <p:par>
+                          <p:cTn id="14" fill="hold">
+                            <p:stCondLst>
+                              <p:cond delay="0"/>
+                            </p:stCondLst>
+                            <p:childTnLst>
+                              <p:par>
+                                <p:cTn id="15" presetID="1" presetClass="entr" presetSubtype="0" fill="hold" grpId="0" nodeType="clickEffect">
+                                  <p:stCondLst>
+                                    <p:cond delay="0"/>
+                                  </p:stCondLst>
+                                  <p:childTnLst>
+                                    <p:set>
+                                      <p:cBhvr>
+                                        <p:cTn id="16" dur="1" fill="hold">
+                                          <p:stCondLst>
+                                            <p:cond delay="0"/>
+                                          </p:stCondLst>
+                                        </p:cTn>
+                                        <p:tgtEl>
+                                          <p:spTgt spid="3">
+                                            <p:txEl>
+                                              <p:pRg st="4" end="4"/>
+                                            </p:txEl>
+                                          </p:spTgt>
+                                        </p:tgtEl>
+                                        <p:attrNameLst>
+                                          <p:attrName>style.visibility</p:attrName>
+                                        </p:attrNameLst>
+                                      </p:cBhvr>
+                                      <p:to>
+                                        <p:strVal val="visible"/>
+                                      </p:to>
+                                    </p:set>
+                                  </p:childTnLst>
+                                </p:cTn>
+                              </p:par>
+                              <p:par>
+                                <p:cTn id="17" presetID="1" presetClass="entr" presetSubtype="0" fill="hold" grpId="0" nodeType="withEffect">
+                                  <p:stCondLst>
+                                    <p:cond delay="0"/>
+                                  </p:stCondLst>
+                                  <p:childTnLst>
+                                    <p:set>
+                                      <p:cBhvr>
+                                        <p:cTn id="18" dur="1" fill="hold">
+                                          <p:stCondLst>
+                                            <p:cond delay="0"/>
+                                          </p:stCondLst>
+                                        </p:cTn>
+                                        <p:tgtEl>
+                                          <p:spTgt spid="3">
+                                            <p:txEl>
+                                              <p:pRg st="5" end="5"/>
+                                            </p:txEl>
+                                          </p:spTgt>
+                                        </p:tgtEl>
+                                        <p:attrNameLst>
+                                          <p:attrName>style.visibility</p:attrName>
+                                        </p:attrNameLst>
+                                      </p:cBhvr>
+                                      <p:to>
+                                        <p:strVal val="visible"/>
+                                      </p:to>
+                                    </p:set>
+                                  </p:childTnLst>
+                                </p:cTn>
+                              </p:par>
+                            </p:childTnLst>
+                          </p:cTn>
+                        </p:par>
+                      </p:childTnLst>
+                    </p:cTn>
+                  </p:par>
+                  <p:par>
+                    <p:cTn id="19" fill="hold">
+                      <p:stCondLst>
+                        <p:cond delay="indefinite"/>
+                      </p:stCondLst>
+                      <p:childTnLst>
+                        <p:par>
+                          <p:cTn id="20" fill="hold">
+                            <p:stCondLst>
+                              <p:cond delay="0"/>
+                            </p:stCondLst>
+                            <p:childTnLst>
+                              <p:par>
+                                <p:cTn id="21" presetID="1" presetClass="entr" presetSubtype="0" fill="hold" grpId="0" nodeType="clickEffect">
+                                  <p:stCondLst>
+                                    <p:cond delay="0"/>
+                                  </p:stCondLst>
+                                  <p:childTnLst>
+                                    <p:set>
+                                      <p:cBhvr>
+                                        <p:cTn id="22" dur="1" fill="hold">
+                                          <p:stCondLst>
+                                            <p:cond delay="0"/>
+                                          </p:stCondLst>
+                                        </p:cTn>
+                                        <p:tgtEl>
+                                          <p:spTgt spid="4"/>
+                                        </p:tgtEl>
+                                        <p:attrNameLst>
+                                          <p:attrName>style.visibility</p:attrName>
+                                        </p:attrNameLst>
+                                      </p:cBhvr>
+                                      <p:to>
+                                        <p:strVal val="visible"/>
+                                      </p:to>
+                                    </p:set>
+                                  </p:childTnLst>
+                                </p:cTn>
+                              </p:par>
+                            </p:childTnLst>
+                          </p:cTn>
+                        </p:par>
+                      </p:childTnLst>
+                    </p:cTn>
+                  </p:par>
+                  <p:par>
+                    <p:cTn id="23" fill="hold">
+                      <p:stCondLst>
+                        <p:cond delay="indefinite"/>
+                      </p:stCondLst>
+                      <p:childTnLst>
+                        <p:par>
+                          <p:cTn id="24" fill="hold">
+                            <p:stCondLst>
+                              <p:cond delay="0"/>
+                            </p:stCondLst>
+                            <p:childTnLst>
+                              <p:par>
+                                <p:cTn id="25" presetID="1" presetClass="entr" presetSubtype="0" fill="hold" grpId="0" nodeType="clickEffect">
+                                  <p:stCondLst>
+                                    <p:cond delay="0"/>
+                                  </p:stCondLst>
+                                  <p:childTnLst>
+                                    <p:set>
+                                      <p:cBhvr>
+                                        <p:cTn id="26" dur="1" fill="hold">
+                                          <p:stCondLst>
+                                            <p:cond delay="0"/>
+                                          </p:stCondLst>
+                                        </p:cTn>
+                                        <p:tgtEl>
+                                          <p:spTgt spid="3">
+                                            <p:txEl>
+                                              <p:pRg st="6" end="6"/>
+                                            </p:txEl>
+                                          </p:spTgt>
+                                        </p:tgtEl>
+                                        <p:attrNameLst>
+                                          <p:attrName>style.visibility</p:attrName>
+                                        </p:attrNameLst>
+                                      </p:cBhvr>
+                                      <p:to>
+                                        <p:strVal val="visible"/>
+                                      </p:to>
+                                    </p:set>
+                                  </p:childTnLst>
+                                </p:cTn>
+                              </p:par>
+                              <p:par>
+                                <p:cTn id="27" presetID="1" presetClass="entr" presetSubtype="0" fill="hold" grpId="0" nodeType="withEffect">
+                                  <p:stCondLst>
+                                    <p:cond delay="0"/>
+                                  </p:stCondLst>
+                                  <p:childTnLst>
+                                    <p:set>
+                                      <p:cBhvr>
+                                        <p:cTn id="28" dur="1" fill="hold">
+                                          <p:stCondLst>
+                                            <p:cond delay="0"/>
+                                          </p:stCondLst>
+                                        </p:cTn>
+                                        <p:tgtEl>
+                                          <p:spTgt spid="3">
+                                            <p:txEl>
+                                              <p:pRg st="7" end="7"/>
+                                            </p:txEl>
+                                          </p:spTgt>
+                                        </p:tgtEl>
+                                        <p:attrNameLst>
+                                          <p:attrName>style.visibility</p:attrName>
+                                        </p:attrNameLst>
+                                      </p:cBhvr>
+                                      <p:to>
+                                        <p:strVal val="visible"/>
+                                      </p:to>
+                                    </p:set>
+                                  </p:childTnLst>
+                                </p:cTn>
+                              </p:par>
+                            </p:childTnLst>
+                          </p:cTn>
+                        </p:par>
+                      </p:childTnLst>
+                    </p:cTn>
+                  </p:par>
+                  <p:par>
+                    <p:cTn id="29" fill="hold">
+                      <p:stCondLst>
+                        <p:cond delay="indefinite"/>
+                      </p:stCondLst>
+                      <p:childTnLst>
+                        <p:par>
+                          <p:cTn id="30" fill="hold">
+                            <p:stCondLst>
+                              <p:cond delay="0"/>
+                            </p:stCondLst>
+                            <p:childTnLst>
+                              <p:par>
+                                <p:cTn id="31" presetID="1" presetClass="entr" presetSubtype="0" fill="hold" grpId="0" nodeType="clickEffect">
+                                  <p:stCondLst>
+                                    <p:cond delay="0"/>
+                                  </p:stCondLst>
+                                  <p:childTnLst>
+                                    <p:set>
+                                      <p:cBhvr>
+                                        <p:cTn id="32" dur="1" fill="hold">
+                                          <p:stCondLst>
+                                            <p:cond delay="0"/>
+                                          </p:stCondLst>
+                                        </p:cTn>
+                                        <p:tgtEl>
+                                          <p:spTgt spid="3">
+                                            <p:txEl>
+                                              <p:pRg st="8" end="8"/>
+                                            </p:txEl>
+                                          </p:spTgt>
+                                        </p:tgtEl>
+                                        <p:attrNameLst>
+                                          <p:attrName>style.visibility</p:attrName>
+                                        </p:attrNameLst>
+                                      </p:cBhvr>
+                                      <p:to>
+                                        <p:strVal val="visible"/>
+                                      </p:to>
+                                    </p:set>
+                                  </p:childTnLst>
+                                </p:cTn>
+                              </p:par>
+                              <p:par>
+                                <p:cTn id="33" presetID="1" presetClass="entr" presetSubtype="0" fill="hold" grpId="0" nodeType="withEffect">
+                                  <p:stCondLst>
+                                    <p:cond delay="0"/>
+                                  </p:stCondLst>
+                                  <p:childTnLst>
+                                    <p:set>
+                                      <p:cBhvr>
+                                        <p:cTn id="34" dur="1" fill="hold">
+                                          <p:stCondLst>
+                                            <p:cond delay="0"/>
+                                          </p:stCondLst>
+                                        </p:cTn>
+                                        <p:tgtEl>
+                                          <p:spTgt spid="3">
+                                            <p:txEl>
+                                              <p:pRg st="9" end="9"/>
+                                            </p:txEl>
+                                          </p:spTgt>
+                                        </p:tgtEl>
+                                        <p:attrNameLst>
+                                          <p:attrName>style.visibility</p:attrName>
+                                        </p:attrNameLst>
+                                      </p:cBhvr>
+                                      <p:to>
+                                        <p:strVal val="visible"/>
+                                      </p:to>
+                                    </p:set>
+                                  </p:childTnLst>
+                                </p:cTn>
+                              </p:par>
+                              <p:par>
+                                <p:cTn id="35" presetID="1" presetClass="entr" presetSubtype="0" fill="hold" grpId="0" nodeType="withEffect">
+                                  <p:stCondLst>
+                                    <p:cond delay="0"/>
+                                  </p:stCondLst>
+                                  <p:childTnLst>
+                                    <p:set>
+                                      <p:cBhvr>
+                                        <p:cTn id="36" dur="1" fill="hold">
+                                          <p:stCondLst>
+                                            <p:cond delay="0"/>
+                                          </p:stCondLst>
+                                        </p:cTn>
+                                        <p:tgtEl>
+                                          <p:spTgt spid="3">
+                                            <p:txEl>
+                                              <p:pRg st="10" end="10"/>
+                                            </p:txEl>
+                                          </p:spTgt>
+                                        </p:tgtEl>
+                                        <p:attrNameLst>
+                                          <p:attrName>style.visibility</p:attrName>
+                                        </p:attrNameLst>
+                                      </p:cBhvr>
+                                      <p:to>
+                                        <p:strVal val="visible"/>
+                                      </p:to>
+                                    </p:set>
+                                  </p:childTnLst>
+                                </p:cTn>
+                              </p:par>
+                            </p:childTnLst>
+                          </p:cTn>
+                        </p:par>
+                      </p:childTnLst>
+                    </p:cTn>
+                  </p:par>
+                </p:childTnLst>
+              </p:cTn>
+              <p:prevCondLst>
+                <p:cond evt="onPrev" delay="0">
+                  <p:tgtEl>
+                    <p:sldTgt/>
+                  </p:tgtEl>
+                </p:cond>
+              </p:prevCondLst>
+              <p:nextCondLst>
+                <p:cond evt="onNext" delay="0">
+                  <p:tgtEl>
+                    <p:sldTgt/>
+                  </p:tgtEl>
+                </p:cond>
+              </p:nextCondLst>
+            </p:seq>
+          </p:childTnLst>
+        </p:cTn>
+      </p:par>
+    </p:tnLst>
+    <p:bldLst>
+      <p:bldP spid="3" grpId="0" uiExpand="1" build="p"/>
+      <p:bldP spid="4" grpId="0" animBg="1"/>
+    </p:bldLst>
+  </p:timing>
+</p:sld>
+</file>
+
+<file path=ppt/slides/slide11.xml><?xml version="1.0" encoding="utf-8"?>
+<p:sld xmlns:a="http://schemas.openxmlformats.org/drawingml/2006/main" xmlns:r="http://schemas.openxmlformats.org/officeDocument/2006/relationships" xmlns:p="http://schemas.openxmlformats.org/presentationml/2006/main">
+  <p:cSld>
+    <p:spTree>
+      <p:nvGrpSpPr>
+        <p:cNvPr id="1" name=""/>
+        <p:cNvGrpSpPr/>
+        <p:nvPr/>
+      </p:nvGrpSpPr>
+      <p:grpSpPr>
+        <a:xfrm>
+          <a:off x="0" y="0"/>
+          <a:ext cx="0" cy="0"/>
+          <a:chOff x="0" y="0"/>
+          <a:chExt cx="0" cy="0"/>
+        </a:xfrm>
+      </p:grpSpPr>
+      <p:sp>
+        <p:nvSpPr>
+          <p:cNvPr id="2" name="Title 1"/>
+          <p:cNvSpPr>
+            <a:spLocks noGrp="1"/>
+          </p:cNvSpPr>
+          <p:nvPr>
+            <p:ph type="title"/>
+          </p:nvPr>
+        </p:nvSpPr>
+        <p:spPr/>
+        <p:txBody>
+          <a:bodyPr/>
+          <a:lstStyle/>
+          <a:p>
+            <a:r>
+              <a:rPr lang="en-US" dirty="0" smtClean="0"/>
+              <a:t>Simple operations on RDDs</a:t>
             </a:r>
             <a:endParaRPr lang="nl-BE" dirty="0"/>
           </a:p>
@@ -3319,8 +4171,8 @@
         </p:nvSpPr>
         <p:spPr>
           <a:xfrm>
-            <a:off x="990553" y="5706544"/>
-            <a:ext cx="7199215" cy="369332"/>
+            <a:off x="637261" y="5290905"/>
+            <a:ext cx="3942169" cy="646331"/>
           </a:xfrm>
           <a:prstGeom prst="rect">
             <a:avLst/>
@@ -3340,7 +4192,64 @@
           <a:p>
             <a:r>
               <a:rPr lang="en-US" dirty="0" smtClean="0"/>
-              <a:t>Note: all operations are local, little need to communicate between workers</a:t>
+              <a:t>Note: all operations are local, little </a:t>
+            </a:r>
+            <a:r>
+              <a:rPr lang="en-US" dirty="0" smtClean="0"/>
+              <a:t>need</a:t>
+            </a:r>
+            <a:br>
+              <a:rPr lang="en-US" dirty="0" smtClean="0"/>
+            </a:br>
+            <a:r>
+              <a:rPr lang="en-US" dirty="0" smtClean="0"/>
+              <a:t>           to </a:t>
+            </a:r>
+            <a:r>
+              <a:rPr lang="en-US" dirty="0" smtClean="0"/>
+              <a:t>communicate between workers</a:t>
+            </a:r>
+            <a:endParaRPr lang="nl-BE" dirty="0"/>
+          </a:p>
+        </p:txBody>
+      </p:sp>
+      <p:sp>
+        <p:nvSpPr>
+          <p:cNvPr id="5" name="TextBox 4"/>
+          <p:cNvSpPr txBox="1"/>
+          <p:nvPr/>
+        </p:nvSpPr>
+        <p:spPr>
+          <a:xfrm>
+            <a:off x="4998026" y="5290905"/>
+            <a:ext cx="3519297" cy="646331"/>
+          </a:xfrm>
+          <a:prstGeom prst="rect">
+            <a:avLst/>
+          </a:prstGeom>
+          <a:noFill/>
+          <a:ln>
+            <a:solidFill>
+              <a:schemeClr val="tx1"/>
+            </a:solidFill>
+          </a:ln>
+        </p:spPr>
+        <p:txBody>
+          <a:bodyPr wrap="none" rtlCol="0">
+            <a:spAutoFit/>
+          </a:bodyPr>
+          <a:lstStyle/>
+          <a:p>
+            <a:r>
+              <a:rPr lang="en-US" dirty="0" smtClean="0"/>
+              <a:t>Note: lazy evaluation, results</a:t>
+            </a:r>
+            <a:br>
+              <a:rPr lang="en-US" dirty="0" smtClean="0"/>
+            </a:br>
+            <a:r>
+              <a:rPr lang="en-US" dirty="0" smtClean="0"/>
+              <a:t>           computed only when needed</a:t>
             </a:r>
             <a:endParaRPr lang="nl-BE" dirty="0"/>
           </a:p>
@@ -3745,6 +4654,51 @@
                       </p:childTnLst>
                     </p:cTn>
                   </p:par>
+                  <p:par>
+                    <p:cTn id="31" fill="hold">
+                      <p:stCondLst>
+                        <p:cond delay="indefinite"/>
+                      </p:stCondLst>
+                      <p:childTnLst>
+                        <p:par>
+                          <p:cTn id="32" fill="hold">
+                            <p:stCondLst>
+                              <p:cond delay="0"/>
+                            </p:stCondLst>
+                            <p:childTnLst>
+                              <p:par>
+                                <p:cTn id="33" presetID="1" presetClass="entr" presetSubtype="0" fill="hold" grpId="0" nodeType="clickEffect">
+                                  <p:stCondLst>
+                                    <p:cond delay="0"/>
+                                  </p:stCondLst>
+                                  <p:childTnLst>
+                                    <p:set>
+                                      <p:cBhvr>
+                                        <p:cTn id="34" dur="1" fill="hold">
+                                          <p:stCondLst>
+                                            <p:cond delay="0"/>
+                                          </p:stCondLst>
+                                        </p:cTn>
+                                        <p:tgtEl>
+                                          <p:spTgt spid="5"/>
+                                        </p:tgtEl>
+                                        <p:attrNameLst>
+                                          <p:attrName>style.visibility</p:attrName>
+                                        </p:attrNameLst>
+                                      </p:cBhvr>
+                                      <p:to>
+                                        <p:strVal val="visible"/>
+                                      </p:to>
+                                    </p:set>
+                                  </p:childTnLst>
+                                </p:cTn>
+                              </p:par>
+                            </p:childTnLst>
+                          </p:cTn>
+                        </p:par>
+                      </p:childTnLst>
+                    </p:cTn>
+                  </p:par>
                 </p:childTnLst>
               </p:cTn>
               <p:prevCondLst>
@@ -3769,12 +4723,13 @@
     <p:bldLst>
       <p:bldP spid="3" grpId="0" uiExpand="1" build="p"/>
       <p:bldP spid="4" grpId="0" animBg="1"/>
+      <p:bldP spid="5" grpId="0" animBg="1"/>
     </p:bldLst>
   </p:timing>
 </p:sld>
 </file>
 
-<file path=ppt/slides/slide11.xml><?xml version="1.0" encoding="utf-8"?>
+<file path=ppt/slides/slide12.xml><?xml version="1.0" encoding="utf-8"?>
 <p:sld xmlns:a="http://schemas.openxmlformats.org/drawingml/2006/main" xmlns:r="http://schemas.openxmlformats.org/officeDocument/2006/relationships" xmlns:p="http://schemas.openxmlformats.org/presentationml/2006/main">
   <p:cSld>
     <p:spTree>
@@ -4163,7 +5118,7 @@
 </p:sld>
 </file>
 
-<file path=ppt/slides/slide12.xml><?xml version="1.0" encoding="utf-8"?>
+<file path=ppt/slides/slide13.xml><?xml version="1.0" encoding="utf-8"?>
 <p:sld xmlns:a="http://schemas.openxmlformats.org/drawingml/2006/main" xmlns:r="http://schemas.openxmlformats.org/officeDocument/2006/relationships" xmlns:p="http://schemas.openxmlformats.org/presentationml/2006/main">
   <p:cSld>
     <p:spTree>
@@ -4978,7 +5933,7 @@
 </p:sld>
 </file>
 
-<file path=ppt/slides/slide13.xml><?xml version="1.0" encoding="utf-8"?>
+<file path=ppt/slides/slide14.xml><?xml version="1.0" encoding="utf-8"?>
 <p:sld xmlns:a="http://schemas.openxmlformats.org/drawingml/2006/main" xmlns:r="http://schemas.openxmlformats.org/officeDocument/2006/relationships" xmlns:p="http://schemas.openxmlformats.org/presentationml/2006/main">
   <p:cSld>
     <p:spTree>
@@ -5592,7 +6547,7 @@
 </p:sld>
 </file>
 
-<file path=ppt/slides/slide14.xml><?xml version="1.0" encoding="utf-8"?>
+<file path=ppt/slides/slide15.xml><?xml version="1.0" encoding="utf-8"?>
 <p:sld xmlns:a="http://schemas.openxmlformats.org/drawingml/2006/main" xmlns:r="http://schemas.openxmlformats.org/officeDocument/2006/relationships" xmlns:p="http://schemas.openxmlformats.org/presentationml/2006/main">
   <p:cSld>
     <p:spTree>
@@ -5671,7 +6626,7 @@
 </p:sld>
 </file>
 
-<file path=ppt/slides/slide15.xml><?xml version="1.0" encoding="utf-8"?>
+<file path=ppt/slides/slide16.xml><?xml version="1.0" encoding="utf-8"?>
 <p:sld xmlns:a="http://schemas.openxmlformats.org/drawingml/2006/main" xmlns:r="http://schemas.openxmlformats.org/officeDocument/2006/relationships" xmlns:p="http://schemas.openxmlformats.org/presentationml/2006/main">
   <p:cSld>
     <p:spTree>
@@ -6199,7 +7154,7 @@
 </p:sld>
 </file>
 
-<file path=ppt/slides/slide16.xml><?xml version="1.0" encoding="utf-8"?>
+<file path=ppt/slides/slide17.xml><?xml version="1.0" encoding="utf-8"?>
 <p:sld xmlns:a="http://schemas.openxmlformats.org/drawingml/2006/main" xmlns:r="http://schemas.openxmlformats.org/officeDocument/2006/relationships" xmlns:p="http://schemas.openxmlformats.org/presentationml/2006/main">
   <p:cSld>
     <p:spTree>
@@ -6772,7 +7727,7 @@
 </p:sld>
 </file>
 
-<file path=ppt/slides/slide17.xml><?xml version="1.0" encoding="utf-8"?>
+<file path=ppt/slides/slide18.xml><?xml version="1.0" encoding="utf-8"?>
 <p:sld xmlns:a="http://schemas.openxmlformats.org/drawingml/2006/main" xmlns:r="http://schemas.openxmlformats.org/officeDocument/2006/relationships" xmlns:p="http://schemas.openxmlformats.org/presentationml/2006/main">
   <p:cSld>
     <p:spTree>
@@ -6841,10 +7796,17 @@
   <p:clrMapOvr>
     <a:masterClrMapping/>
   </p:clrMapOvr>
+  <p:timing>
+    <p:tnLst>
+      <p:par>
+        <p:cTn id="1" dur="indefinite" restart="never" nodeType="tmRoot"/>
+      </p:par>
+    </p:tnLst>
+  </p:timing>
 </p:sld>
 </file>
 
-<file path=ppt/slides/slide18.xml><?xml version="1.0" encoding="utf-8"?>
+<file path=ppt/slides/slide19.xml><?xml version="1.0" encoding="utf-8"?>
 <p:sld xmlns:a="http://schemas.openxmlformats.org/drawingml/2006/main" xmlns:r="http://schemas.openxmlformats.org/officeDocument/2006/relationships" xmlns:p="http://schemas.openxmlformats.org/presentationml/2006/main">
   <p:cSld>
     <p:spTree>
@@ -7178,7 +8140,79 @@
 </p:sld>
 </file>
 
-<file path=ppt/slides/slide19.xml><?xml version="1.0" encoding="utf-8"?>
+<file path=ppt/slides/slide2.xml><?xml version="1.0" encoding="utf-8"?>
+<p:sld xmlns:a="http://schemas.openxmlformats.org/drawingml/2006/main" xmlns:r="http://schemas.openxmlformats.org/officeDocument/2006/relationships" xmlns:p="http://schemas.openxmlformats.org/presentationml/2006/main">
+  <p:cSld>
+    <p:spTree>
+      <p:nvGrpSpPr>
+        <p:cNvPr id="1" name=""/>
+        <p:cNvGrpSpPr/>
+        <p:nvPr/>
+      </p:nvGrpSpPr>
+      <p:grpSpPr>
+        <a:xfrm>
+          <a:off x="0" y="0"/>
+          <a:ext cx="0" cy="0"/>
+          <a:chOff x="0" y="0"/>
+          <a:chExt cx="0" cy="0"/>
+        </a:xfrm>
+      </p:grpSpPr>
+      <p:sp>
+        <p:nvSpPr>
+          <p:cNvPr id="2" name="Title 1"/>
+          <p:cNvSpPr>
+            <a:spLocks noGrp="1"/>
+          </p:cNvSpPr>
+          <p:nvPr>
+            <p:ph type="title"/>
+          </p:nvPr>
+        </p:nvSpPr>
+        <p:spPr/>
+        <p:txBody>
+          <a:bodyPr/>
+          <a:lstStyle/>
+          <a:p>
+            <a:r>
+              <a:rPr lang="en-US" dirty="0" smtClean="0"/>
+              <a:t>Introduction</a:t>
+            </a:r>
+            <a:endParaRPr lang="nl-BE" dirty="0"/>
+          </a:p>
+        </p:txBody>
+      </p:sp>
+      <p:sp>
+        <p:nvSpPr>
+          <p:cNvPr id="3" name="Text Placeholder 2"/>
+          <p:cNvSpPr>
+            <a:spLocks noGrp="1"/>
+          </p:cNvSpPr>
+          <p:nvPr>
+            <p:ph type="body" idx="1"/>
+          </p:nvPr>
+        </p:nvSpPr>
+        <p:spPr/>
+        <p:txBody>
+          <a:bodyPr/>
+          <a:lstStyle/>
+          <a:p>
+            <a:endParaRPr lang="nl-BE"/>
+          </a:p>
+        </p:txBody>
+      </p:sp>
+    </p:spTree>
+    <p:extLst>
+      <p:ext uri="{BB962C8B-B14F-4D97-AF65-F5344CB8AC3E}">
+        <p14:creationId xmlns:p14="http://schemas.microsoft.com/office/powerpoint/2010/main" val="130417879"/>
+      </p:ext>
+    </p:extLst>
+  </p:cSld>
+  <p:clrMapOvr>
+    <a:masterClrMapping/>
+  </p:clrMapOvr>
+</p:sld>
+</file>
+
+<file path=ppt/slides/slide20.xml><?xml version="1.0" encoding="utf-8"?>
 <p:sld xmlns:a="http://schemas.openxmlformats.org/drawingml/2006/main" xmlns:r="http://schemas.openxmlformats.org/officeDocument/2006/relationships" xmlns:p="http://schemas.openxmlformats.org/presentationml/2006/main">
   <p:cSld>
     <p:spTree>
@@ -7643,79 +8677,7 @@
 </p:sld>
 </file>
 
-<file path=ppt/slides/slide2.xml><?xml version="1.0" encoding="utf-8"?>
-<p:sld xmlns:a="http://schemas.openxmlformats.org/drawingml/2006/main" xmlns:r="http://schemas.openxmlformats.org/officeDocument/2006/relationships" xmlns:p="http://schemas.openxmlformats.org/presentationml/2006/main">
-  <p:cSld>
-    <p:spTree>
-      <p:nvGrpSpPr>
-        <p:cNvPr id="1" name=""/>
-        <p:cNvGrpSpPr/>
-        <p:nvPr/>
-      </p:nvGrpSpPr>
-      <p:grpSpPr>
-        <a:xfrm>
-          <a:off x="0" y="0"/>
-          <a:ext cx="0" cy="0"/>
-          <a:chOff x="0" y="0"/>
-          <a:chExt cx="0" cy="0"/>
-        </a:xfrm>
-      </p:grpSpPr>
-      <p:sp>
-        <p:nvSpPr>
-          <p:cNvPr id="2" name="Title 1"/>
-          <p:cNvSpPr>
-            <a:spLocks noGrp="1"/>
-          </p:cNvSpPr>
-          <p:nvPr>
-            <p:ph type="title"/>
-          </p:nvPr>
-        </p:nvSpPr>
-        <p:spPr/>
-        <p:txBody>
-          <a:bodyPr/>
-          <a:lstStyle/>
-          <a:p>
-            <a:r>
-              <a:rPr lang="en-US" dirty="0" smtClean="0"/>
-              <a:t>Introduction</a:t>
-            </a:r>
-            <a:endParaRPr lang="nl-BE" dirty="0"/>
-          </a:p>
-        </p:txBody>
-      </p:sp>
-      <p:sp>
-        <p:nvSpPr>
-          <p:cNvPr id="3" name="Text Placeholder 2"/>
-          <p:cNvSpPr>
-            <a:spLocks noGrp="1"/>
-          </p:cNvSpPr>
-          <p:nvPr>
-            <p:ph type="body" idx="1"/>
-          </p:nvPr>
-        </p:nvSpPr>
-        <p:spPr/>
-        <p:txBody>
-          <a:bodyPr/>
-          <a:lstStyle/>
-          <a:p>
-            <a:endParaRPr lang="nl-BE"/>
-          </a:p>
-        </p:txBody>
-      </p:sp>
-    </p:spTree>
-    <p:extLst>
-      <p:ext uri="{BB962C8B-B14F-4D97-AF65-F5344CB8AC3E}">
-        <p14:creationId xmlns:p14="http://schemas.microsoft.com/office/powerpoint/2010/main" val="130417879"/>
-      </p:ext>
-    </p:extLst>
-  </p:cSld>
-  <p:clrMapOvr>
-    <a:masterClrMapping/>
-  </p:clrMapOvr>
-</p:sld>
-</file>
-
-<file path=ppt/slides/slide20.xml><?xml version="1.0" encoding="utf-8"?>
+<file path=ppt/slides/slide21.xml><?xml version="1.0" encoding="utf-8"?>
 <p:sld xmlns:a="http://schemas.openxmlformats.org/drawingml/2006/main" xmlns:r="http://schemas.openxmlformats.org/officeDocument/2006/relationships" xmlns:p="http://schemas.openxmlformats.org/presentationml/2006/main">
   <p:cSld>
     <p:spTree>
@@ -8230,7 +9192,7 @@
 </p:sld>
 </file>
 
-<file path=ppt/slides/slide21.xml><?xml version="1.0" encoding="utf-8"?>
+<file path=ppt/slides/slide22.xml><?xml version="1.0" encoding="utf-8"?>
 <p:sld xmlns:a="http://schemas.openxmlformats.org/drawingml/2006/main" xmlns:r="http://schemas.openxmlformats.org/officeDocument/2006/relationships" xmlns:p="http://schemas.openxmlformats.org/presentationml/2006/main">
   <p:cSld>
     <p:spTree>
@@ -8309,7 +9271,7 @@
 </p:sld>
 </file>
 
-<file path=ppt/slides/slide22.xml><?xml version="1.0" encoding="utf-8"?>
+<file path=ppt/slides/slide23.xml><?xml version="1.0" encoding="utf-8"?>
 <p:sld xmlns:a="http://schemas.openxmlformats.org/drawingml/2006/main" xmlns:r="http://schemas.openxmlformats.org/officeDocument/2006/relationships" xmlns:p="http://schemas.openxmlformats.org/presentationml/2006/main">
   <p:cSld>
     <p:spTree>
@@ -11755,6 +12717,2236 @@
           <a:p>
             <a:r>
               <a:rPr lang="en-US" dirty="0" smtClean="0"/>
+              <a:t>Architecture</a:t>
+            </a:r>
+            <a:endParaRPr lang="nl-BE" dirty="0"/>
+          </a:p>
+        </p:txBody>
+      </p:sp>
+      <p:grpSp>
+        <p:nvGrpSpPr>
+          <p:cNvPr id="25" name="Group 24"/>
+          <p:cNvGrpSpPr/>
+          <p:nvPr/>
+        </p:nvGrpSpPr>
+        <p:grpSpPr>
+          <a:xfrm>
+            <a:off x="2319879" y="4213084"/>
+            <a:ext cx="2652383" cy="1362075"/>
+            <a:chOff x="2319879" y="4213084"/>
+            <a:chExt cx="2652383" cy="1362075"/>
+          </a:xfrm>
+        </p:grpSpPr>
+        <p:sp>
+          <p:nvSpPr>
+            <p:cNvPr id="8" name="laptop"/>
+            <p:cNvSpPr>
+              <a:spLocks noEditPoints="1" noChangeArrowheads="1"/>
+            </p:cNvSpPr>
+            <p:nvPr/>
+          </p:nvSpPr>
+          <p:spPr bwMode="auto">
+            <a:xfrm>
+              <a:off x="3162512" y="4213084"/>
+              <a:ext cx="1809750" cy="1362075"/>
+            </a:xfrm>
+            <a:custGeom>
+              <a:avLst/>
+              <a:gdLst>
+                <a:gd name="T0" fmla="*/ 3362 w 21600"/>
+                <a:gd name="T1" fmla="*/ 0 h 21600"/>
+                <a:gd name="T2" fmla="*/ 3362 w 21600"/>
+                <a:gd name="T3" fmla="*/ 7173 h 21600"/>
+                <a:gd name="T4" fmla="*/ 18327 w 21600"/>
+                <a:gd name="T5" fmla="*/ 0 h 21600"/>
+                <a:gd name="T6" fmla="*/ 18327 w 21600"/>
+                <a:gd name="T7" fmla="*/ 7173 h 21600"/>
+                <a:gd name="T8" fmla="*/ 10800 w 21600"/>
+                <a:gd name="T9" fmla="*/ 0 h 21600"/>
+                <a:gd name="T10" fmla="*/ 10800 w 21600"/>
+                <a:gd name="T11" fmla="*/ 21600 h 21600"/>
+                <a:gd name="T12" fmla="*/ 0 w 21600"/>
+                <a:gd name="T13" fmla="*/ 21600 h 21600"/>
+                <a:gd name="T14" fmla="*/ 21600 w 21600"/>
+                <a:gd name="T15" fmla="*/ 21600 h 21600"/>
+                <a:gd name="T16" fmla="*/ 4445 w 21600"/>
+                <a:gd name="T17" fmla="*/ 1858 h 21600"/>
+                <a:gd name="T18" fmla="*/ 17311 w 21600"/>
+                <a:gd name="T19" fmla="*/ 12323 h 21600"/>
+              </a:gdLst>
+              <a:ahLst/>
+              <a:cxnLst>
+                <a:cxn ang="0">
+                  <a:pos x="T0" y="T1"/>
+                </a:cxn>
+                <a:cxn ang="0">
+                  <a:pos x="T2" y="T3"/>
+                </a:cxn>
+                <a:cxn ang="0">
+                  <a:pos x="T4" y="T5"/>
+                </a:cxn>
+                <a:cxn ang="0">
+                  <a:pos x="T6" y="T7"/>
+                </a:cxn>
+                <a:cxn ang="0">
+                  <a:pos x="T8" y="T9"/>
+                </a:cxn>
+                <a:cxn ang="0">
+                  <a:pos x="T10" y="T11"/>
+                </a:cxn>
+                <a:cxn ang="0">
+                  <a:pos x="T12" y="T13"/>
+                </a:cxn>
+                <a:cxn ang="0">
+                  <a:pos x="T14" y="T15"/>
+                </a:cxn>
+              </a:cxnLst>
+              <a:rect l="T16" t="T17" r="T18" b="T19"/>
+              <a:pathLst>
+                <a:path w="21600" h="21600" extrusionOk="0">
+                  <a:moveTo>
+                    <a:pt x="3362" y="0"/>
+                  </a:moveTo>
+                  <a:lnTo>
+                    <a:pt x="18327" y="0"/>
+                  </a:lnTo>
+                  <a:lnTo>
+                    <a:pt x="18327" y="14347"/>
+                  </a:lnTo>
+                  <a:lnTo>
+                    <a:pt x="3362" y="14347"/>
+                  </a:lnTo>
+                  <a:lnTo>
+                    <a:pt x="3362" y="0"/>
+                  </a:lnTo>
+                  <a:close/>
+                </a:path>
+                <a:path w="21600" h="21600" extrusionOk="0">
+                  <a:moveTo>
+                    <a:pt x="3340" y="15068"/>
+                  </a:moveTo>
+                  <a:lnTo>
+                    <a:pt x="0" y="19877"/>
+                  </a:lnTo>
+                  <a:lnTo>
+                    <a:pt x="21600" y="19877"/>
+                  </a:lnTo>
+                  <a:lnTo>
+                    <a:pt x="18327" y="15068"/>
+                  </a:lnTo>
+                  <a:lnTo>
+                    <a:pt x="3340" y="15068"/>
+                  </a:lnTo>
+                  <a:close/>
+                </a:path>
+                <a:path w="21600" h="21600" extrusionOk="0">
+                  <a:moveTo>
+                    <a:pt x="0" y="19877"/>
+                  </a:moveTo>
+                  <a:lnTo>
+                    <a:pt x="0" y="21600"/>
+                  </a:lnTo>
+                  <a:lnTo>
+                    <a:pt x="21600" y="21600"/>
+                  </a:lnTo>
+                  <a:lnTo>
+                    <a:pt x="21600" y="19877"/>
+                  </a:lnTo>
+                  <a:lnTo>
+                    <a:pt x="0" y="19877"/>
+                  </a:lnTo>
+                  <a:close/>
+                </a:path>
+                <a:path w="21600" h="21600" extrusionOk="0">
+                  <a:moveTo>
+                    <a:pt x="4186" y="1523"/>
+                  </a:moveTo>
+                  <a:lnTo>
+                    <a:pt x="17547" y="1523"/>
+                  </a:lnTo>
+                  <a:lnTo>
+                    <a:pt x="17547" y="12744"/>
+                  </a:lnTo>
+                  <a:lnTo>
+                    <a:pt x="4186" y="12744"/>
+                  </a:lnTo>
+                  <a:lnTo>
+                    <a:pt x="4186" y="1523"/>
+                  </a:lnTo>
+                  <a:close/>
+                </a:path>
+                <a:path w="21600" h="21600" extrusionOk="0">
+                  <a:moveTo>
+                    <a:pt x="3318" y="15549"/>
+                  </a:moveTo>
+                  <a:lnTo>
+                    <a:pt x="2917" y="16110"/>
+                  </a:lnTo>
+                  <a:lnTo>
+                    <a:pt x="18727" y="16110"/>
+                  </a:lnTo>
+                  <a:lnTo>
+                    <a:pt x="18327" y="15549"/>
+                  </a:lnTo>
+                  <a:lnTo>
+                    <a:pt x="3318" y="15549"/>
+                  </a:lnTo>
+                  <a:close/>
+                </a:path>
+                <a:path w="21600" h="21600" extrusionOk="0">
+                  <a:moveTo>
+                    <a:pt x="6213" y="18314"/>
+                  </a:moveTo>
+                  <a:lnTo>
+                    <a:pt x="5946" y="18875"/>
+                  </a:lnTo>
+                  <a:lnTo>
+                    <a:pt x="15766" y="18875"/>
+                  </a:lnTo>
+                  <a:lnTo>
+                    <a:pt x="15499" y="18314"/>
+                  </a:lnTo>
+                  <a:lnTo>
+                    <a:pt x="6213" y="18314"/>
+                  </a:lnTo>
+                  <a:close/>
+                </a:path>
+                <a:path w="21600" h="21600" extrusionOk="0">
+                  <a:moveTo>
+                    <a:pt x="2828" y="16471"/>
+                  </a:moveTo>
+                  <a:lnTo>
+                    <a:pt x="2405" y="17072"/>
+                  </a:lnTo>
+                  <a:lnTo>
+                    <a:pt x="19284" y="17072"/>
+                  </a:lnTo>
+                  <a:lnTo>
+                    <a:pt x="18839" y="16471"/>
+                  </a:lnTo>
+                  <a:lnTo>
+                    <a:pt x="2828" y="16471"/>
+                  </a:lnTo>
+                  <a:close/>
+                </a:path>
+                <a:path w="21600" h="21600" extrusionOk="0">
+                  <a:moveTo>
+                    <a:pt x="2316" y="17352"/>
+                  </a:moveTo>
+                  <a:lnTo>
+                    <a:pt x="1871" y="17953"/>
+                  </a:lnTo>
+                  <a:lnTo>
+                    <a:pt x="19863" y="17953"/>
+                  </a:lnTo>
+                  <a:lnTo>
+                    <a:pt x="19395" y="17352"/>
+                  </a:lnTo>
+                  <a:lnTo>
+                    <a:pt x="2316" y="17352"/>
+                  </a:lnTo>
+                  <a:close/>
+                </a:path>
+              </a:pathLst>
+            </a:custGeom>
+            <a:solidFill>
+              <a:srgbClr val="C0C0C0"/>
+            </a:solidFill>
+            <a:ln w="9525">
+              <a:solidFill>
+                <a:srgbClr val="000000"/>
+              </a:solidFill>
+              <a:miter lim="800000"/>
+              <a:headEnd/>
+              <a:tailEnd/>
+            </a:ln>
+          </p:spPr>
+          <p:txBody>
+            <a:bodyPr vert="horz" wrap="square" lIns="91440" tIns="45720" rIns="91440" bIns="45720" numCol="1" anchor="t" anchorCtr="0" compatLnSpc="1">
+              <a:prstTxWarp prst="textNoShape">
+                <a:avLst/>
+              </a:prstTxWarp>
+            </a:bodyPr>
+            <a:lstStyle/>
+            <a:p>
+              <a:endParaRPr lang="nl-BE"/>
+            </a:p>
+          </p:txBody>
+        </p:sp>
+        <p:sp>
+          <p:nvSpPr>
+            <p:cNvPr id="9" name="TextBox 8"/>
+            <p:cNvSpPr txBox="1"/>
+            <p:nvPr/>
+          </p:nvSpPr>
+          <p:spPr>
+            <a:xfrm>
+              <a:off x="2319879" y="4742995"/>
+              <a:ext cx="737061" cy="369332"/>
+            </a:xfrm>
+            <a:prstGeom prst="rect">
+              <a:avLst/>
+            </a:prstGeom>
+            <a:noFill/>
+            <a:ln>
+              <a:solidFill>
+                <a:schemeClr val="tx1"/>
+              </a:solidFill>
+            </a:ln>
+          </p:spPr>
+          <p:txBody>
+            <a:bodyPr wrap="none" rtlCol="0">
+              <a:spAutoFit/>
+            </a:bodyPr>
+            <a:lstStyle/>
+            <a:p>
+              <a:r>
+                <a:rPr lang="en-US" dirty="0" smtClean="0"/>
+                <a:t>driver</a:t>
+              </a:r>
+              <a:endParaRPr lang="nl-BE" dirty="0"/>
+            </a:p>
+          </p:txBody>
+        </p:sp>
+      </p:grpSp>
+      <p:grpSp>
+        <p:nvGrpSpPr>
+          <p:cNvPr id="24" name="Group 23"/>
+          <p:cNvGrpSpPr/>
+          <p:nvPr/>
+        </p:nvGrpSpPr>
+        <p:grpSpPr>
+          <a:xfrm>
+            <a:off x="862445" y="1901535"/>
+            <a:ext cx="6639791" cy="1485900"/>
+            <a:chOff x="862445" y="1901535"/>
+            <a:chExt cx="6639791" cy="1485900"/>
+          </a:xfrm>
+        </p:grpSpPr>
+        <p:sp>
+          <p:nvSpPr>
+            <p:cNvPr id="4" name="modem"/>
+            <p:cNvSpPr>
+              <a:spLocks noEditPoints="1" noChangeArrowheads="1"/>
+            </p:cNvSpPr>
+            <p:nvPr/>
+          </p:nvSpPr>
+          <p:spPr bwMode="auto">
+            <a:xfrm>
+              <a:off x="5912430" y="2493516"/>
+              <a:ext cx="1248497" cy="630820"/>
+            </a:xfrm>
+            <a:custGeom>
+              <a:avLst/>
+              <a:gdLst>
+                <a:gd name="T0" fmla="*/ 0 w 21600"/>
+                <a:gd name="T1" fmla="*/ 5152 h 21600"/>
+                <a:gd name="T2" fmla="*/ 2941 w 21600"/>
+                <a:gd name="T3" fmla="*/ 0 h 21600"/>
+                <a:gd name="T4" fmla="*/ 18625 w 21600"/>
+                <a:gd name="T5" fmla="*/ 0 h 21600"/>
+                <a:gd name="T6" fmla="*/ 21600 w 21600"/>
+                <a:gd name="T7" fmla="*/ 5152 h 21600"/>
+                <a:gd name="T8" fmla="*/ 21600 w 21600"/>
+                <a:gd name="T9" fmla="*/ 21600 h 21600"/>
+                <a:gd name="T10" fmla="*/ 0 w 21600"/>
+                <a:gd name="T11" fmla="*/ 21600 h 21600"/>
+                <a:gd name="T12" fmla="*/ 10800 w 21600"/>
+                <a:gd name="T13" fmla="*/ 0 h 21600"/>
+                <a:gd name="T14" fmla="*/ 10800 w 21600"/>
+                <a:gd name="T15" fmla="*/ 21600 h 21600"/>
+                <a:gd name="T16" fmla="*/ 0 w 21600"/>
+                <a:gd name="T17" fmla="*/ 13376 h 21600"/>
+                <a:gd name="T18" fmla="*/ 21600 w 21600"/>
+                <a:gd name="T19" fmla="*/ 13376 h 21600"/>
+                <a:gd name="T20" fmla="*/ 400 w 21600"/>
+                <a:gd name="T21" fmla="*/ 22400 h 21600"/>
+                <a:gd name="T22" fmla="*/ 21200 w 21600"/>
+                <a:gd name="T23" fmla="*/ 30000 h 21600"/>
+              </a:gdLst>
+              <a:ahLst/>
+              <a:cxnLst>
+                <a:cxn ang="0">
+                  <a:pos x="T0" y="T1"/>
+                </a:cxn>
+                <a:cxn ang="0">
+                  <a:pos x="T2" y="T3"/>
+                </a:cxn>
+                <a:cxn ang="0">
+                  <a:pos x="T4" y="T5"/>
+                </a:cxn>
+                <a:cxn ang="0">
+                  <a:pos x="T6" y="T7"/>
+                </a:cxn>
+                <a:cxn ang="0">
+                  <a:pos x="T8" y="T9"/>
+                </a:cxn>
+                <a:cxn ang="0">
+                  <a:pos x="T10" y="T11"/>
+                </a:cxn>
+                <a:cxn ang="0">
+                  <a:pos x="T12" y="T13"/>
+                </a:cxn>
+                <a:cxn ang="0">
+                  <a:pos x="T14" y="T15"/>
+                </a:cxn>
+                <a:cxn ang="0">
+                  <a:pos x="T16" y="T17"/>
+                </a:cxn>
+                <a:cxn ang="0">
+                  <a:pos x="T18" y="T19"/>
+                </a:cxn>
+              </a:cxnLst>
+              <a:rect l="T20" t="T21" r="T22" b="T23"/>
+              <a:pathLst>
+                <a:path w="21600" h="21600" extrusionOk="0">
+                  <a:moveTo>
+                    <a:pt x="0" y="5152"/>
+                  </a:moveTo>
+                  <a:lnTo>
+                    <a:pt x="2941" y="0"/>
+                  </a:lnTo>
+                  <a:lnTo>
+                    <a:pt x="18625" y="0"/>
+                  </a:lnTo>
+                  <a:lnTo>
+                    <a:pt x="21600" y="5152"/>
+                  </a:lnTo>
+                  <a:lnTo>
+                    <a:pt x="21600" y="21600"/>
+                  </a:lnTo>
+                  <a:lnTo>
+                    <a:pt x="0" y="21600"/>
+                  </a:lnTo>
+                  <a:lnTo>
+                    <a:pt x="0" y="5152"/>
+                  </a:lnTo>
+                  <a:close/>
+                </a:path>
+                <a:path w="21600" h="21600" extrusionOk="0">
+                  <a:moveTo>
+                    <a:pt x="0" y="5251"/>
+                  </a:moveTo>
+                  <a:lnTo>
+                    <a:pt x="21600" y="5251"/>
+                  </a:lnTo>
+                  <a:moveTo>
+                    <a:pt x="1961" y="11791"/>
+                  </a:moveTo>
+                  <a:lnTo>
+                    <a:pt x="1961" y="14268"/>
+                  </a:lnTo>
+                  <a:lnTo>
+                    <a:pt x="2806" y="14268"/>
+                  </a:lnTo>
+                  <a:lnTo>
+                    <a:pt x="2806" y="11791"/>
+                  </a:lnTo>
+                  <a:lnTo>
+                    <a:pt x="1961" y="11791"/>
+                  </a:lnTo>
+                  <a:close/>
+                </a:path>
+                <a:path w="21600" h="21600" extrusionOk="0">
+                  <a:moveTo>
+                    <a:pt x="3685" y="11791"/>
+                  </a:moveTo>
+                  <a:lnTo>
+                    <a:pt x="3685" y="14268"/>
+                  </a:lnTo>
+                  <a:lnTo>
+                    <a:pt x="4530" y="14268"/>
+                  </a:lnTo>
+                  <a:lnTo>
+                    <a:pt x="4530" y="11791"/>
+                  </a:lnTo>
+                  <a:lnTo>
+                    <a:pt x="3685" y="11791"/>
+                  </a:lnTo>
+                  <a:close/>
+                </a:path>
+                <a:path w="21600" h="21600" extrusionOk="0">
+                  <a:moveTo>
+                    <a:pt x="5408" y="11791"/>
+                  </a:moveTo>
+                  <a:lnTo>
+                    <a:pt x="5408" y="14268"/>
+                  </a:lnTo>
+                  <a:lnTo>
+                    <a:pt x="6254" y="14268"/>
+                  </a:lnTo>
+                  <a:lnTo>
+                    <a:pt x="6254" y="11791"/>
+                  </a:lnTo>
+                  <a:lnTo>
+                    <a:pt x="5408" y="11791"/>
+                  </a:lnTo>
+                  <a:close/>
+                </a:path>
+                <a:path w="21600" h="21600" extrusionOk="0">
+                  <a:moveTo>
+                    <a:pt x="7132" y="11791"/>
+                  </a:moveTo>
+                  <a:lnTo>
+                    <a:pt x="7132" y="14268"/>
+                  </a:lnTo>
+                  <a:lnTo>
+                    <a:pt x="7977" y="14268"/>
+                  </a:lnTo>
+                  <a:lnTo>
+                    <a:pt x="7977" y="11791"/>
+                  </a:lnTo>
+                  <a:lnTo>
+                    <a:pt x="7132" y="11791"/>
+                  </a:lnTo>
+                  <a:close/>
+                </a:path>
+              </a:pathLst>
+            </a:custGeom>
+            <a:solidFill>
+              <a:srgbClr val="C0C0C0"/>
+            </a:solidFill>
+            <a:ln w="9525">
+              <a:solidFill>
+                <a:srgbClr val="000000"/>
+              </a:solidFill>
+              <a:miter lim="800000"/>
+              <a:headEnd/>
+              <a:tailEnd/>
+            </a:ln>
+          </p:spPr>
+          <p:txBody>
+            <a:bodyPr vert="horz" wrap="square" lIns="91440" tIns="45720" rIns="91440" bIns="45720" numCol="1" anchor="t" anchorCtr="0" compatLnSpc="1">
+              <a:prstTxWarp prst="textNoShape">
+                <a:avLst/>
+              </a:prstTxWarp>
+            </a:bodyPr>
+            <a:lstStyle/>
+            <a:p>
+              <a:endParaRPr lang="nl-BE"/>
+            </a:p>
+          </p:txBody>
+        </p:sp>
+        <p:sp>
+          <p:nvSpPr>
+            <p:cNvPr id="5" name="modem"/>
+            <p:cNvSpPr>
+              <a:spLocks noEditPoints="1" noChangeArrowheads="1"/>
+            </p:cNvSpPr>
+            <p:nvPr/>
+          </p:nvSpPr>
+          <p:spPr bwMode="auto">
+            <a:xfrm>
+              <a:off x="4348014" y="2493516"/>
+              <a:ext cx="1248497" cy="630820"/>
+            </a:xfrm>
+            <a:custGeom>
+              <a:avLst/>
+              <a:gdLst>
+                <a:gd name="T0" fmla="*/ 0 w 21600"/>
+                <a:gd name="T1" fmla="*/ 5152 h 21600"/>
+                <a:gd name="T2" fmla="*/ 2941 w 21600"/>
+                <a:gd name="T3" fmla="*/ 0 h 21600"/>
+                <a:gd name="T4" fmla="*/ 18625 w 21600"/>
+                <a:gd name="T5" fmla="*/ 0 h 21600"/>
+                <a:gd name="T6" fmla="*/ 21600 w 21600"/>
+                <a:gd name="T7" fmla="*/ 5152 h 21600"/>
+                <a:gd name="T8" fmla="*/ 21600 w 21600"/>
+                <a:gd name="T9" fmla="*/ 21600 h 21600"/>
+                <a:gd name="T10" fmla="*/ 0 w 21600"/>
+                <a:gd name="T11" fmla="*/ 21600 h 21600"/>
+                <a:gd name="T12" fmla="*/ 10800 w 21600"/>
+                <a:gd name="T13" fmla="*/ 0 h 21600"/>
+                <a:gd name="T14" fmla="*/ 10800 w 21600"/>
+                <a:gd name="T15" fmla="*/ 21600 h 21600"/>
+                <a:gd name="T16" fmla="*/ 0 w 21600"/>
+                <a:gd name="T17" fmla="*/ 13376 h 21600"/>
+                <a:gd name="T18" fmla="*/ 21600 w 21600"/>
+                <a:gd name="T19" fmla="*/ 13376 h 21600"/>
+                <a:gd name="T20" fmla="*/ 400 w 21600"/>
+                <a:gd name="T21" fmla="*/ 22400 h 21600"/>
+                <a:gd name="T22" fmla="*/ 21200 w 21600"/>
+                <a:gd name="T23" fmla="*/ 30000 h 21600"/>
+              </a:gdLst>
+              <a:ahLst/>
+              <a:cxnLst>
+                <a:cxn ang="0">
+                  <a:pos x="T0" y="T1"/>
+                </a:cxn>
+                <a:cxn ang="0">
+                  <a:pos x="T2" y="T3"/>
+                </a:cxn>
+                <a:cxn ang="0">
+                  <a:pos x="T4" y="T5"/>
+                </a:cxn>
+                <a:cxn ang="0">
+                  <a:pos x="T6" y="T7"/>
+                </a:cxn>
+                <a:cxn ang="0">
+                  <a:pos x="T8" y="T9"/>
+                </a:cxn>
+                <a:cxn ang="0">
+                  <a:pos x="T10" y="T11"/>
+                </a:cxn>
+                <a:cxn ang="0">
+                  <a:pos x="T12" y="T13"/>
+                </a:cxn>
+                <a:cxn ang="0">
+                  <a:pos x="T14" y="T15"/>
+                </a:cxn>
+                <a:cxn ang="0">
+                  <a:pos x="T16" y="T17"/>
+                </a:cxn>
+                <a:cxn ang="0">
+                  <a:pos x="T18" y="T19"/>
+                </a:cxn>
+              </a:cxnLst>
+              <a:rect l="T20" t="T21" r="T22" b="T23"/>
+              <a:pathLst>
+                <a:path w="21600" h="21600" extrusionOk="0">
+                  <a:moveTo>
+                    <a:pt x="0" y="5152"/>
+                  </a:moveTo>
+                  <a:lnTo>
+                    <a:pt x="2941" y="0"/>
+                  </a:lnTo>
+                  <a:lnTo>
+                    <a:pt x="18625" y="0"/>
+                  </a:lnTo>
+                  <a:lnTo>
+                    <a:pt x="21600" y="5152"/>
+                  </a:lnTo>
+                  <a:lnTo>
+                    <a:pt x="21600" y="21600"/>
+                  </a:lnTo>
+                  <a:lnTo>
+                    <a:pt x="0" y="21600"/>
+                  </a:lnTo>
+                  <a:lnTo>
+                    <a:pt x="0" y="5152"/>
+                  </a:lnTo>
+                  <a:close/>
+                </a:path>
+                <a:path w="21600" h="21600" extrusionOk="0">
+                  <a:moveTo>
+                    <a:pt x="0" y="5251"/>
+                  </a:moveTo>
+                  <a:lnTo>
+                    <a:pt x="21600" y="5251"/>
+                  </a:lnTo>
+                  <a:moveTo>
+                    <a:pt x="1961" y="11791"/>
+                  </a:moveTo>
+                  <a:lnTo>
+                    <a:pt x="1961" y="14268"/>
+                  </a:lnTo>
+                  <a:lnTo>
+                    <a:pt x="2806" y="14268"/>
+                  </a:lnTo>
+                  <a:lnTo>
+                    <a:pt x="2806" y="11791"/>
+                  </a:lnTo>
+                  <a:lnTo>
+                    <a:pt x="1961" y="11791"/>
+                  </a:lnTo>
+                  <a:close/>
+                </a:path>
+                <a:path w="21600" h="21600" extrusionOk="0">
+                  <a:moveTo>
+                    <a:pt x="3685" y="11791"/>
+                  </a:moveTo>
+                  <a:lnTo>
+                    <a:pt x="3685" y="14268"/>
+                  </a:lnTo>
+                  <a:lnTo>
+                    <a:pt x="4530" y="14268"/>
+                  </a:lnTo>
+                  <a:lnTo>
+                    <a:pt x="4530" y="11791"/>
+                  </a:lnTo>
+                  <a:lnTo>
+                    <a:pt x="3685" y="11791"/>
+                  </a:lnTo>
+                  <a:close/>
+                </a:path>
+                <a:path w="21600" h="21600" extrusionOk="0">
+                  <a:moveTo>
+                    <a:pt x="5408" y="11791"/>
+                  </a:moveTo>
+                  <a:lnTo>
+                    <a:pt x="5408" y="14268"/>
+                  </a:lnTo>
+                  <a:lnTo>
+                    <a:pt x="6254" y="14268"/>
+                  </a:lnTo>
+                  <a:lnTo>
+                    <a:pt x="6254" y="11791"/>
+                  </a:lnTo>
+                  <a:lnTo>
+                    <a:pt x="5408" y="11791"/>
+                  </a:lnTo>
+                  <a:close/>
+                </a:path>
+                <a:path w="21600" h="21600" extrusionOk="0">
+                  <a:moveTo>
+                    <a:pt x="7132" y="11791"/>
+                  </a:moveTo>
+                  <a:lnTo>
+                    <a:pt x="7132" y="14268"/>
+                  </a:lnTo>
+                  <a:lnTo>
+                    <a:pt x="7977" y="14268"/>
+                  </a:lnTo>
+                  <a:lnTo>
+                    <a:pt x="7977" y="11791"/>
+                  </a:lnTo>
+                  <a:lnTo>
+                    <a:pt x="7132" y="11791"/>
+                  </a:lnTo>
+                  <a:close/>
+                </a:path>
+              </a:pathLst>
+            </a:custGeom>
+            <a:solidFill>
+              <a:srgbClr val="C0C0C0"/>
+            </a:solidFill>
+            <a:ln w="9525">
+              <a:solidFill>
+                <a:srgbClr val="000000"/>
+              </a:solidFill>
+              <a:miter lim="800000"/>
+              <a:headEnd/>
+              <a:tailEnd/>
+            </a:ln>
+          </p:spPr>
+          <p:txBody>
+            <a:bodyPr vert="horz" wrap="square" lIns="91440" tIns="45720" rIns="91440" bIns="45720" numCol="1" anchor="t" anchorCtr="0" compatLnSpc="1">
+              <a:prstTxWarp prst="textNoShape">
+                <a:avLst/>
+              </a:prstTxWarp>
+            </a:bodyPr>
+            <a:lstStyle/>
+            <a:p>
+              <a:endParaRPr lang="nl-BE"/>
+            </a:p>
+          </p:txBody>
+        </p:sp>
+        <p:sp>
+          <p:nvSpPr>
+            <p:cNvPr id="6" name="modem"/>
+            <p:cNvSpPr>
+              <a:spLocks noEditPoints="1" noChangeArrowheads="1"/>
+            </p:cNvSpPr>
+            <p:nvPr/>
+          </p:nvSpPr>
+          <p:spPr bwMode="auto">
+            <a:xfrm>
+              <a:off x="2783599" y="2493516"/>
+              <a:ext cx="1248497" cy="630820"/>
+            </a:xfrm>
+            <a:custGeom>
+              <a:avLst/>
+              <a:gdLst>
+                <a:gd name="T0" fmla="*/ 0 w 21600"/>
+                <a:gd name="T1" fmla="*/ 5152 h 21600"/>
+                <a:gd name="T2" fmla="*/ 2941 w 21600"/>
+                <a:gd name="T3" fmla="*/ 0 h 21600"/>
+                <a:gd name="T4" fmla="*/ 18625 w 21600"/>
+                <a:gd name="T5" fmla="*/ 0 h 21600"/>
+                <a:gd name="T6" fmla="*/ 21600 w 21600"/>
+                <a:gd name="T7" fmla="*/ 5152 h 21600"/>
+                <a:gd name="T8" fmla="*/ 21600 w 21600"/>
+                <a:gd name="T9" fmla="*/ 21600 h 21600"/>
+                <a:gd name="T10" fmla="*/ 0 w 21600"/>
+                <a:gd name="T11" fmla="*/ 21600 h 21600"/>
+                <a:gd name="T12" fmla="*/ 10800 w 21600"/>
+                <a:gd name="T13" fmla="*/ 0 h 21600"/>
+                <a:gd name="T14" fmla="*/ 10800 w 21600"/>
+                <a:gd name="T15" fmla="*/ 21600 h 21600"/>
+                <a:gd name="T16" fmla="*/ 0 w 21600"/>
+                <a:gd name="T17" fmla="*/ 13376 h 21600"/>
+                <a:gd name="T18" fmla="*/ 21600 w 21600"/>
+                <a:gd name="T19" fmla="*/ 13376 h 21600"/>
+                <a:gd name="T20" fmla="*/ 400 w 21600"/>
+                <a:gd name="T21" fmla="*/ 22400 h 21600"/>
+                <a:gd name="T22" fmla="*/ 21200 w 21600"/>
+                <a:gd name="T23" fmla="*/ 30000 h 21600"/>
+              </a:gdLst>
+              <a:ahLst/>
+              <a:cxnLst>
+                <a:cxn ang="0">
+                  <a:pos x="T0" y="T1"/>
+                </a:cxn>
+                <a:cxn ang="0">
+                  <a:pos x="T2" y="T3"/>
+                </a:cxn>
+                <a:cxn ang="0">
+                  <a:pos x="T4" y="T5"/>
+                </a:cxn>
+                <a:cxn ang="0">
+                  <a:pos x="T6" y="T7"/>
+                </a:cxn>
+                <a:cxn ang="0">
+                  <a:pos x="T8" y="T9"/>
+                </a:cxn>
+                <a:cxn ang="0">
+                  <a:pos x="T10" y="T11"/>
+                </a:cxn>
+                <a:cxn ang="0">
+                  <a:pos x="T12" y="T13"/>
+                </a:cxn>
+                <a:cxn ang="0">
+                  <a:pos x="T14" y="T15"/>
+                </a:cxn>
+                <a:cxn ang="0">
+                  <a:pos x="T16" y="T17"/>
+                </a:cxn>
+                <a:cxn ang="0">
+                  <a:pos x="T18" y="T19"/>
+                </a:cxn>
+              </a:cxnLst>
+              <a:rect l="T20" t="T21" r="T22" b="T23"/>
+              <a:pathLst>
+                <a:path w="21600" h="21600" extrusionOk="0">
+                  <a:moveTo>
+                    <a:pt x="0" y="5152"/>
+                  </a:moveTo>
+                  <a:lnTo>
+                    <a:pt x="2941" y="0"/>
+                  </a:lnTo>
+                  <a:lnTo>
+                    <a:pt x="18625" y="0"/>
+                  </a:lnTo>
+                  <a:lnTo>
+                    <a:pt x="21600" y="5152"/>
+                  </a:lnTo>
+                  <a:lnTo>
+                    <a:pt x="21600" y="21600"/>
+                  </a:lnTo>
+                  <a:lnTo>
+                    <a:pt x="0" y="21600"/>
+                  </a:lnTo>
+                  <a:lnTo>
+                    <a:pt x="0" y="5152"/>
+                  </a:lnTo>
+                  <a:close/>
+                </a:path>
+                <a:path w="21600" h="21600" extrusionOk="0">
+                  <a:moveTo>
+                    <a:pt x="0" y="5251"/>
+                  </a:moveTo>
+                  <a:lnTo>
+                    <a:pt x="21600" y="5251"/>
+                  </a:lnTo>
+                  <a:moveTo>
+                    <a:pt x="1961" y="11791"/>
+                  </a:moveTo>
+                  <a:lnTo>
+                    <a:pt x="1961" y="14268"/>
+                  </a:lnTo>
+                  <a:lnTo>
+                    <a:pt x="2806" y="14268"/>
+                  </a:lnTo>
+                  <a:lnTo>
+                    <a:pt x="2806" y="11791"/>
+                  </a:lnTo>
+                  <a:lnTo>
+                    <a:pt x="1961" y="11791"/>
+                  </a:lnTo>
+                  <a:close/>
+                </a:path>
+                <a:path w="21600" h="21600" extrusionOk="0">
+                  <a:moveTo>
+                    <a:pt x="3685" y="11791"/>
+                  </a:moveTo>
+                  <a:lnTo>
+                    <a:pt x="3685" y="14268"/>
+                  </a:lnTo>
+                  <a:lnTo>
+                    <a:pt x="4530" y="14268"/>
+                  </a:lnTo>
+                  <a:lnTo>
+                    <a:pt x="4530" y="11791"/>
+                  </a:lnTo>
+                  <a:lnTo>
+                    <a:pt x="3685" y="11791"/>
+                  </a:lnTo>
+                  <a:close/>
+                </a:path>
+                <a:path w="21600" h="21600" extrusionOk="0">
+                  <a:moveTo>
+                    <a:pt x="5408" y="11791"/>
+                  </a:moveTo>
+                  <a:lnTo>
+                    <a:pt x="5408" y="14268"/>
+                  </a:lnTo>
+                  <a:lnTo>
+                    <a:pt x="6254" y="14268"/>
+                  </a:lnTo>
+                  <a:lnTo>
+                    <a:pt x="6254" y="11791"/>
+                  </a:lnTo>
+                  <a:lnTo>
+                    <a:pt x="5408" y="11791"/>
+                  </a:lnTo>
+                  <a:close/>
+                </a:path>
+                <a:path w="21600" h="21600" extrusionOk="0">
+                  <a:moveTo>
+                    <a:pt x="7132" y="11791"/>
+                  </a:moveTo>
+                  <a:lnTo>
+                    <a:pt x="7132" y="14268"/>
+                  </a:lnTo>
+                  <a:lnTo>
+                    <a:pt x="7977" y="14268"/>
+                  </a:lnTo>
+                  <a:lnTo>
+                    <a:pt x="7977" y="11791"/>
+                  </a:lnTo>
+                  <a:lnTo>
+                    <a:pt x="7132" y="11791"/>
+                  </a:lnTo>
+                  <a:close/>
+                </a:path>
+              </a:pathLst>
+            </a:custGeom>
+            <a:solidFill>
+              <a:srgbClr val="C0C0C0"/>
+            </a:solidFill>
+            <a:ln w="9525">
+              <a:solidFill>
+                <a:srgbClr val="000000"/>
+              </a:solidFill>
+              <a:miter lim="800000"/>
+              <a:headEnd/>
+              <a:tailEnd/>
+            </a:ln>
+          </p:spPr>
+          <p:txBody>
+            <a:bodyPr vert="horz" wrap="square" lIns="91440" tIns="45720" rIns="91440" bIns="45720" numCol="1" anchor="t" anchorCtr="0" compatLnSpc="1">
+              <a:prstTxWarp prst="textNoShape">
+                <a:avLst/>
+              </a:prstTxWarp>
+            </a:bodyPr>
+            <a:lstStyle/>
+            <a:p>
+              <a:endParaRPr lang="nl-BE"/>
+            </a:p>
+          </p:txBody>
+        </p:sp>
+        <p:sp>
+          <p:nvSpPr>
+            <p:cNvPr id="7" name="modem"/>
+            <p:cNvSpPr>
+              <a:spLocks noEditPoints="1" noChangeArrowheads="1"/>
+            </p:cNvSpPr>
+            <p:nvPr/>
+          </p:nvSpPr>
+          <p:spPr bwMode="auto">
+            <a:xfrm>
+              <a:off x="1219184" y="2493516"/>
+              <a:ext cx="1248497" cy="630820"/>
+            </a:xfrm>
+            <a:custGeom>
+              <a:avLst/>
+              <a:gdLst>
+                <a:gd name="T0" fmla="*/ 0 w 21600"/>
+                <a:gd name="T1" fmla="*/ 5152 h 21600"/>
+                <a:gd name="T2" fmla="*/ 2941 w 21600"/>
+                <a:gd name="T3" fmla="*/ 0 h 21600"/>
+                <a:gd name="T4" fmla="*/ 18625 w 21600"/>
+                <a:gd name="T5" fmla="*/ 0 h 21600"/>
+                <a:gd name="T6" fmla="*/ 21600 w 21600"/>
+                <a:gd name="T7" fmla="*/ 5152 h 21600"/>
+                <a:gd name="T8" fmla="*/ 21600 w 21600"/>
+                <a:gd name="T9" fmla="*/ 21600 h 21600"/>
+                <a:gd name="T10" fmla="*/ 0 w 21600"/>
+                <a:gd name="T11" fmla="*/ 21600 h 21600"/>
+                <a:gd name="T12" fmla="*/ 10800 w 21600"/>
+                <a:gd name="T13" fmla="*/ 0 h 21600"/>
+                <a:gd name="T14" fmla="*/ 10800 w 21600"/>
+                <a:gd name="T15" fmla="*/ 21600 h 21600"/>
+                <a:gd name="T16" fmla="*/ 0 w 21600"/>
+                <a:gd name="T17" fmla="*/ 13376 h 21600"/>
+                <a:gd name="T18" fmla="*/ 21600 w 21600"/>
+                <a:gd name="T19" fmla="*/ 13376 h 21600"/>
+                <a:gd name="T20" fmla="*/ 400 w 21600"/>
+                <a:gd name="T21" fmla="*/ 22400 h 21600"/>
+                <a:gd name="T22" fmla="*/ 21200 w 21600"/>
+                <a:gd name="T23" fmla="*/ 30000 h 21600"/>
+              </a:gdLst>
+              <a:ahLst/>
+              <a:cxnLst>
+                <a:cxn ang="0">
+                  <a:pos x="T0" y="T1"/>
+                </a:cxn>
+                <a:cxn ang="0">
+                  <a:pos x="T2" y="T3"/>
+                </a:cxn>
+                <a:cxn ang="0">
+                  <a:pos x="T4" y="T5"/>
+                </a:cxn>
+                <a:cxn ang="0">
+                  <a:pos x="T6" y="T7"/>
+                </a:cxn>
+                <a:cxn ang="0">
+                  <a:pos x="T8" y="T9"/>
+                </a:cxn>
+                <a:cxn ang="0">
+                  <a:pos x="T10" y="T11"/>
+                </a:cxn>
+                <a:cxn ang="0">
+                  <a:pos x="T12" y="T13"/>
+                </a:cxn>
+                <a:cxn ang="0">
+                  <a:pos x="T14" y="T15"/>
+                </a:cxn>
+                <a:cxn ang="0">
+                  <a:pos x="T16" y="T17"/>
+                </a:cxn>
+                <a:cxn ang="0">
+                  <a:pos x="T18" y="T19"/>
+                </a:cxn>
+              </a:cxnLst>
+              <a:rect l="T20" t="T21" r="T22" b="T23"/>
+              <a:pathLst>
+                <a:path w="21600" h="21600" extrusionOk="0">
+                  <a:moveTo>
+                    <a:pt x="0" y="5152"/>
+                  </a:moveTo>
+                  <a:lnTo>
+                    <a:pt x="2941" y="0"/>
+                  </a:lnTo>
+                  <a:lnTo>
+                    <a:pt x="18625" y="0"/>
+                  </a:lnTo>
+                  <a:lnTo>
+                    <a:pt x="21600" y="5152"/>
+                  </a:lnTo>
+                  <a:lnTo>
+                    <a:pt x="21600" y="21600"/>
+                  </a:lnTo>
+                  <a:lnTo>
+                    <a:pt x="0" y="21600"/>
+                  </a:lnTo>
+                  <a:lnTo>
+                    <a:pt x="0" y="5152"/>
+                  </a:lnTo>
+                  <a:close/>
+                </a:path>
+                <a:path w="21600" h="21600" extrusionOk="0">
+                  <a:moveTo>
+                    <a:pt x="0" y="5251"/>
+                  </a:moveTo>
+                  <a:lnTo>
+                    <a:pt x="21600" y="5251"/>
+                  </a:lnTo>
+                  <a:moveTo>
+                    <a:pt x="1961" y="11791"/>
+                  </a:moveTo>
+                  <a:lnTo>
+                    <a:pt x="1961" y="14268"/>
+                  </a:lnTo>
+                  <a:lnTo>
+                    <a:pt x="2806" y="14268"/>
+                  </a:lnTo>
+                  <a:lnTo>
+                    <a:pt x="2806" y="11791"/>
+                  </a:lnTo>
+                  <a:lnTo>
+                    <a:pt x="1961" y="11791"/>
+                  </a:lnTo>
+                  <a:close/>
+                </a:path>
+                <a:path w="21600" h="21600" extrusionOk="0">
+                  <a:moveTo>
+                    <a:pt x="3685" y="11791"/>
+                  </a:moveTo>
+                  <a:lnTo>
+                    <a:pt x="3685" y="14268"/>
+                  </a:lnTo>
+                  <a:lnTo>
+                    <a:pt x="4530" y="14268"/>
+                  </a:lnTo>
+                  <a:lnTo>
+                    <a:pt x="4530" y="11791"/>
+                  </a:lnTo>
+                  <a:lnTo>
+                    <a:pt x="3685" y="11791"/>
+                  </a:lnTo>
+                  <a:close/>
+                </a:path>
+                <a:path w="21600" h="21600" extrusionOk="0">
+                  <a:moveTo>
+                    <a:pt x="5408" y="11791"/>
+                  </a:moveTo>
+                  <a:lnTo>
+                    <a:pt x="5408" y="14268"/>
+                  </a:lnTo>
+                  <a:lnTo>
+                    <a:pt x="6254" y="14268"/>
+                  </a:lnTo>
+                  <a:lnTo>
+                    <a:pt x="6254" y="11791"/>
+                  </a:lnTo>
+                  <a:lnTo>
+                    <a:pt x="5408" y="11791"/>
+                  </a:lnTo>
+                  <a:close/>
+                </a:path>
+                <a:path w="21600" h="21600" extrusionOk="0">
+                  <a:moveTo>
+                    <a:pt x="7132" y="11791"/>
+                  </a:moveTo>
+                  <a:lnTo>
+                    <a:pt x="7132" y="14268"/>
+                  </a:lnTo>
+                  <a:lnTo>
+                    <a:pt x="7977" y="14268"/>
+                  </a:lnTo>
+                  <a:lnTo>
+                    <a:pt x="7977" y="11791"/>
+                  </a:lnTo>
+                  <a:lnTo>
+                    <a:pt x="7132" y="11791"/>
+                  </a:lnTo>
+                  <a:close/>
+                </a:path>
+              </a:pathLst>
+            </a:custGeom>
+            <a:solidFill>
+              <a:srgbClr val="C0C0C0"/>
+            </a:solidFill>
+            <a:ln w="9525">
+              <a:solidFill>
+                <a:srgbClr val="000000"/>
+              </a:solidFill>
+              <a:miter lim="800000"/>
+              <a:headEnd/>
+              <a:tailEnd/>
+            </a:ln>
+          </p:spPr>
+          <p:txBody>
+            <a:bodyPr vert="horz" wrap="square" lIns="91440" tIns="45720" rIns="91440" bIns="45720" numCol="1" anchor="t" anchorCtr="0" compatLnSpc="1">
+              <a:prstTxWarp prst="textNoShape">
+                <a:avLst/>
+              </a:prstTxWarp>
+            </a:bodyPr>
+            <a:lstStyle/>
+            <a:p>
+              <a:endParaRPr lang="nl-BE"/>
+            </a:p>
+          </p:txBody>
+        </p:sp>
+        <p:sp>
+          <p:nvSpPr>
+            <p:cNvPr id="10" name="Rectangle 9"/>
+            <p:cNvSpPr/>
+            <p:nvPr/>
+          </p:nvSpPr>
+          <p:spPr>
+            <a:xfrm>
+              <a:off x="862445" y="1901535"/>
+              <a:ext cx="6639791" cy="1485900"/>
+            </a:xfrm>
+            <a:prstGeom prst="rect">
+              <a:avLst/>
+            </a:prstGeom>
+            <a:solidFill>
+              <a:schemeClr val="accent1">
+                <a:alpha val="22000"/>
+              </a:schemeClr>
+            </a:solidFill>
+          </p:spPr>
+          <p:style>
+            <a:lnRef idx="2">
+              <a:schemeClr val="accent1">
+                <a:shade val="50000"/>
+              </a:schemeClr>
+            </a:lnRef>
+            <a:fillRef idx="1">
+              <a:schemeClr val="accent1"/>
+            </a:fillRef>
+            <a:effectRef idx="0">
+              <a:schemeClr val="accent1"/>
+            </a:effectRef>
+            <a:fontRef idx="minor">
+              <a:schemeClr val="lt1"/>
+            </a:fontRef>
+          </p:style>
+          <p:txBody>
+            <a:bodyPr rtlCol="0" anchor="ctr"/>
+            <a:lstStyle/>
+            <a:p>
+              <a:pPr algn="ctr"/>
+              <a:endParaRPr lang="nl-BE"/>
+            </a:p>
+          </p:txBody>
+        </p:sp>
+        <p:sp>
+          <p:nvSpPr>
+            <p:cNvPr id="11" name="TextBox 10"/>
+            <p:cNvSpPr txBox="1"/>
+            <p:nvPr/>
+          </p:nvSpPr>
+          <p:spPr>
+            <a:xfrm>
+              <a:off x="6451995" y="1999492"/>
+              <a:ext cx="927754" cy="369332"/>
+            </a:xfrm>
+            <a:prstGeom prst="rect">
+              <a:avLst/>
+            </a:prstGeom>
+            <a:solidFill>
+              <a:schemeClr val="bg1"/>
+            </a:solidFill>
+            <a:ln>
+              <a:solidFill>
+                <a:schemeClr val="tx1"/>
+              </a:solidFill>
+            </a:ln>
+          </p:spPr>
+          <p:txBody>
+            <a:bodyPr wrap="none" rtlCol="0">
+              <a:spAutoFit/>
+            </a:bodyPr>
+            <a:lstStyle/>
+            <a:p>
+              <a:r>
+                <a:rPr lang="en-US" dirty="0" smtClean="0"/>
+                <a:t>workers</a:t>
+              </a:r>
+              <a:endParaRPr lang="nl-BE" dirty="0"/>
+            </a:p>
+          </p:txBody>
+        </p:sp>
+      </p:grpSp>
+      <p:grpSp>
+        <p:nvGrpSpPr>
+          <p:cNvPr id="26" name="Group 25"/>
+          <p:cNvGrpSpPr/>
+          <p:nvPr/>
+        </p:nvGrpSpPr>
+        <p:grpSpPr>
+          <a:xfrm>
+            <a:off x="6642688" y="4291443"/>
+            <a:ext cx="1867884" cy="2018026"/>
+            <a:chOff x="6642688" y="4291443"/>
+            <a:chExt cx="1867884" cy="2018026"/>
+          </a:xfrm>
+        </p:grpSpPr>
+        <p:sp>
+          <p:nvSpPr>
+            <p:cNvPr id="12" name="mainfrm"/>
+            <p:cNvSpPr>
+              <a:spLocks noEditPoints="1" noChangeArrowheads="1"/>
+            </p:cNvSpPr>
+            <p:nvPr/>
+          </p:nvSpPr>
+          <p:spPr bwMode="auto">
+            <a:xfrm>
+              <a:off x="6963497" y="4291443"/>
+              <a:ext cx="1185501" cy="1497158"/>
+            </a:xfrm>
+            <a:custGeom>
+              <a:avLst/>
+              <a:gdLst>
+                <a:gd name="T0" fmla="*/ 0 w 21600"/>
+                <a:gd name="T1" fmla="*/ 0 h 21600"/>
+                <a:gd name="T2" fmla="*/ 10800 w 21600"/>
+                <a:gd name="T3" fmla="*/ 0 h 21600"/>
+                <a:gd name="T4" fmla="*/ 21600 w 21600"/>
+                <a:gd name="T5" fmla="*/ 0 h 21600"/>
+                <a:gd name="T6" fmla="*/ 21600 w 21600"/>
+                <a:gd name="T7" fmla="*/ 10800 h 21600"/>
+                <a:gd name="T8" fmla="*/ 20603 w 21600"/>
+                <a:gd name="T9" fmla="*/ 21600 h 21600"/>
+                <a:gd name="T10" fmla="*/ 10800 w 21600"/>
+                <a:gd name="T11" fmla="*/ 21600 h 21600"/>
+                <a:gd name="T12" fmla="*/ 1163 w 21600"/>
+                <a:gd name="T13" fmla="*/ 21600 h 21600"/>
+                <a:gd name="T14" fmla="*/ 0 w 21600"/>
+                <a:gd name="T15" fmla="*/ 10800 h 21600"/>
+                <a:gd name="T16" fmla="*/ 332 w 21600"/>
+                <a:gd name="T17" fmla="*/ 22174 h 21600"/>
+                <a:gd name="T18" fmla="*/ 21579 w 21600"/>
+                <a:gd name="T19" fmla="*/ 27914 h 21600"/>
+              </a:gdLst>
+              <a:ahLst/>
+              <a:cxnLst>
+                <a:cxn ang="0">
+                  <a:pos x="T0" y="T1"/>
+                </a:cxn>
+                <a:cxn ang="0">
+                  <a:pos x="T2" y="T3"/>
+                </a:cxn>
+                <a:cxn ang="0">
+                  <a:pos x="T4" y="T5"/>
+                </a:cxn>
+                <a:cxn ang="0">
+                  <a:pos x="T6" y="T7"/>
+                </a:cxn>
+                <a:cxn ang="0">
+                  <a:pos x="T8" y="T9"/>
+                </a:cxn>
+                <a:cxn ang="0">
+                  <a:pos x="T10" y="T11"/>
+                </a:cxn>
+                <a:cxn ang="0">
+                  <a:pos x="T12" y="T13"/>
+                </a:cxn>
+                <a:cxn ang="0">
+                  <a:pos x="T14" y="T15"/>
+                </a:cxn>
+              </a:cxnLst>
+              <a:rect l="T16" t="T17" r="T18" b="T19"/>
+              <a:pathLst>
+                <a:path w="21600" h="21600" extrusionOk="0">
+                  <a:moveTo>
+                    <a:pt x="21600" y="10885"/>
+                  </a:moveTo>
+                  <a:lnTo>
+                    <a:pt x="21600" y="0"/>
+                  </a:lnTo>
+                  <a:lnTo>
+                    <a:pt x="10634" y="0"/>
+                  </a:lnTo>
+                  <a:lnTo>
+                    <a:pt x="0" y="0"/>
+                  </a:lnTo>
+                  <a:lnTo>
+                    <a:pt x="0" y="10885"/>
+                  </a:lnTo>
+                  <a:lnTo>
+                    <a:pt x="0" y="19729"/>
+                  </a:lnTo>
+                  <a:lnTo>
+                    <a:pt x="1163" y="19729"/>
+                  </a:lnTo>
+                  <a:lnTo>
+                    <a:pt x="1163" y="21600"/>
+                  </a:lnTo>
+                  <a:lnTo>
+                    <a:pt x="10800" y="21600"/>
+                  </a:lnTo>
+                  <a:lnTo>
+                    <a:pt x="20603" y="21600"/>
+                  </a:lnTo>
+                  <a:lnTo>
+                    <a:pt x="20603" y="19729"/>
+                  </a:lnTo>
+                  <a:lnTo>
+                    <a:pt x="21600" y="19729"/>
+                  </a:lnTo>
+                  <a:lnTo>
+                    <a:pt x="21600" y="10885"/>
+                  </a:lnTo>
+                  <a:close/>
+                </a:path>
+                <a:path w="21600" h="21600" extrusionOk="0">
+                  <a:moveTo>
+                    <a:pt x="1163" y="19729"/>
+                  </a:moveTo>
+                  <a:lnTo>
+                    <a:pt x="4320" y="19729"/>
+                  </a:lnTo>
+                  <a:lnTo>
+                    <a:pt x="16449" y="19729"/>
+                  </a:lnTo>
+                  <a:lnTo>
+                    <a:pt x="20603" y="19729"/>
+                  </a:lnTo>
+                  <a:lnTo>
+                    <a:pt x="1163" y="19729"/>
+                  </a:lnTo>
+                  <a:moveTo>
+                    <a:pt x="1495" y="2381"/>
+                  </a:moveTo>
+                  <a:lnTo>
+                    <a:pt x="2160" y="2381"/>
+                  </a:lnTo>
+                  <a:lnTo>
+                    <a:pt x="4985" y="2381"/>
+                  </a:lnTo>
+                  <a:lnTo>
+                    <a:pt x="5982" y="2381"/>
+                  </a:lnTo>
+                  <a:lnTo>
+                    <a:pt x="1495" y="2381"/>
+                  </a:lnTo>
+                  <a:lnTo>
+                    <a:pt x="1495" y="3402"/>
+                  </a:lnTo>
+                  <a:lnTo>
+                    <a:pt x="2160" y="3402"/>
+                  </a:lnTo>
+                  <a:lnTo>
+                    <a:pt x="4985" y="3402"/>
+                  </a:lnTo>
+                  <a:lnTo>
+                    <a:pt x="5982" y="3402"/>
+                  </a:lnTo>
+                  <a:lnTo>
+                    <a:pt x="1495" y="3402"/>
+                  </a:lnTo>
+                  <a:lnTo>
+                    <a:pt x="1495" y="4422"/>
+                  </a:lnTo>
+                  <a:lnTo>
+                    <a:pt x="2160" y="4422"/>
+                  </a:lnTo>
+                  <a:lnTo>
+                    <a:pt x="4985" y="4422"/>
+                  </a:lnTo>
+                  <a:lnTo>
+                    <a:pt x="5982" y="4422"/>
+                  </a:lnTo>
+                  <a:lnTo>
+                    <a:pt x="1495" y="4422"/>
+                  </a:lnTo>
+                  <a:lnTo>
+                    <a:pt x="1495" y="5443"/>
+                  </a:lnTo>
+                  <a:lnTo>
+                    <a:pt x="2160" y="5443"/>
+                  </a:lnTo>
+                  <a:lnTo>
+                    <a:pt x="4985" y="5443"/>
+                  </a:lnTo>
+                  <a:lnTo>
+                    <a:pt x="5982" y="5443"/>
+                  </a:lnTo>
+                  <a:lnTo>
+                    <a:pt x="1495" y="5443"/>
+                  </a:lnTo>
+                  <a:lnTo>
+                    <a:pt x="1495" y="6463"/>
+                  </a:lnTo>
+                  <a:lnTo>
+                    <a:pt x="2160" y="6463"/>
+                  </a:lnTo>
+                  <a:lnTo>
+                    <a:pt x="4985" y="6463"/>
+                  </a:lnTo>
+                  <a:lnTo>
+                    <a:pt x="5982" y="6463"/>
+                  </a:lnTo>
+                  <a:lnTo>
+                    <a:pt x="1495" y="6463"/>
+                  </a:lnTo>
+                  <a:lnTo>
+                    <a:pt x="1495" y="7483"/>
+                  </a:lnTo>
+                  <a:lnTo>
+                    <a:pt x="2160" y="7483"/>
+                  </a:lnTo>
+                  <a:lnTo>
+                    <a:pt x="4985" y="7483"/>
+                  </a:lnTo>
+                  <a:lnTo>
+                    <a:pt x="5982" y="7483"/>
+                  </a:lnTo>
+                  <a:lnTo>
+                    <a:pt x="1495" y="7483"/>
+                  </a:lnTo>
+                  <a:lnTo>
+                    <a:pt x="1495" y="8504"/>
+                  </a:lnTo>
+                  <a:lnTo>
+                    <a:pt x="2160" y="8504"/>
+                  </a:lnTo>
+                  <a:lnTo>
+                    <a:pt x="4985" y="8504"/>
+                  </a:lnTo>
+                  <a:lnTo>
+                    <a:pt x="5982" y="8504"/>
+                  </a:lnTo>
+                  <a:lnTo>
+                    <a:pt x="1495" y="8504"/>
+                  </a:lnTo>
+                  <a:lnTo>
+                    <a:pt x="1495" y="9524"/>
+                  </a:lnTo>
+                  <a:lnTo>
+                    <a:pt x="2160" y="9524"/>
+                  </a:lnTo>
+                  <a:lnTo>
+                    <a:pt x="4985" y="9524"/>
+                  </a:lnTo>
+                  <a:lnTo>
+                    <a:pt x="5982" y="9524"/>
+                  </a:lnTo>
+                  <a:lnTo>
+                    <a:pt x="1495" y="9524"/>
+                  </a:lnTo>
+                  <a:lnTo>
+                    <a:pt x="1495" y="10545"/>
+                  </a:lnTo>
+                  <a:lnTo>
+                    <a:pt x="2160" y="10545"/>
+                  </a:lnTo>
+                  <a:lnTo>
+                    <a:pt x="4985" y="10545"/>
+                  </a:lnTo>
+                  <a:lnTo>
+                    <a:pt x="5982" y="10545"/>
+                  </a:lnTo>
+                  <a:lnTo>
+                    <a:pt x="1495" y="10545"/>
+                  </a:lnTo>
+                  <a:lnTo>
+                    <a:pt x="1495" y="11565"/>
+                  </a:lnTo>
+                  <a:lnTo>
+                    <a:pt x="2160" y="11565"/>
+                  </a:lnTo>
+                  <a:lnTo>
+                    <a:pt x="4985" y="11565"/>
+                  </a:lnTo>
+                  <a:lnTo>
+                    <a:pt x="5982" y="11565"/>
+                  </a:lnTo>
+                  <a:lnTo>
+                    <a:pt x="1495" y="11565"/>
+                  </a:lnTo>
+                  <a:lnTo>
+                    <a:pt x="1495" y="12586"/>
+                  </a:lnTo>
+                  <a:lnTo>
+                    <a:pt x="2160" y="12586"/>
+                  </a:lnTo>
+                  <a:lnTo>
+                    <a:pt x="4985" y="12586"/>
+                  </a:lnTo>
+                  <a:lnTo>
+                    <a:pt x="5982" y="12586"/>
+                  </a:lnTo>
+                  <a:lnTo>
+                    <a:pt x="1495" y="12586"/>
+                  </a:lnTo>
+                  <a:lnTo>
+                    <a:pt x="1495" y="13606"/>
+                  </a:lnTo>
+                  <a:lnTo>
+                    <a:pt x="2160" y="13606"/>
+                  </a:lnTo>
+                  <a:lnTo>
+                    <a:pt x="4985" y="13606"/>
+                  </a:lnTo>
+                  <a:lnTo>
+                    <a:pt x="5982" y="13606"/>
+                  </a:lnTo>
+                  <a:lnTo>
+                    <a:pt x="1495" y="13606"/>
+                  </a:lnTo>
+                  <a:lnTo>
+                    <a:pt x="1495" y="14627"/>
+                  </a:lnTo>
+                  <a:lnTo>
+                    <a:pt x="2160" y="14627"/>
+                  </a:lnTo>
+                  <a:lnTo>
+                    <a:pt x="4985" y="14627"/>
+                  </a:lnTo>
+                  <a:lnTo>
+                    <a:pt x="5982" y="14627"/>
+                  </a:lnTo>
+                  <a:lnTo>
+                    <a:pt x="1495" y="14627"/>
+                  </a:lnTo>
+                  <a:lnTo>
+                    <a:pt x="1495" y="15647"/>
+                  </a:lnTo>
+                  <a:lnTo>
+                    <a:pt x="2160" y="15647"/>
+                  </a:lnTo>
+                  <a:lnTo>
+                    <a:pt x="4985" y="15647"/>
+                  </a:lnTo>
+                  <a:lnTo>
+                    <a:pt x="5982" y="15647"/>
+                  </a:lnTo>
+                  <a:lnTo>
+                    <a:pt x="1495" y="15647"/>
+                  </a:lnTo>
+                  <a:lnTo>
+                    <a:pt x="1495" y="16668"/>
+                  </a:lnTo>
+                  <a:lnTo>
+                    <a:pt x="2160" y="16668"/>
+                  </a:lnTo>
+                  <a:lnTo>
+                    <a:pt x="4985" y="16668"/>
+                  </a:lnTo>
+                  <a:lnTo>
+                    <a:pt x="5982" y="16668"/>
+                  </a:lnTo>
+                  <a:lnTo>
+                    <a:pt x="1495" y="16668"/>
+                  </a:lnTo>
+                  <a:lnTo>
+                    <a:pt x="1495" y="17688"/>
+                  </a:lnTo>
+                  <a:lnTo>
+                    <a:pt x="2160" y="17688"/>
+                  </a:lnTo>
+                  <a:lnTo>
+                    <a:pt x="4985" y="17688"/>
+                  </a:lnTo>
+                  <a:lnTo>
+                    <a:pt x="5982" y="17688"/>
+                  </a:lnTo>
+                  <a:lnTo>
+                    <a:pt x="1495" y="17688"/>
+                  </a:lnTo>
+                  <a:moveTo>
+                    <a:pt x="1994" y="19729"/>
+                  </a:moveTo>
+                  <a:lnTo>
+                    <a:pt x="1994" y="20069"/>
+                  </a:lnTo>
+                  <a:lnTo>
+                    <a:pt x="1994" y="21260"/>
+                  </a:lnTo>
+                  <a:lnTo>
+                    <a:pt x="1994" y="21600"/>
+                  </a:lnTo>
+                  <a:lnTo>
+                    <a:pt x="1994" y="19729"/>
+                  </a:lnTo>
+                  <a:lnTo>
+                    <a:pt x="2658" y="19729"/>
+                  </a:lnTo>
+                  <a:lnTo>
+                    <a:pt x="2658" y="20069"/>
+                  </a:lnTo>
+                  <a:lnTo>
+                    <a:pt x="2658" y="21260"/>
+                  </a:lnTo>
+                  <a:lnTo>
+                    <a:pt x="2658" y="21600"/>
+                  </a:lnTo>
+                  <a:lnTo>
+                    <a:pt x="2658" y="19729"/>
+                  </a:lnTo>
+                  <a:lnTo>
+                    <a:pt x="3489" y="19729"/>
+                  </a:lnTo>
+                  <a:lnTo>
+                    <a:pt x="3489" y="20069"/>
+                  </a:lnTo>
+                  <a:lnTo>
+                    <a:pt x="3489" y="21260"/>
+                  </a:lnTo>
+                  <a:lnTo>
+                    <a:pt x="3489" y="21600"/>
+                  </a:lnTo>
+                  <a:lnTo>
+                    <a:pt x="3489" y="19729"/>
+                  </a:lnTo>
+                  <a:lnTo>
+                    <a:pt x="4320" y="19729"/>
+                  </a:lnTo>
+                  <a:lnTo>
+                    <a:pt x="4320" y="20069"/>
+                  </a:lnTo>
+                  <a:lnTo>
+                    <a:pt x="4320" y="21260"/>
+                  </a:lnTo>
+                  <a:lnTo>
+                    <a:pt x="4320" y="21600"/>
+                  </a:lnTo>
+                  <a:lnTo>
+                    <a:pt x="4320" y="19729"/>
+                  </a:lnTo>
+                  <a:lnTo>
+                    <a:pt x="5151" y="19729"/>
+                  </a:lnTo>
+                  <a:lnTo>
+                    <a:pt x="5151" y="20069"/>
+                  </a:lnTo>
+                  <a:lnTo>
+                    <a:pt x="5151" y="21260"/>
+                  </a:lnTo>
+                  <a:lnTo>
+                    <a:pt x="5151" y="21600"/>
+                  </a:lnTo>
+                  <a:lnTo>
+                    <a:pt x="5151" y="19729"/>
+                  </a:lnTo>
+                  <a:lnTo>
+                    <a:pt x="5982" y="19729"/>
+                  </a:lnTo>
+                  <a:lnTo>
+                    <a:pt x="5982" y="20069"/>
+                  </a:lnTo>
+                  <a:lnTo>
+                    <a:pt x="5982" y="21260"/>
+                  </a:lnTo>
+                  <a:lnTo>
+                    <a:pt x="5982" y="21600"/>
+                  </a:lnTo>
+                  <a:lnTo>
+                    <a:pt x="5982" y="19729"/>
+                  </a:lnTo>
+                  <a:lnTo>
+                    <a:pt x="6812" y="19729"/>
+                  </a:lnTo>
+                  <a:lnTo>
+                    <a:pt x="6812" y="20069"/>
+                  </a:lnTo>
+                  <a:lnTo>
+                    <a:pt x="6812" y="21260"/>
+                  </a:lnTo>
+                  <a:lnTo>
+                    <a:pt x="6812" y="21600"/>
+                  </a:lnTo>
+                  <a:lnTo>
+                    <a:pt x="6812" y="19729"/>
+                  </a:lnTo>
+                  <a:lnTo>
+                    <a:pt x="7643" y="19729"/>
+                  </a:lnTo>
+                  <a:lnTo>
+                    <a:pt x="7643" y="20069"/>
+                  </a:lnTo>
+                  <a:lnTo>
+                    <a:pt x="7643" y="21260"/>
+                  </a:lnTo>
+                  <a:lnTo>
+                    <a:pt x="7643" y="21600"/>
+                  </a:lnTo>
+                  <a:lnTo>
+                    <a:pt x="7643" y="19729"/>
+                  </a:lnTo>
+                  <a:lnTo>
+                    <a:pt x="8474" y="19729"/>
+                  </a:lnTo>
+                  <a:lnTo>
+                    <a:pt x="8474" y="20069"/>
+                  </a:lnTo>
+                  <a:lnTo>
+                    <a:pt x="8474" y="21260"/>
+                  </a:lnTo>
+                  <a:lnTo>
+                    <a:pt x="8474" y="21600"/>
+                  </a:lnTo>
+                  <a:lnTo>
+                    <a:pt x="8474" y="19729"/>
+                  </a:lnTo>
+                  <a:lnTo>
+                    <a:pt x="9305" y="19729"/>
+                  </a:lnTo>
+                  <a:lnTo>
+                    <a:pt x="9305" y="20069"/>
+                  </a:lnTo>
+                  <a:lnTo>
+                    <a:pt x="9305" y="21260"/>
+                  </a:lnTo>
+                  <a:lnTo>
+                    <a:pt x="9305" y="21600"/>
+                  </a:lnTo>
+                  <a:lnTo>
+                    <a:pt x="9305" y="19729"/>
+                  </a:lnTo>
+                  <a:lnTo>
+                    <a:pt x="10135" y="19729"/>
+                  </a:lnTo>
+                  <a:lnTo>
+                    <a:pt x="10135" y="20069"/>
+                  </a:lnTo>
+                  <a:lnTo>
+                    <a:pt x="10135" y="21260"/>
+                  </a:lnTo>
+                  <a:lnTo>
+                    <a:pt x="10135" y="21600"/>
+                  </a:lnTo>
+                  <a:lnTo>
+                    <a:pt x="10135" y="19729"/>
+                  </a:lnTo>
+                  <a:lnTo>
+                    <a:pt x="10966" y="19729"/>
+                  </a:lnTo>
+                  <a:lnTo>
+                    <a:pt x="10966" y="20069"/>
+                  </a:lnTo>
+                  <a:lnTo>
+                    <a:pt x="10966" y="21260"/>
+                  </a:lnTo>
+                  <a:lnTo>
+                    <a:pt x="10966" y="21600"/>
+                  </a:lnTo>
+                  <a:lnTo>
+                    <a:pt x="10966" y="19729"/>
+                  </a:lnTo>
+                  <a:lnTo>
+                    <a:pt x="11797" y="19729"/>
+                  </a:lnTo>
+                  <a:lnTo>
+                    <a:pt x="11797" y="20069"/>
+                  </a:lnTo>
+                  <a:lnTo>
+                    <a:pt x="11797" y="21260"/>
+                  </a:lnTo>
+                  <a:lnTo>
+                    <a:pt x="11797" y="21600"/>
+                  </a:lnTo>
+                  <a:lnTo>
+                    <a:pt x="11797" y="19729"/>
+                  </a:lnTo>
+                  <a:lnTo>
+                    <a:pt x="12462" y="19729"/>
+                  </a:lnTo>
+                  <a:lnTo>
+                    <a:pt x="12462" y="20069"/>
+                  </a:lnTo>
+                  <a:lnTo>
+                    <a:pt x="12462" y="21260"/>
+                  </a:lnTo>
+                  <a:lnTo>
+                    <a:pt x="12462" y="21600"/>
+                  </a:lnTo>
+                  <a:lnTo>
+                    <a:pt x="12462" y="19729"/>
+                  </a:lnTo>
+                  <a:lnTo>
+                    <a:pt x="13292" y="19729"/>
+                  </a:lnTo>
+                  <a:lnTo>
+                    <a:pt x="13292" y="20069"/>
+                  </a:lnTo>
+                  <a:lnTo>
+                    <a:pt x="13292" y="21260"/>
+                  </a:lnTo>
+                  <a:lnTo>
+                    <a:pt x="13292" y="21600"/>
+                  </a:lnTo>
+                  <a:lnTo>
+                    <a:pt x="13292" y="19729"/>
+                  </a:lnTo>
+                  <a:lnTo>
+                    <a:pt x="14123" y="19729"/>
+                  </a:lnTo>
+                  <a:lnTo>
+                    <a:pt x="14123" y="20069"/>
+                  </a:lnTo>
+                  <a:lnTo>
+                    <a:pt x="14123" y="21260"/>
+                  </a:lnTo>
+                  <a:lnTo>
+                    <a:pt x="14123" y="21600"/>
+                  </a:lnTo>
+                  <a:lnTo>
+                    <a:pt x="14123" y="19729"/>
+                  </a:lnTo>
+                  <a:lnTo>
+                    <a:pt x="14954" y="19729"/>
+                  </a:lnTo>
+                  <a:lnTo>
+                    <a:pt x="14954" y="20069"/>
+                  </a:lnTo>
+                  <a:lnTo>
+                    <a:pt x="14954" y="21260"/>
+                  </a:lnTo>
+                  <a:lnTo>
+                    <a:pt x="14954" y="21600"/>
+                  </a:lnTo>
+                  <a:lnTo>
+                    <a:pt x="14954" y="19729"/>
+                  </a:lnTo>
+                  <a:lnTo>
+                    <a:pt x="15785" y="19729"/>
+                  </a:lnTo>
+                  <a:lnTo>
+                    <a:pt x="15785" y="20069"/>
+                  </a:lnTo>
+                  <a:lnTo>
+                    <a:pt x="15785" y="21260"/>
+                  </a:lnTo>
+                  <a:lnTo>
+                    <a:pt x="15785" y="21600"/>
+                  </a:lnTo>
+                  <a:lnTo>
+                    <a:pt x="15785" y="19729"/>
+                  </a:lnTo>
+                  <a:lnTo>
+                    <a:pt x="16615" y="19729"/>
+                  </a:lnTo>
+                  <a:lnTo>
+                    <a:pt x="16615" y="20069"/>
+                  </a:lnTo>
+                  <a:lnTo>
+                    <a:pt x="16615" y="21260"/>
+                  </a:lnTo>
+                  <a:lnTo>
+                    <a:pt x="16615" y="21600"/>
+                  </a:lnTo>
+                  <a:lnTo>
+                    <a:pt x="16615" y="19729"/>
+                  </a:lnTo>
+                  <a:lnTo>
+                    <a:pt x="17446" y="19729"/>
+                  </a:lnTo>
+                  <a:lnTo>
+                    <a:pt x="17446" y="20069"/>
+                  </a:lnTo>
+                  <a:lnTo>
+                    <a:pt x="17446" y="21260"/>
+                  </a:lnTo>
+                  <a:lnTo>
+                    <a:pt x="17446" y="21600"/>
+                  </a:lnTo>
+                  <a:lnTo>
+                    <a:pt x="17446" y="19729"/>
+                  </a:lnTo>
+                  <a:lnTo>
+                    <a:pt x="18277" y="19729"/>
+                  </a:lnTo>
+                  <a:lnTo>
+                    <a:pt x="18277" y="20069"/>
+                  </a:lnTo>
+                  <a:lnTo>
+                    <a:pt x="18277" y="21260"/>
+                  </a:lnTo>
+                  <a:lnTo>
+                    <a:pt x="18277" y="21600"/>
+                  </a:lnTo>
+                  <a:lnTo>
+                    <a:pt x="18277" y="19729"/>
+                  </a:lnTo>
+                  <a:lnTo>
+                    <a:pt x="19108" y="19729"/>
+                  </a:lnTo>
+                  <a:lnTo>
+                    <a:pt x="19108" y="20069"/>
+                  </a:lnTo>
+                  <a:lnTo>
+                    <a:pt x="19108" y="21260"/>
+                  </a:lnTo>
+                  <a:lnTo>
+                    <a:pt x="19108" y="21600"/>
+                  </a:lnTo>
+                  <a:lnTo>
+                    <a:pt x="19108" y="19729"/>
+                  </a:lnTo>
+                  <a:lnTo>
+                    <a:pt x="19938" y="19729"/>
+                  </a:lnTo>
+                  <a:lnTo>
+                    <a:pt x="19938" y="20069"/>
+                  </a:lnTo>
+                  <a:lnTo>
+                    <a:pt x="19938" y="21260"/>
+                  </a:lnTo>
+                  <a:lnTo>
+                    <a:pt x="19938" y="21600"/>
+                  </a:lnTo>
+                  <a:lnTo>
+                    <a:pt x="19938" y="19729"/>
+                  </a:lnTo>
+                  <a:moveTo>
+                    <a:pt x="1495" y="1531"/>
+                  </a:moveTo>
+                  <a:lnTo>
+                    <a:pt x="5982" y="1531"/>
+                  </a:lnTo>
+                  <a:lnTo>
+                    <a:pt x="5982" y="18539"/>
+                  </a:lnTo>
+                  <a:lnTo>
+                    <a:pt x="1495" y="18539"/>
+                  </a:lnTo>
+                  <a:lnTo>
+                    <a:pt x="1495" y="1531"/>
+                  </a:lnTo>
+                  <a:moveTo>
+                    <a:pt x="7311" y="1531"/>
+                  </a:moveTo>
+                  <a:lnTo>
+                    <a:pt x="7975" y="1531"/>
+                  </a:lnTo>
+                  <a:lnTo>
+                    <a:pt x="7975" y="8334"/>
+                  </a:lnTo>
+                  <a:lnTo>
+                    <a:pt x="7311" y="8334"/>
+                  </a:lnTo>
+                  <a:lnTo>
+                    <a:pt x="7311" y="1531"/>
+                  </a:lnTo>
+                  <a:moveTo>
+                    <a:pt x="7145" y="9865"/>
+                  </a:moveTo>
+                  <a:lnTo>
+                    <a:pt x="8142" y="9865"/>
+                  </a:lnTo>
+                  <a:lnTo>
+                    <a:pt x="8142" y="10715"/>
+                  </a:lnTo>
+                  <a:lnTo>
+                    <a:pt x="7145" y="10715"/>
+                  </a:lnTo>
+                  <a:lnTo>
+                    <a:pt x="7145" y="9865"/>
+                  </a:lnTo>
+                  <a:moveTo>
+                    <a:pt x="8972" y="1531"/>
+                  </a:moveTo>
+                  <a:lnTo>
+                    <a:pt x="12462" y="1531"/>
+                  </a:lnTo>
+                  <a:lnTo>
+                    <a:pt x="12462" y="5443"/>
+                  </a:lnTo>
+                  <a:lnTo>
+                    <a:pt x="8972" y="5443"/>
+                  </a:lnTo>
+                  <a:lnTo>
+                    <a:pt x="8972" y="1531"/>
+                  </a:lnTo>
+                  <a:moveTo>
+                    <a:pt x="13625" y="1531"/>
+                  </a:moveTo>
+                  <a:lnTo>
+                    <a:pt x="20271" y="1531"/>
+                  </a:lnTo>
+                  <a:lnTo>
+                    <a:pt x="20271" y="5443"/>
+                  </a:lnTo>
+                  <a:lnTo>
+                    <a:pt x="13625" y="5443"/>
+                  </a:lnTo>
+                  <a:lnTo>
+                    <a:pt x="13625" y="1531"/>
+                  </a:lnTo>
+                  <a:moveTo>
+                    <a:pt x="18609" y="6463"/>
+                  </a:moveTo>
+                  <a:lnTo>
+                    <a:pt x="20437" y="6463"/>
+                  </a:lnTo>
+                  <a:lnTo>
+                    <a:pt x="20437" y="10885"/>
+                  </a:lnTo>
+                  <a:lnTo>
+                    <a:pt x="18609" y="10885"/>
+                  </a:lnTo>
+                  <a:lnTo>
+                    <a:pt x="18609" y="6463"/>
+                  </a:lnTo>
+                </a:path>
+              </a:pathLst>
+            </a:custGeom>
+            <a:solidFill>
+              <a:srgbClr val="C0C0C0"/>
+            </a:solidFill>
+            <a:ln w="9525">
+              <a:solidFill>
+                <a:srgbClr val="000000"/>
+              </a:solidFill>
+              <a:miter lim="800000"/>
+              <a:headEnd/>
+              <a:tailEnd/>
+            </a:ln>
+          </p:spPr>
+          <p:txBody>
+            <a:bodyPr vert="horz" wrap="square" lIns="91440" tIns="45720" rIns="91440" bIns="45720" numCol="1" anchor="t" anchorCtr="0" compatLnSpc="1">
+              <a:prstTxWarp prst="textNoShape">
+                <a:avLst/>
+              </a:prstTxWarp>
+            </a:bodyPr>
+            <a:lstStyle/>
+            <a:p>
+              <a:endParaRPr lang="nl-BE"/>
+            </a:p>
+          </p:txBody>
+        </p:sp>
+        <p:sp>
+          <p:nvSpPr>
+            <p:cNvPr id="14" name="TextBox 13"/>
+            <p:cNvSpPr txBox="1"/>
+            <p:nvPr/>
+          </p:nvSpPr>
+          <p:spPr>
+            <a:xfrm>
+              <a:off x="6642688" y="5940137"/>
+              <a:ext cx="1867884" cy="369332"/>
+            </a:xfrm>
+            <a:prstGeom prst="rect">
+              <a:avLst/>
+            </a:prstGeom>
+            <a:noFill/>
+            <a:ln>
+              <a:solidFill>
+                <a:schemeClr val="tx1"/>
+              </a:solidFill>
+            </a:ln>
+          </p:spPr>
+          <p:txBody>
+            <a:bodyPr wrap="none" rtlCol="0">
+              <a:spAutoFit/>
+            </a:bodyPr>
+            <a:lstStyle/>
+            <a:p>
+              <a:r>
+                <a:rPr lang="en-US" dirty="0" smtClean="0"/>
+                <a:t>shared file system</a:t>
+              </a:r>
+              <a:endParaRPr lang="nl-BE" dirty="0"/>
+            </a:p>
+          </p:txBody>
+        </p:sp>
+      </p:grpSp>
+      <p:cxnSp>
+        <p:nvCxnSpPr>
+          <p:cNvPr id="16" name="Straight Arrow Connector 15"/>
+          <p:cNvCxnSpPr/>
+          <p:nvPr/>
+        </p:nvCxnSpPr>
+        <p:spPr>
+          <a:xfrm>
+            <a:off x="6234545" y="3512127"/>
+            <a:ext cx="681327" cy="602673"/>
+          </a:xfrm>
+          <a:prstGeom prst="straightConnector1">
+            <a:avLst/>
+          </a:prstGeom>
+          <a:ln w="38100">
+            <a:headEnd type="triangle" w="lg" len="lg"/>
+            <a:tailEnd type="triangle" w="lg" len="lg"/>
+          </a:ln>
+        </p:spPr>
+        <p:style>
+          <a:lnRef idx="1">
+            <a:schemeClr val="accent1"/>
+          </a:lnRef>
+          <a:fillRef idx="0">
+            <a:schemeClr val="accent1"/>
+          </a:fillRef>
+          <a:effectRef idx="0">
+            <a:schemeClr val="accent1"/>
+          </a:effectRef>
+          <a:fontRef idx="minor">
+            <a:schemeClr val="tx1"/>
+          </a:fontRef>
+        </p:style>
+      </p:cxnSp>
+      <p:cxnSp>
+        <p:nvCxnSpPr>
+          <p:cNvPr id="17" name="Straight Arrow Connector 16"/>
+          <p:cNvCxnSpPr/>
+          <p:nvPr/>
+        </p:nvCxnSpPr>
+        <p:spPr>
+          <a:xfrm>
+            <a:off x="5205845" y="4894121"/>
+            <a:ext cx="1436843" cy="124685"/>
+          </a:xfrm>
+          <a:prstGeom prst="straightConnector1">
+            <a:avLst/>
+          </a:prstGeom>
+          <a:ln w="38100">
+            <a:headEnd type="triangle" w="lg" len="lg"/>
+            <a:tailEnd type="triangle" w="lg" len="lg"/>
+          </a:ln>
+        </p:spPr>
+        <p:style>
+          <a:lnRef idx="1">
+            <a:schemeClr val="accent1"/>
+          </a:lnRef>
+          <a:fillRef idx="0">
+            <a:schemeClr val="accent1"/>
+          </a:fillRef>
+          <a:effectRef idx="0">
+            <a:schemeClr val="accent1"/>
+          </a:effectRef>
+          <a:fontRef idx="minor">
+            <a:schemeClr val="tx1"/>
+          </a:fontRef>
+        </p:style>
+      </p:cxnSp>
+      <p:cxnSp>
+        <p:nvCxnSpPr>
+          <p:cNvPr id="21" name="Straight Arrow Connector 20"/>
+          <p:cNvCxnSpPr/>
+          <p:nvPr/>
+        </p:nvCxnSpPr>
+        <p:spPr>
+          <a:xfrm flipH="1">
+            <a:off x="4530436" y="3512126"/>
+            <a:ext cx="334746" cy="457201"/>
+          </a:xfrm>
+          <a:prstGeom prst="straightConnector1">
+            <a:avLst/>
+          </a:prstGeom>
+          <a:ln w="38100">
+            <a:headEnd type="triangle" w="lg" len="lg"/>
+            <a:tailEnd type="triangle" w="lg" len="lg"/>
+          </a:ln>
+        </p:spPr>
+        <p:style>
+          <a:lnRef idx="1">
+            <a:schemeClr val="accent1"/>
+          </a:lnRef>
+          <a:fillRef idx="0">
+            <a:schemeClr val="accent1"/>
+          </a:fillRef>
+          <a:effectRef idx="0">
+            <a:schemeClr val="accent1"/>
+          </a:effectRef>
+          <a:fontRef idx="minor">
+            <a:schemeClr val="tx1"/>
+          </a:fontRef>
+        </p:style>
+      </p:cxnSp>
+    </p:spTree>
+    <p:extLst>
+      <p:ext uri="{BB962C8B-B14F-4D97-AF65-F5344CB8AC3E}">
+        <p14:creationId xmlns:p14="http://schemas.microsoft.com/office/powerpoint/2010/main" val="557710212"/>
+      </p:ext>
+    </p:extLst>
+  </p:cSld>
+  <p:clrMapOvr>
+    <a:masterClrMapping/>
+  </p:clrMapOvr>
+</p:sld>
+</file>
+
+<file path=ppt/slides/slide8.xml><?xml version="1.0" encoding="utf-8"?>
+<p:sld xmlns:a="http://schemas.openxmlformats.org/drawingml/2006/main" xmlns:r="http://schemas.openxmlformats.org/officeDocument/2006/relationships" xmlns:p="http://schemas.openxmlformats.org/presentationml/2006/main">
+  <p:cSld>
+    <p:spTree>
+      <p:nvGrpSpPr>
+        <p:cNvPr id="1" name=""/>
+        <p:cNvGrpSpPr/>
+        <p:nvPr/>
+      </p:nvGrpSpPr>
+      <p:grpSpPr>
+        <a:xfrm>
+          <a:off x="0" y="0"/>
+          <a:ext cx="0" cy="0"/>
+          <a:chOff x="0" y="0"/>
+          <a:chExt cx="0" cy="0"/>
+        </a:xfrm>
+      </p:grpSpPr>
+      <p:sp>
+        <p:nvSpPr>
+          <p:cNvPr id="2" name="Title 1"/>
+          <p:cNvSpPr>
+            <a:spLocks noGrp="1"/>
+          </p:cNvSpPr>
+          <p:nvPr>
+            <p:ph type="title"/>
+          </p:nvPr>
+        </p:nvSpPr>
+        <p:spPr/>
+        <p:txBody>
+          <a:bodyPr/>
+          <a:lstStyle/>
+          <a:p>
+            <a:r>
+              <a:rPr lang="en-US" dirty="0" smtClean="0"/>
               <a:t>RDDs</a:t>
             </a:r>
             <a:endParaRPr lang="nl-BE" dirty="0"/>
@@ -11800,7 +14992,7 @@
 </p:sld>
 </file>
 
-<file path=ppt/slides/slide8.xml><?xml version="1.0" encoding="utf-8"?>
+<file path=ppt/slides/slide9.xml><?xml version="1.0" encoding="utf-8"?>
 <p:sld xmlns:a="http://schemas.openxmlformats.org/drawingml/2006/main" xmlns:r="http://schemas.openxmlformats.org/officeDocument/2006/relationships" xmlns:p="http://schemas.openxmlformats.org/presentationml/2006/main">
   <p:cSld>
     <p:spTree>
@@ -12404,865 +15596,6 @@
 </p:sld>
 </file>
 
-<file path=ppt/slides/slide9.xml><?xml version="1.0" encoding="utf-8"?>
-<p:sld xmlns:a="http://schemas.openxmlformats.org/drawingml/2006/main" xmlns:r="http://schemas.openxmlformats.org/officeDocument/2006/relationships" xmlns:p="http://schemas.openxmlformats.org/presentationml/2006/main">
-  <p:cSld>
-    <p:spTree>
-      <p:nvGrpSpPr>
-        <p:cNvPr id="1" name=""/>
-        <p:cNvGrpSpPr/>
-        <p:nvPr/>
-      </p:nvGrpSpPr>
-      <p:grpSpPr>
-        <a:xfrm>
-          <a:off x="0" y="0"/>
-          <a:ext cx="0" cy="0"/>
-          <a:chOff x="0" y="0"/>
-          <a:chExt cx="0" cy="0"/>
-        </a:xfrm>
-      </p:grpSpPr>
-      <p:sp>
-        <p:nvSpPr>
-          <p:cNvPr id="2" name="Title 1"/>
-          <p:cNvSpPr>
-            <a:spLocks noGrp="1"/>
-          </p:cNvSpPr>
-          <p:nvPr>
-            <p:ph type="title"/>
-          </p:nvPr>
-        </p:nvSpPr>
-        <p:spPr/>
-        <p:txBody>
-          <a:bodyPr/>
-          <a:lstStyle/>
-          <a:p>
-            <a:r>
-              <a:rPr lang="en-US" dirty="0" smtClean="0"/>
-              <a:t>Peeking at RDDs</a:t>
-            </a:r>
-            <a:endParaRPr lang="nl-BE" dirty="0"/>
-          </a:p>
-        </p:txBody>
-      </p:sp>
-      <p:sp>
-        <p:nvSpPr>
-          <p:cNvPr id="3" name="Content Placeholder 2"/>
-          <p:cNvSpPr>
-            <a:spLocks noGrp="1"/>
-          </p:cNvSpPr>
-          <p:nvPr>
-            <p:ph idx="1"/>
-          </p:nvPr>
-        </p:nvSpPr>
-        <p:spPr/>
-        <p:txBody>
-          <a:bodyPr>
-            <a:normAutofit/>
-          </a:bodyPr>
-          <a:lstStyle/>
-          <a:p>
-            <a:r>
-              <a:rPr lang="en-US" dirty="0" smtClean="0"/>
-              <a:t>Get some values (as a list)</a:t>
-            </a:r>
-          </a:p>
-          <a:p>
-            <a:pPr lvl="1"/>
-            <a:r>
-              <a:rPr lang="en-US" sz="1800" dirty="0" err="1" smtClean="0">
-                <a:latin typeface="Courier New" panose="02070309020205020404" pitchFamily="49" charset="0"/>
-                <a:cs typeface="Courier New" panose="02070309020205020404" pitchFamily="49" charset="0"/>
-              </a:rPr>
-              <a:t>first_value</a:t>
-            </a:r>
-            <a:r>
-              <a:rPr lang="en-US" sz="1800" dirty="0" smtClean="0">
-                <a:latin typeface="Courier New" panose="02070309020205020404" pitchFamily="49" charset="0"/>
-                <a:cs typeface="Courier New" panose="02070309020205020404" pitchFamily="49" charset="0"/>
-              </a:rPr>
-              <a:t> = </a:t>
-            </a:r>
-            <a:r>
-              <a:rPr lang="en-US" sz="1800" dirty="0" err="1" smtClean="0">
-                <a:latin typeface="Courier New" panose="02070309020205020404" pitchFamily="49" charset="0"/>
-                <a:cs typeface="Courier New" panose="02070309020205020404" pitchFamily="49" charset="0"/>
-              </a:rPr>
-              <a:t>data.first</a:t>
-            </a:r>
-            <a:r>
-              <a:rPr lang="en-US" sz="1800" dirty="0" smtClean="0">
-                <a:latin typeface="Courier New" panose="02070309020205020404" pitchFamily="49" charset="0"/>
-                <a:cs typeface="Courier New" panose="02070309020205020404" pitchFamily="49" charset="0"/>
-              </a:rPr>
-              <a:t>()</a:t>
-            </a:r>
-            <a:endParaRPr lang="en-US" dirty="0" smtClean="0">
-              <a:latin typeface="Courier New" panose="02070309020205020404" pitchFamily="49" charset="0"/>
-              <a:cs typeface="Courier New" panose="02070309020205020404" pitchFamily="49" charset="0"/>
-            </a:endParaRPr>
-          </a:p>
-          <a:p>
-            <a:pPr lvl="1"/>
-            <a:r>
-              <a:rPr lang="en-US" sz="1800" dirty="0" err="1" smtClean="0">
-                <a:latin typeface="Courier New" panose="02070309020205020404" pitchFamily="49" charset="0"/>
-                <a:cs typeface="Courier New" panose="02070309020205020404" pitchFamily="49" charset="0"/>
-              </a:rPr>
-              <a:t>first_few</a:t>
-            </a:r>
-            <a:r>
-              <a:rPr lang="en-US" sz="1800" dirty="0" smtClean="0">
-                <a:latin typeface="Courier New" panose="02070309020205020404" pitchFamily="49" charset="0"/>
-                <a:cs typeface="Courier New" panose="02070309020205020404" pitchFamily="49" charset="0"/>
-              </a:rPr>
-              <a:t> = </a:t>
-            </a:r>
-            <a:r>
-              <a:rPr lang="en-US" sz="1800" dirty="0" err="1" smtClean="0">
-                <a:latin typeface="Courier New" panose="02070309020205020404" pitchFamily="49" charset="0"/>
-                <a:cs typeface="Courier New" panose="02070309020205020404" pitchFamily="49" charset="0"/>
-              </a:rPr>
-              <a:t>data.take</a:t>
-            </a:r>
-            <a:r>
-              <a:rPr lang="en-US" sz="1800" dirty="0" smtClean="0">
-                <a:latin typeface="Courier New" panose="02070309020205020404" pitchFamily="49" charset="0"/>
-                <a:cs typeface="Courier New" panose="02070309020205020404" pitchFamily="49" charset="0"/>
-              </a:rPr>
-              <a:t>(5)</a:t>
-            </a:r>
-          </a:p>
-          <a:p>
-            <a:pPr lvl="1"/>
-            <a:r>
-              <a:rPr lang="en-US" sz="1800" dirty="0" smtClean="0">
-                <a:latin typeface="Courier New" panose="02070309020205020404" pitchFamily="49" charset="0"/>
-                <a:cs typeface="Courier New" panose="02070309020205020404" pitchFamily="49" charset="0"/>
-              </a:rPr>
-              <a:t>sample = </a:t>
-            </a:r>
-            <a:r>
-              <a:rPr lang="en-US" sz="1800" dirty="0" err="1" smtClean="0">
-                <a:latin typeface="Courier New" panose="02070309020205020404" pitchFamily="49" charset="0"/>
-                <a:cs typeface="Courier New" panose="02070309020205020404" pitchFamily="49" charset="0"/>
-              </a:rPr>
-              <a:t>data.takeSample</a:t>
-            </a:r>
-            <a:r>
-              <a:rPr lang="en-US" sz="1800" dirty="0" smtClean="0">
-                <a:latin typeface="Courier New" panose="02070309020205020404" pitchFamily="49" charset="0"/>
-                <a:cs typeface="Courier New" panose="02070309020205020404" pitchFamily="49" charset="0"/>
-              </a:rPr>
-              <a:t>(</a:t>
-            </a:r>
-            <a:r>
-              <a:rPr lang="en-US" sz="1800" dirty="0" err="1" smtClean="0">
-                <a:latin typeface="Courier New" panose="02070309020205020404" pitchFamily="49" charset="0"/>
-                <a:cs typeface="Courier New" panose="02070309020205020404" pitchFamily="49" charset="0"/>
-              </a:rPr>
-              <a:t>withReplacement</a:t>
-            </a:r>
-            <a:r>
-              <a:rPr lang="en-US" sz="1800" dirty="0" smtClean="0">
-                <a:latin typeface="Courier New" panose="02070309020205020404" pitchFamily="49" charset="0"/>
-                <a:cs typeface="Courier New" panose="02070309020205020404" pitchFamily="49" charset="0"/>
-              </a:rPr>
-              <a:t>, 50)</a:t>
-            </a:r>
-            <a:endParaRPr lang="en-US" dirty="0" smtClean="0">
-              <a:latin typeface="Courier New" panose="02070309020205020404" pitchFamily="49" charset="0"/>
-              <a:cs typeface="Courier New" panose="02070309020205020404" pitchFamily="49" charset="0"/>
-            </a:endParaRPr>
-          </a:p>
-          <a:p>
-            <a:r>
-              <a:rPr lang="en-US" dirty="0" smtClean="0"/>
-              <a:t>Get all values as list</a:t>
-            </a:r>
-          </a:p>
-          <a:p>
-            <a:pPr lvl="1"/>
-            <a:r>
-              <a:rPr lang="en-US" sz="1800" dirty="0" smtClean="0">
-                <a:latin typeface="Courier New" panose="02070309020205020404" pitchFamily="49" charset="0"/>
-                <a:cs typeface="Courier New" panose="02070309020205020404" pitchFamily="49" charset="0"/>
-              </a:rPr>
-              <a:t>list = </a:t>
-            </a:r>
-            <a:r>
-              <a:rPr lang="en-US" sz="1800" dirty="0" err="1" smtClean="0">
-                <a:latin typeface="Courier New" panose="02070309020205020404" pitchFamily="49" charset="0"/>
-                <a:cs typeface="Courier New" panose="02070309020205020404" pitchFamily="49" charset="0"/>
-              </a:rPr>
-              <a:t>data.collect</a:t>
-            </a:r>
-            <a:r>
-              <a:rPr lang="en-US" sz="1800" dirty="0" smtClean="0">
-                <a:latin typeface="Courier New" panose="02070309020205020404" pitchFamily="49" charset="0"/>
-                <a:cs typeface="Courier New" panose="02070309020205020404" pitchFamily="49" charset="0"/>
-              </a:rPr>
-              <a:t>()</a:t>
-            </a:r>
-            <a:endParaRPr lang="en-US" dirty="0" smtClean="0">
-              <a:latin typeface="Courier New" panose="02070309020205020404" pitchFamily="49" charset="0"/>
-              <a:cs typeface="Courier New" panose="02070309020205020404" pitchFamily="49" charset="0"/>
-            </a:endParaRPr>
-          </a:p>
-          <a:p>
-            <a:r>
-              <a:rPr lang="en-US" dirty="0" smtClean="0"/>
-              <a:t>How many elements?</a:t>
-            </a:r>
-          </a:p>
-          <a:p>
-            <a:pPr lvl="1"/>
-            <a:r>
-              <a:rPr lang="en-US" sz="1800" dirty="0" err="1" smtClean="0">
-                <a:latin typeface="Courier New" panose="02070309020205020404" pitchFamily="49" charset="0"/>
-                <a:cs typeface="Courier New" panose="02070309020205020404" pitchFamily="49" charset="0"/>
-              </a:rPr>
-              <a:t>nr_elements</a:t>
-            </a:r>
-            <a:r>
-              <a:rPr lang="en-US" sz="1800" dirty="0" smtClean="0">
-                <a:latin typeface="Courier New" panose="02070309020205020404" pitchFamily="49" charset="0"/>
-                <a:cs typeface="Courier New" panose="02070309020205020404" pitchFamily="49" charset="0"/>
-              </a:rPr>
-              <a:t> = </a:t>
-            </a:r>
-            <a:r>
-              <a:rPr lang="en-US" sz="1800" dirty="0" err="1" smtClean="0">
-                <a:latin typeface="Courier New" panose="02070309020205020404" pitchFamily="49" charset="0"/>
-                <a:cs typeface="Courier New" panose="02070309020205020404" pitchFamily="49" charset="0"/>
-              </a:rPr>
-              <a:t>data.count</a:t>
-            </a:r>
-            <a:r>
-              <a:rPr lang="en-US" sz="1800" dirty="0" smtClean="0">
-                <a:latin typeface="Courier New" panose="02070309020205020404" pitchFamily="49" charset="0"/>
-                <a:cs typeface="Courier New" panose="02070309020205020404" pitchFamily="49" charset="0"/>
-              </a:rPr>
-              <a:t>()</a:t>
-            </a:r>
-            <a:endParaRPr lang="en-US" dirty="0" smtClean="0">
-              <a:latin typeface="Courier New" panose="02070309020205020404" pitchFamily="49" charset="0"/>
-              <a:cs typeface="Courier New" panose="02070309020205020404" pitchFamily="49" charset="0"/>
-            </a:endParaRPr>
-          </a:p>
-          <a:p>
-            <a:r>
-              <a:rPr lang="en-US" dirty="0" smtClean="0"/>
-              <a:t>Save values to file</a:t>
-            </a:r>
-          </a:p>
-          <a:p>
-            <a:pPr lvl="1"/>
-            <a:r>
-              <a:rPr lang="en-US" sz="1800" dirty="0" err="1" smtClean="0">
-                <a:latin typeface="Courier New" panose="02070309020205020404" pitchFamily="49" charset="0"/>
-                <a:cs typeface="Courier New" panose="02070309020205020404" pitchFamily="49" charset="0"/>
-              </a:rPr>
-              <a:t>data.saveAsTextFile</a:t>
-            </a:r>
-            <a:r>
-              <a:rPr lang="en-US" sz="1800" dirty="0" smtClean="0">
-                <a:latin typeface="Courier New" panose="02070309020205020404" pitchFamily="49" charset="0"/>
-                <a:cs typeface="Courier New" panose="02070309020205020404" pitchFamily="49" charset="0"/>
-              </a:rPr>
-              <a:t>('output.txt')</a:t>
-            </a:r>
-            <a:endParaRPr lang="en-US" dirty="0" smtClean="0">
-              <a:latin typeface="Courier New" panose="02070309020205020404" pitchFamily="49" charset="0"/>
-              <a:cs typeface="Courier New" panose="02070309020205020404" pitchFamily="49" charset="0"/>
-            </a:endParaRPr>
-          </a:p>
-          <a:p>
-            <a:pPr lvl="1"/>
-            <a:r>
-              <a:rPr lang="en-US" sz="1800" dirty="0" err="1" smtClean="0">
-                <a:latin typeface="Courier New" panose="02070309020205020404" pitchFamily="49" charset="0"/>
-                <a:cs typeface="Courier New" panose="02070309020205020404" pitchFamily="49" charset="0"/>
-              </a:rPr>
-              <a:t>data.saveAsSequenceFile</a:t>
-            </a:r>
-            <a:r>
-              <a:rPr lang="en-US" sz="1800" dirty="0" smtClean="0">
-                <a:latin typeface="Courier New" panose="02070309020205020404" pitchFamily="49" charset="0"/>
-                <a:cs typeface="Courier New" panose="02070309020205020404" pitchFamily="49" charset="0"/>
-              </a:rPr>
-              <a:t>('</a:t>
-            </a:r>
-            <a:r>
-              <a:rPr lang="en-US" sz="1800" dirty="0" err="1" smtClean="0">
-                <a:latin typeface="Courier New" panose="02070309020205020404" pitchFamily="49" charset="0"/>
-                <a:cs typeface="Courier New" panose="02070309020205020404" pitchFamily="49" charset="0"/>
-              </a:rPr>
-              <a:t>output.bin</a:t>
-            </a:r>
-            <a:r>
-              <a:rPr lang="en-US" sz="1800" dirty="0" smtClean="0">
-                <a:latin typeface="Courier New" panose="02070309020205020404" pitchFamily="49" charset="0"/>
-                <a:cs typeface="Courier New" panose="02070309020205020404" pitchFamily="49" charset="0"/>
-              </a:rPr>
-              <a:t>')</a:t>
-            </a:r>
-            <a:endParaRPr lang="nl-BE" dirty="0">
-              <a:latin typeface="Courier New" panose="02070309020205020404" pitchFamily="49" charset="0"/>
-              <a:cs typeface="Courier New" panose="02070309020205020404" pitchFamily="49" charset="0"/>
-            </a:endParaRPr>
-          </a:p>
-        </p:txBody>
-      </p:sp>
-      <p:sp>
-        <p:nvSpPr>
-          <p:cNvPr id="4" name="TextBox 3"/>
-          <p:cNvSpPr txBox="1"/>
-          <p:nvPr/>
-        </p:nvSpPr>
-        <p:spPr>
-          <a:xfrm>
-            <a:off x="4809059" y="3505188"/>
-            <a:ext cx="2719078" cy="646331"/>
-          </a:xfrm>
-          <a:prstGeom prst="rect">
-            <a:avLst/>
-          </a:prstGeom>
-          <a:noFill/>
-          <a:ln>
-            <a:solidFill>
-              <a:schemeClr val="tx1"/>
-            </a:solidFill>
-          </a:ln>
-        </p:spPr>
-        <p:txBody>
-          <a:bodyPr wrap="none" rtlCol="0">
-            <a:spAutoFit/>
-          </a:bodyPr>
-          <a:lstStyle/>
-          <a:p>
-            <a:r>
-              <a:rPr lang="en-US" dirty="0" smtClean="0"/>
-              <a:t>Note: this blows up in your</a:t>
-            </a:r>
-            <a:br>
-              <a:rPr lang="en-US" dirty="0" smtClean="0"/>
-            </a:br>
-            <a:r>
-              <a:rPr lang="en-US" dirty="0" smtClean="0"/>
-              <a:t>           face if RDD is large</a:t>
-            </a:r>
-            <a:endParaRPr lang="nl-BE" dirty="0"/>
-          </a:p>
-        </p:txBody>
-      </p:sp>
-    </p:spTree>
-    <p:extLst>
-      <p:ext uri="{BB962C8B-B14F-4D97-AF65-F5344CB8AC3E}">
-        <p14:creationId xmlns:p14="http://schemas.microsoft.com/office/powerpoint/2010/main" val="2397943612"/>
-      </p:ext>
-    </p:extLst>
-  </p:cSld>
-  <p:clrMapOvr>
-    <a:masterClrMapping/>
-  </p:clrMapOvr>
-  <p:timing>
-    <p:tnLst>
-      <p:par>
-        <p:cTn id="1" dur="indefinite" restart="never" nodeType="tmRoot">
-          <p:childTnLst>
-            <p:seq concurrent="1" nextAc="seek">
-              <p:cTn id="2" dur="indefinite" nodeType="mainSeq">
-                <p:childTnLst>
-                  <p:par>
-                    <p:cTn id="3" fill="hold">
-                      <p:stCondLst>
-                        <p:cond delay="indefinite"/>
-                        <p:cond evt="onBegin" delay="0">
-                          <p:tn val="2"/>
-                        </p:cond>
-                      </p:stCondLst>
-                      <p:childTnLst>
-                        <p:par>
-                          <p:cTn id="4" fill="hold">
-                            <p:stCondLst>
-                              <p:cond delay="0"/>
-                            </p:stCondLst>
-                            <p:childTnLst>
-                              <p:par>
-                                <p:cTn id="5" presetID="1" presetClass="entr" presetSubtype="0" fill="hold" grpId="0" nodeType="withEffect">
-                                  <p:stCondLst>
-                                    <p:cond delay="0"/>
-                                  </p:stCondLst>
-                                  <p:childTnLst>
-                                    <p:set>
-                                      <p:cBhvr>
-                                        <p:cTn id="6" dur="1" fill="hold">
-                                          <p:stCondLst>
-                                            <p:cond delay="0"/>
-                                          </p:stCondLst>
-                                        </p:cTn>
-                                        <p:tgtEl>
-                                          <p:spTgt spid="3">
-                                            <p:txEl>
-                                              <p:pRg st="0" end="0"/>
-                                            </p:txEl>
-                                          </p:spTgt>
-                                        </p:tgtEl>
-                                        <p:attrNameLst>
-                                          <p:attrName>style.visibility</p:attrName>
-                                        </p:attrNameLst>
-                                      </p:cBhvr>
-                                      <p:to>
-                                        <p:strVal val="visible"/>
-                                      </p:to>
-                                    </p:set>
-                                  </p:childTnLst>
-                                </p:cTn>
-                              </p:par>
-                              <p:par>
-                                <p:cTn id="7" presetID="1" presetClass="entr" presetSubtype="0" fill="hold" grpId="0" nodeType="withEffect">
-                                  <p:stCondLst>
-                                    <p:cond delay="0"/>
-                                  </p:stCondLst>
-                                  <p:childTnLst>
-                                    <p:set>
-                                      <p:cBhvr>
-                                        <p:cTn id="8" dur="1" fill="hold">
-                                          <p:stCondLst>
-                                            <p:cond delay="0"/>
-                                          </p:stCondLst>
-                                        </p:cTn>
-                                        <p:tgtEl>
-                                          <p:spTgt spid="3">
-                                            <p:txEl>
-                                              <p:pRg st="1" end="1"/>
-                                            </p:txEl>
-                                          </p:spTgt>
-                                        </p:tgtEl>
-                                        <p:attrNameLst>
-                                          <p:attrName>style.visibility</p:attrName>
-                                        </p:attrNameLst>
-                                      </p:cBhvr>
-                                      <p:to>
-                                        <p:strVal val="visible"/>
-                                      </p:to>
-                                    </p:set>
-                                  </p:childTnLst>
-                                </p:cTn>
-                              </p:par>
-                              <p:par>
-                                <p:cTn id="9" presetID="1" presetClass="entr" presetSubtype="0" fill="hold" grpId="0" nodeType="withEffect">
-                                  <p:stCondLst>
-                                    <p:cond delay="0"/>
-                                  </p:stCondLst>
-                                  <p:childTnLst>
-                                    <p:set>
-                                      <p:cBhvr>
-                                        <p:cTn id="10" dur="1" fill="hold">
-                                          <p:stCondLst>
-                                            <p:cond delay="0"/>
-                                          </p:stCondLst>
-                                        </p:cTn>
-                                        <p:tgtEl>
-                                          <p:spTgt spid="3">
-                                            <p:txEl>
-                                              <p:pRg st="2" end="2"/>
-                                            </p:txEl>
-                                          </p:spTgt>
-                                        </p:tgtEl>
-                                        <p:attrNameLst>
-                                          <p:attrName>style.visibility</p:attrName>
-                                        </p:attrNameLst>
-                                      </p:cBhvr>
-                                      <p:to>
-                                        <p:strVal val="visible"/>
-                                      </p:to>
-                                    </p:set>
-                                  </p:childTnLst>
-                                </p:cTn>
-                              </p:par>
-                              <p:par>
-                                <p:cTn id="11" presetID="1" presetClass="entr" presetSubtype="0" fill="hold" grpId="0" nodeType="withEffect">
-                                  <p:stCondLst>
-                                    <p:cond delay="0"/>
-                                  </p:stCondLst>
-                                  <p:childTnLst>
-                                    <p:set>
-                                      <p:cBhvr>
-                                        <p:cTn id="12" dur="1" fill="hold">
-                                          <p:stCondLst>
-                                            <p:cond delay="0"/>
-                                          </p:stCondLst>
-                                        </p:cTn>
-                                        <p:tgtEl>
-                                          <p:spTgt spid="3">
-                                            <p:txEl>
-                                              <p:pRg st="3" end="3"/>
-                                            </p:txEl>
-                                          </p:spTgt>
-                                        </p:tgtEl>
-                                        <p:attrNameLst>
-                                          <p:attrName>style.visibility</p:attrName>
-                                        </p:attrNameLst>
-                                      </p:cBhvr>
-                                      <p:to>
-                                        <p:strVal val="visible"/>
-                                      </p:to>
-                                    </p:set>
-                                  </p:childTnLst>
-                                </p:cTn>
-                              </p:par>
-                            </p:childTnLst>
-                          </p:cTn>
-                        </p:par>
-                      </p:childTnLst>
-                    </p:cTn>
-                  </p:par>
-                  <p:par>
-                    <p:cTn id="13" fill="hold">
-                      <p:stCondLst>
-                        <p:cond delay="indefinite"/>
-                      </p:stCondLst>
-                      <p:childTnLst>
-                        <p:par>
-                          <p:cTn id="14" fill="hold">
-                            <p:stCondLst>
-                              <p:cond delay="0"/>
-                            </p:stCondLst>
-                            <p:childTnLst>
-                              <p:par>
-                                <p:cTn id="15" presetID="1" presetClass="entr" presetSubtype="0" fill="hold" grpId="0" nodeType="clickEffect">
-                                  <p:stCondLst>
-                                    <p:cond delay="0"/>
-                                  </p:stCondLst>
-                                  <p:childTnLst>
-                                    <p:set>
-                                      <p:cBhvr>
-                                        <p:cTn id="16" dur="1" fill="hold">
-                                          <p:stCondLst>
-                                            <p:cond delay="0"/>
-                                          </p:stCondLst>
-                                        </p:cTn>
-                                        <p:tgtEl>
-                                          <p:spTgt spid="3">
-                                            <p:txEl>
-                                              <p:pRg st="4" end="4"/>
-                                            </p:txEl>
-                                          </p:spTgt>
-                                        </p:tgtEl>
-                                        <p:attrNameLst>
-                                          <p:attrName>style.visibility</p:attrName>
-                                        </p:attrNameLst>
-                                      </p:cBhvr>
-                                      <p:to>
-                                        <p:strVal val="visible"/>
-                                      </p:to>
-                                    </p:set>
-                                  </p:childTnLst>
-                                </p:cTn>
-                              </p:par>
-                              <p:par>
-                                <p:cTn id="17" presetID="1" presetClass="entr" presetSubtype="0" fill="hold" grpId="0" nodeType="withEffect">
-                                  <p:stCondLst>
-                                    <p:cond delay="0"/>
-                                  </p:stCondLst>
-                                  <p:childTnLst>
-                                    <p:set>
-                                      <p:cBhvr>
-                                        <p:cTn id="18" dur="1" fill="hold">
-                                          <p:stCondLst>
-                                            <p:cond delay="0"/>
-                                          </p:stCondLst>
-                                        </p:cTn>
-                                        <p:tgtEl>
-                                          <p:spTgt spid="3">
-                                            <p:txEl>
-                                              <p:pRg st="5" end="5"/>
-                                            </p:txEl>
-                                          </p:spTgt>
-                                        </p:tgtEl>
-                                        <p:attrNameLst>
-                                          <p:attrName>style.visibility</p:attrName>
-                                        </p:attrNameLst>
-                                      </p:cBhvr>
-                                      <p:to>
-                                        <p:strVal val="visible"/>
-                                      </p:to>
-                                    </p:set>
-                                  </p:childTnLst>
-                                </p:cTn>
-                              </p:par>
-                            </p:childTnLst>
-                          </p:cTn>
-                        </p:par>
-                      </p:childTnLst>
-                    </p:cTn>
-                  </p:par>
-                  <p:par>
-                    <p:cTn id="19" fill="hold">
-                      <p:stCondLst>
-                        <p:cond delay="indefinite"/>
-                      </p:stCondLst>
-                      <p:childTnLst>
-                        <p:par>
-                          <p:cTn id="20" fill="hold">
-                            <p:stCondLst>
-                              <p:cond delay="0"/>
-                            </p:stCondLst>
-                            <p:childTnLst>
-                              <p:par>
-                                <p:cTn id="21" presetID="1" presetClass="entr" presetSubtype="0" fill="hold" grpId="0" nodeType="clickEffect">
-                                  <p:stCondLst>
-                                    <p:cond delay="0"/>
-                                  </p:stCondLst>
-                                  <p:childTnLst>
-                                    <p:set>
-                                      <p:cBhvr>
-                                        <p:cTn id="22" dur="1" fill="hold">
-                                          <p:stCondLst>
-                                            <p:cond delay="0"/>
-                                          </p:stCondLst>
-                                        </p:cTn>
-                                        <p:tgtEl>
-                                          <p:spTgt spid="4"/>
-                                        </p:tgtEl>
-                                        <p:attrNameLst>
-                                          <p:attrName>style.visibility</p:attrName>
-                                        </p:attrNameLst>
-                                      </p:cBhvr>
-                                      <p:to>
-                                        <p:strVal val="visible"/>
-                                      </p:to>
-                                    </p:set>
-                                  </p:childTnLst>
-                                </p:cTn>
-                              </p:par>
-                            </p:childTnLst>
-                          </p:cTn>
-                        </p:par>
-                      </p:childTnLst>
-                    </p:cTn>
-                  </p:par>
-                  <p:par>
-                    <p:cTn id="23" fill="hold">
-                      <p:stCondLst>
-                        <p:cond delay="indefinite"/>
-                      </p:stCondLst>
-                      <p:childTnLst>
-                        <p:par>
-                          <p:cTn id="24" fill="hold">
-                            <p:stCondLst>
-                              <p:cond delay="0"/>
-                            </p:stCondLst>
-                            <p:childTnLst>
-                              <p:par>
-                                <p:cTn id="25" presetID="1" presetClass="entr" presetSubtype="0" fill="hold" grpId="0" nodeType="clickEffect">
-                                  <p:stCondLst>
-                                    <p:cond delay="0"/>
-                                  </p:stCondLst>
-                                  <p:childTnLst>
-                                    <p:set>
-                                      <p:cBhvr>
-                                        <p:cTn id="26" dur="1" fill="hold">
-                                          <p:stCondLst>
-                                            <p:cond delay="0"/>
-                                          </p:stCondLst>
-                                        </p:cTn>
-                                        <p:tgtEl>
-                                          <p:spTgt spid="3">
-                                            <p:txEl>
-                                              <p:pRg st="6" end="6"/>
-                                            </p:txEl>
-                                          </p:spTgt>
-                                        </p:tgtEl>
-                                        <p:attrNameLst>
-                                          <p:attrName>style.visibility</p:attrName>
-                                        </p:attrNameLst>
-                                      </p:cBhvr>
-                                      <p:to>
-                                        <p:strVal val="visible"/>
-                                      </p:to>
-                                    </p:set>
-                                  </p:childTnLst>
-                                </p:cTn>
-                              </p:par>
-                              <p:par>
-                                <p:cTn id="27" presetID="1" presetClass="entr" presetSubtype="0" fill="hold" grpId="0" nodeType="withEffect">
-                                  <p:stCondLst>
-                                    <p:cond delay="0"/>
-                                  </p:stCondLst>
-                                  <p:childTnLst>
-                                    <p:set>
-                                      <p:cBhvr>
-                                        <p:cTn id="28" dur="1" fill="hold">
-                                          <p:stCondLst>
-                                            <p:cond delay="0"/>
-                                          </p:stCondLst>
-                                        </p:cTn>
-                                        <p:tgtEl>
-                                          <p:spTgt spid="3">
-                                            <p:txEl>
-                                              <p:pRg st="7" end="7"/>
-                                            </p:txEl>
-                                          </p:spTgt>
-                                        </p:tgtEl>
-                                        <p:attrNameLst>
-                                          <p:attrName>style.visibility</p:attrName>
-                                        </p:attrNameLst>
-                                      </p:cBhvr>
-                                      <p:to>
-                                        <p:strVal val="visible"/>
-                                      </p:to>
-                                    </p:set>
-                                  </p:childTnLst>
-                                </p:cTn>
-                              </p:par>
-                            </p:childTnLst>
-                          </p:cTn>
-                        </p:par>
-                      </p:childTnLst>
-                    </p:cTn>
-                  </p:par>
-                  <p:par>
-                    <p:cTn id="29" fill="hold">
-                      <p:stCondLst>
-                        <p:cond delay="indefinite"/>
-                      </p:stCondLst>
-                      <p:childTnLst>
-                        <p:par>
-                          <p:cTn id="30" fill="hold">
-                            <p:stCondLst>
-                              <p:cond delay="0"/>
-                            </p:stCondLst>
-                            <p:childTnLst>
-                              <p:par>
-                                <p:cTn id="31" presetID="1" presetClass="entr" presetSubtype="0" fill="hold" grpId="0" nodeType="clickEffect">
-                                  <p:stCondLst>
-                                    <p:cond delay="0"/>
-                                  </p:stCondLst>
-                                  <p:childTnLst>
-                                    <p:set>
-                                      <p:cBhvr>
-                                        <p:cTn id="32" dur="1" fill="hold">
-                                          <p:stCondLst>
-                                            <p:cond delay="0"/>
-                                          </p:stCondLst>
-                                        </p:cTn>
-                                        <p:tgtEl>
-                                          <p:spTgt spid="3">
-                                            <p:txEl>
-                                              <p:pRg st="8" end="8"/>
-                                            </p:txEl>
-                                          </p:spTgt>
-                                        </p:tgtEl>
-                                        <p:attrNameLst>
-                                          <p:attrName>style.visibility</p:attrName>
-                                        </p:attrNameLst>
-                                      </p:cBhvr>
-                                      <p:to>
-                                        <p:strVal val="visible"/>
-                                      </p:to>
-                                    </p:set>
-                                  </p:childTnLst>
-                                </p:cTn>
-                              </p:par>
-                              <p:par>
-                                <p:cTn id="33" presetID="1" presetClass="entr" presetSubtype="0" fill="hold" grpId="0" nodeType="withEffect">
-                                  <p:stCondLst>
-                                    <p:cond delay="0"/>
-                                  </p:stCondLst>
-                                  <p:childTnLst>
-                                    <p:set>
-                                      <p:cBhvr>
-                                        <p:cTn id="34" dur="1" fill="hold">
-                                          <p:stCondLst>
-                                            <p:cond delay="0"/>
-                                          </p:stCondLst>
-                                        </p:cTn>
-                                        <p:tgtEl>
-                                          <p:spTgt spid="3">
-                                            <p:txEl>
-                                              <p:pRg st="9" end="9"/>
-                                            </p:txEl>
-                                          </p:spTgt>
-                                        </p:tgtEl>
-                                        <p:attrNameLst>
-                                          <p:attrName>style.visibility</p:attrName>
-                                        </p:attrNameLst>
-                                      </p:cBhvr>
-                                      <p:to>
-                                        <p:strVal val="visible"/>
-                                      </p:to>
-                                    </p:set>
-                                  </p:childTnLst>
-                                </p:cTn>
-                              </p:par>
-                              <p:par>
-                                <p:cTn id="35" presetID="1" presetClass="entr" presetSubtype="0" fill="hold" grpId="0" nodeType="withEffect">
-                                  <p:stCondLst>
-                                    <p:cond delay="0"/>
-                                  </p:stCondLst>
-                                  <p:childTnLst>
-                                    <p:set>
-                                      <p:cBhvr>
-                                        <p:cTn id="36" dur="1" fill="hold">
-                                          <p:stCondLst>
-                                            <p:cond delay="0"/>
-                                          </p:stCondLst>
-                                        </p:cTn>
-                                        <p:tgtEl>
-                                          <p:spTgt spid="3">
-                                            <p:txEl>
-                                              <p:pRg st="10" end="10"/>
-                                            </p:txEl>
-                                          </p:spTgt>
-                                        </p:tgtEl>
-                                        <p:attrNameLst>
-                                          <p:attrName>style.visibility</p:attrName>
-                                        </p:attrNameLst>
-                                      </p:cBhvr>
-                                      <p:to>
-                                        <p:strVal val="visible"/>
-                                      </p:to>
-                                    </p:set>
-                                  </p:childTnLst>
-                                </p:cTn>
-                              </p:par>
-                            </p:childTnLst>
-                          </p:cTn>
-                        </p:par>
-                      </p:childTnLst>
-                    </p:cTn>
-                  </p:par>
-                </p:childTnLst>
-              </p:cTn>
-              <p:prevCondLst>
-                <p:cond evt="onPrev" delay="0">
-                  <p:tgtEl>
-                    <p:sldTgt/>
-                  </p:tgtEl>
-                </p:cond>
-              </p:prevCondLst>
-              <p:nextCondLst>
-                <p:cond evt="onNext" delay="0">
-                  <p:tgtEl>
-                    <p:sldTgt/>
-                  </p:tgtEl>
-                </p:cond>
-              </p:nextCondLst>
-            </p:seq>
-          </p:childTnLst>
-        </p:cTn>
-      </p:par>
-    </p:tnLst>
-    <p:bldLst>
-      <p:bldP spid="3" grpId="0" uiExpand="1" build="p"/>
-      <p:bldP spid="4" grpId="0" animBg="1"/>
-    </p:bldLst>
-  </p:timing>
-</p:sld>
-</file>
-
 <file path=ppt/theme/theme1.xml><?xml version="1.0" encoding="utf-8"?>
 <a:theme xmlns:a="http://schemas.openxmlformats.org/drawingml/2006/main" name="Office Theme">
   <a:themeElements>
@@ -13518,7 +15851,7 @@
   <a:extraClrSchemeLst/>
   <a:extLst>
     <a:ext uri="{05A4C25C-085E-4340-85A3-A5531E510DB2}">
-      <thm15:themeFamily xmlns:thm15="http://schemas.microsoft.com/office/thememl/2012/main" xmlns="" name="Office Theme" id="{62F939B6-93AF-4DB8-9C6B-D6C7DFDC589F}" vid="{4A3C46E8-61CC-4603-A589-7422A47A8E4A}"/>
+      <thm15:themeFamily xmlns="" xmlns:thm15="http://schemas.microsoft.com/office/thememl/2012/main" name="Office Theme" id="{62F939B6-93AF-4DB8-9C6B-D6C7DFDC589F}" vid="{4A3C46E8-61CC-4603-A589-7422A47A8E4A}"/>
     </a:ext>
   </a:extLst>
 </a:theme>

</xml_diff>